<commit_message>
finish uploadin materials for M11
</commit_message>
<xml_diff>
--- a/Slides/Lesson 11.1 Basics of Inheritance.pptx
+++ b/Slides/Lesson 11.1 Basics of Inheritance.pptx
@@ -258,7 +258,7 @@
           <a:p>
             <a:fld id="{0E7FEEE6-EB00-444A-90BB-AB2BFCBD0EA2}" type="datetimeFigureOut">
               <a:rPr lang="en-US" smtClean="0"/>
-              <a:t>11/12/2015</a:t>
+              <a:t>11/18/2015</a:t>
             </a:fld>
             <a:endParaRPr lang="en-US"/>
           </a:p>
@@ -875,7 +875,7 @@
           <a:p>
             <a:fld id="{2F1F79F5-7BEC-496A-AFC7-876E38F64D71}" type="datetime1">
               <a:rPr lang="en-US" smtClean="0"/>
-              <a:t>11/12/2015</a:t>
+              <a:t>11/18/2015</a:t>
             </a:fld>
             <a:endParaRPr lang="en-US"/>
           </a:p>
@@ -1000,7 +1000,7 @@
           <a:p>
             <a:fld id="{2F7B77F5-1464-4F6B-92A8-64FC8A508293}" type="datetime1">
               <a:rPr lang="en-US" smtClean="0"/>
-              <a:t>11/12/2015</a:t>
+              <a:t>11/18/2015</a:t>
             </a:fld>
             <a:endParaRPr lang="en-US"/>
           </a:p>
@@ -1102,7 +1102,7 @@
           <a:p>
             <a:fld id="{0A05703A-7669-4FEA-9056-25299B4D29D4}" type="datetime1">
               <a:rPr lang="en-US" smtClean="0"/>
-              <a:t>11/12/2015</a:t>
+              <a:t>11/18/2015</a:t>
             </a:fld>
             <a:endParaRPr lang="en-US"/>
           </a:p>
@@ -1379,7 +1379,7 @@
           <a:p>
             <a:fld id="{6E5077B5-BB57-49DB-88CA-226A139E5C01}" type="datetime1">
               <a:rPr lang="en-US" smtClean="0"/>
-              <a:t>11/12/2015</a:t>
+              <a:t>11/18/2015</a:t>
             </a:fld>
             <a:endParaRPr lang="en-US"/>
           </a:p>
@@ -1632,7 +1632,7 @@
           <a:p>
             <a:fld id="{C48D9447-CBD6-49A1-89FD-8512A8CF8999}" type="datetime1">
               <a:rPr lang="en-US" smtClean="0"/>
-              <a:t>11/12/2015</a:t>
+              <a:t>11/18/2015</a:t>
             </a:fld>
             <a:endParaRPr lang="en-US"/>
           </a:p>
@@ -1802,7 +1802,7 @@
           <a:p>
             <a:fld id="{A3639A2A-823D-48B7-9ACE-7FAF42870BA9}" type="datetime1">
               <a:rPr lang="en-US" smtClean="0"/>
-              <a:t>11/12/2015</a:t>
+              <a:t>11/18/2015</a:t>
             </a:fld>
             <a:endParaRPr lang="en-US"/>
           </a:p>
@@ -1982,7 +1982,7 @@
           <a:p>
             <a:fld id="{ED1B6996-82E9-463C-972C-7B56056E426C}" type="datetime1">
               <a:rPr lang="en-US" smtClean="0"/>
-              <a:t>11/12/2015</a:t>
+              <a:t>11/18/2015</a:t>
             </a:fld>
             <a:endParaRPr lang="en-US"/>
           </a:p>
@@ -2165,7 +2165,7 @@
           <a:p>
             <a:fld id="{E22ED4DA-448D-4BB1-B935-CC112220207B}" type="datetime1">
               <a:rPr lang="en-US" smtClean="0"/>
-              <a:t>11/12/2015</a:t>
+              <a:t>11/18/2015</a:t>
             </a:fld>
             <a:endParaRPr lang="en-US"/>
           </a:p>
@@ -2347,7 +2347,7 @@
           <a:p>
             <a:fld id="{E22ED4DA-448D-4BB1-B935-CC112220207B}" type="datetime1">
               <a:rPr lang="en-US" smtClean="0"/>
-              <a:t>11/12/2015</a:t>
+              <a:t>11/18/2015</a:t>
             </a:fld>
             <a:endParaRPr lang="en-US"/>
           </a:p>
@@ -2616,7 +2616,7 @@
           <a:p>
             <a:fld id="{FF5D65A6-AB94-4435-B0B7-3743215FA46C}" type="datetime1">
               <a:rPr lang="en-US" smtClean="0"/>
-              <a:t>11/12/2015</a:t>
+              <a:t>11/18/2015</a:t>
             </a:fld>
             <a:endParaRPr lang="en-US"/>
           </a:p>
@@ -2919,7 +2919,7 @@
           <a:p>
             <a:fld id="{5D1846AD-9252-4647-9435-4C2AC365653A}" type="datetime1">
               <a:rPr lang="en-US" smtClean="0"/>
-              <a:t>11/12/2015</a:t>
+              <a:t>11/18/2015</a:t>
             </a:fld>
             <a:endParaRPr lang="en-US"/>
           </a:p>
@@ -3097,7 +3097,7 @@
           <a:p>
             <a:fld id="{FF5D65A6-AB94-4435-B0B7-3743215FA46C}" type="datetime1">
               <a:rPr lang="en-US" smtClean="0"/>
-              <a:t>11/12/2015</a:t>
+              <a:t>11/18/2015</a:t>
             </a:fld>
             <a:endParaRPr lang="en-US"/>
           </a:p>
@@ -3399,7 +3399,7 @@
           <a:p>
             <a:fld id="{7C193DC4-6EF0-48C9-B29C-616106A645E1}" type="datetime1">
               <a:rPr lang="en-US" smtClean="0"/>
-              <a:t>11/12/2015</a:t>
+              <a:t>11/18/2015</a:t>
             </a:fld>
             <a:endParaRPr lang="en-US"/>
           </a:p>
@@ -3687,7 +3687,7 @@
           <a:p>
             <a:fld id="{5D1846AD-9252-4647-9435-4C2AC365653A}" type="datetime1">
               <a:rPr lang="en-US" smtClean="0"/>
-              <a:t>11/12/2015</a:t>
+              <a:t>11/18/2015</a:t>
             </a:fld>
             <a:endParaRPr lang="en-US"/>
           </a:p>
@@ -4109,7 +4109,7 @@
           <a:p>
             <a:fld id="{CE56DC10-3561-4063-A6AF-C1CC7A41040A}" type="datetime1">
               <a:rPr lang="en-US" smtClean="0"/>
-              <a:t>11/12/2015</a:t>
+              <a:t>11/18/2015</a:t>
             </a:fld>
             <a:endParaRPr lang="en-US"/>
           </a:p>
@@ -4334,7 +4334,7 @@
           <a:p>
             <a:fld id="{02B3F677-983B-48DB-ADFD-63FE6CBC7FB2}" type="datetime1">
               <a:rPr lang="en-US" smtClean="0"/>
-              <a:t>11/12/2015</a:t>
+              <a:t>11/18/2015</a:t>
             </a:fld>
             <a:endParaRPr lang="en-US"/>
           </a:p>
@@ -4892,7 +4892,6 @@
                 <a:rPr lang="en-US" sz="1000" dirty="0" smtClean="0"/>
                 <a:t>2012-2015</a:t>
               </a:r>
-              <a:endParaRPr lang="en-US" sz="1000" dirty="0" smtClean="0"/>
             </a:p>
             <a:p>
               <a:r>
@@ -9767,11 +9766,7 @@
           <a:p>
             <a:r>
               <a:rPr lang="en-US" dirty="0" smtClean="0"/>
-              <a:t>Summary of Lesson </a:t>
-            </a:r>
-            <a:r>
-              <a:rPr lang="en-US" dirty="0" smtClean="0"/>
-              <a:t>11.1</a:t>
+              <a:t>Summary of Lesson 11.1</a:t>
             </a:r>
             <a:endParaRPr lang="en-US" dirty="0"/>
           </a:p>
@@ -10079,15 +10074,7 @@
           <a:p>
             <a:r>
               <a:rPr lang="en-US" dirty="0" smtClean="0"/>
-              <a:t>Study </a:t>
-            </a:r>
-            <a:r>
-              <a:rPr lang="en-US" dirty="0" smtClean="0"/>
-              <a:t>11-1-flashing-balls.rkt </a:t>
-            </a:r>
-            <a:r>
-              <a:rPr lang="en-US" dirty="0" smtClean="0"/>
-              <a:t>in the Examples folder.</a:t>
+              <a:t>Study 11-1-flashing-balls.rkt in the Examples folder.</a:t>
             </a:r>
           </a:p>
           <a:p>
@@ -10099,21 +10086,8 @@
           <a:p>
             <a:r>
               <a:rPr lang="en-US" dirty="0" smtClean="0"/>
-              <a:t>Do the Guided Practices </a:t>
-            </a:r>
-            <a:r>
-              <a:rPr lang="en-US" dirty="0" smtClean="0"/>
-              <a:t>11.1 </a:t>
-            </a:r>
-            <a:r>
-              <a:rPr lang="en-US" dirty="0" smtClean="0"/>
-              <a:t>and </a:t>
-            </a:r>
-            <a:r>
-              <a:rPr lang="en-US" dirty="0" smtClean="0"/>
-              <a:t>11.2</a:t>
-            </a:r>
-            <a:endParaRPr lang="en-US" dirty="0" smtClean="0"/>
+              <a:t>Do the Guided Practices 11.1 and 11.2</a:t>
+            </a:r>
           </a:p>
           <a:p>
             <a:r>
@@ -10772,25 +10746,21 @@
             <a:prstGeom prst="roundRect">
               <a:avLst/>
             </a:prstGeom>
-            <a:solidFill>
-              <a:schemeClr val="accent1">
-                <a:lumMod val="20000"/>
-                <a:lumOff val="80000"/>
-              </a:schemeClr>
-            </a:solidFill>
           </p:spPr>
           <p:style>
-            <a:lnRef idx="1">
-              <a:schemeClr val="accent1"/>
+            <a:lnRef idx="2">
+              <a:schemeClr val="accent2">
+                <a:shade val="50000"/>
+              </a:schemeClr>
             </a:lnRef>
-            <a:fillRef idx="2">
-              <a:schemeClr val="accent1"/>
+            <a:fillRef idx="1">
+              <a:schemeClr val="accent2"/>
             </a:fillRef>
-            <a:effectRef idx="1">
-              <a:schemeClr val="accent1"/>
+            <a:effectRef idx="0">
+              <a:schemeClr val="accent2"/>
             </a:effectRef>
             <a:fontRef idx="minor">
-              <a:schemeClr val="dk1"/>
+              <a:schemeClr val="lt1"/>
             </a:fontRef>
           </p:style>
           <p:txBody>
@@ -11551,25 +11521,21 @@
             <a:prstGeom prst="roundRect">
               <a:avLst/>
             </a:prstGeom>
-            <a:solidFill>
-              <a:schemeClr val="accent1">
-                <a:lumMod val="20000"/>
-                <a:lumOff val="80000"/>
-              </a:schemeClr>
-            </a:solidFill>
           </p:spPr>
           <p:style>
-            <a:lnRef idx="1">
-              <a:schemeClr val="accent1"/>
+            <a:lnRef idx="2">
+              <a:schemeClr val="accent2">
+                <a:shade val="50000"/>
+              </a:schemeClr>
             </a:lnRef>
-            <a:fillRef idx="2">
-              <a:schemeClr val="accent1"/>
+            <a:fillRef idx="1">
+              <a:schemeClr val="accent2"/>
             </a:fillRef>
-            <a:effectRef idx="1">
-              <a:schemeClr val="accent1"/>
+            <a:effectRef idx="0">
+              <a:schemeClr val="accent2"/>
             </a:effectRef>
             <a:fontRef idx="minor">
-              <a:schemeClr val="dk1"/>
+              <a:schemeClr val="lt1"/>
             </a:fontRef>
           </p:style>
           <p:txBody>
@@ -11876,11 +11842,7 @@
           <a:p>
             <a:r>
               <a:rPr lang="en-US" dirty="0" smtClean="0"/>
-              <a:t>Key Points for Lesson </a:t>
-            </a:r>
-            <a:r>
-              <a:rPr lang="en-US" dirty="0" smtClean="0"/>
-              <a:t>11.1</a:t>
+              <a:t>Key Points for Lesson 11.1</a:t>
             </a:r>
             <a:endParaRPr lang="en-US" dirty="0"/>
           </a:p>
@@ -11993,11 +11955,7 @@
           <a:p>
             <a:r>
               <a:rPr lang="en-US" dirty="0" smtClean="0"/>
-              <a:t>Example: </a:t>
-            </a:r>
-            <a:r>
-              <a:rPr lang="en-US" dirty="0" smtClean="0"/>
-              <a:t>11-1-flashing-balls</a:t>
+              <a:t>Example: 11-1-flashing-balls</a:t>
             </a:r>
             <a:endParaRPr lang="en-US" dirty="0"/>
           </a:p>
@@ -12055,11 +12013,7 @@
           <a:p>
             <a:r>
               <a:rPr lang="en-US" dirty="0" smtClean="0"/>
-              <a:t>Let's look </a:t>
-            </a:r>
-            <a:r>
-              <a:rPr lang="en-US" dirty="0" smtClean="0"/>
-              <a:t>at some code.</a:t>
+              <a:t>Let's look at some code.</a:t>
             </a:r>
             <a:endParaRPr lang="en-US" dirty="0"/>
           </a:p>

</xml_diff>

<commit_message>
responded to Jim's comments
</commit_message>
<xml_diff>
--- a/Slides/Lesson 11.1 Basics of Inheritance.pptx
+++ b/Slides/Lesson 11.1 Basics of Inheritance.pptx
@@ -258,7 +258,7 @@
           <a:p>
             <a:fld id="{0E7FEEE6-EB00-444A-90BB-AB2BFCBD0EA2}" type="datetimeFigureOut">
               <a:rPr lang="en-US" smtClean="0"/>
-              <a:t>11/18/2015</a:t>
+              <a:t>11/29/2015</a:t>
             </a:fld>
             <a:endParaRPr lang="en-US"/>
           </a:p>
@@ -694,6 +694,90 @@
 </p:notes>
 </file>
 
+<file path=ppt/notesSlides/notesSlide3.xml><?xml version="1.0" encoding="utf-8"?>
+<p:notes xmlns:a="http://schemas.openxmlformats.org/drawingml/2006/main" xmlns:r="http://schemas.openxmlformats.org/officeDocument/2006/relationships" xmlns:p="http://schemas.openxmlformats.org/presentationml/2006/main">
+  <p:cSld>
+    <p:spTree>
+      <p:nvGrpSpPr>
+        <p:cNvPr id="1" name=""/>
+        <p:cNvGrpSpPr/>
+        <p:nvPr/>
+      </p:nvGrpSpPr>
+      <p:grpSpPr>
+        <a:xfrm>
+          <a:off x="0" y="0"/>
+          <a:ext cx="0" cy="0"/>
+          <a:chOff x="0" y="0"/>
+          <a:chExt cx="0" cy="0"/>
+        </a:xfrm>
+      </p:grpSpPr>
+      <p:sp>
+        <p:nvSpPr>
+          <p:cNvPr id="2" name="Slide Image Placeholder 1"/>
+          <p:cNvSpPr>
+            <a:spLocks noGrp="1" noRot="1" noChangeAspect="1"/>
+          </p:cNvSpPr>
+          <p:nvPr>
+            <p:ph type="sldImg"/>
+          </p:nvPr>
+        </p:nvSpPr>
+        <p:spPr/>
+      </p:sp>
+      <p:sp>
+        <p:nvSpPr>
+          <p:cNvPr id="3" name="Notes Placeholder 2"/>
+          <p:cNvSpPr>
+            <a:spLocks noGrp="1"/>
+          </p:cNvSpPr>
+          <p:nvPr>
+            <p:ph type="body" idx="1"/>
+          </p:nvPr>
+        </p:nvSpPr>
+        <p:spPr/>
+        <p:txBody>
+          <a:bodyPr/>
+          <a:lstStyle/>
+          <a:p>
+            <a:endParaRPr lang="en-US"/>
+          </a:p>
+        </p:txBody>
+      </p:sp>
+      <p:sp>
+        <p:nvSpPr>
+          <p:cNvPr id="4" name="Slide Number Placeholder 3"/>
+          <p:cNvSpPr>
+            <a:spLocks noGrp="1"/>
+          </p:cNvSpPr>
+          <p:nvPr>
+            <p:ph type="sldNum" sz="quarter" idx="10"/>
+          </p:nvPr>
+        </p:nvSpPr>
+        <p:spPr/>
+        <p:txBody>
+          <a:bodyPr/>
+          <a:lstStyle/>
+          <a:p>
+            <a:fld id="{9F5AA844-C922-4E05-8F38-DCF65F91B360}" type="slidenum">
+              <a:rPr lang="en-US" smtClean="0"/>
+              <a:t>17</a:t>
+            </a:fld>
+            <a:endParaRPr lang="en-US"/>
+          </a:p>
+        </p:txBody>
+      </p:sp>
+    </p:spTree>
+    <p:extLst>
+      <p:ext uri="{BB962C8B-B14F-4D97-AF65-F5344CB8AC3E}">
+        <p14:creationId xmlns:p14="http://schemas.microsoft.com/office/powerpoint/2010/main" val="2818101091"/>
+      </p:ext>
+    </p:extLst>
+  </p:cSld>
+  <p:clrMapOvr>
+    <a:masterClrMapping/>
+  </p:clrMapOvr>
+</p:notes>
+</file>
+
 <file path=ppt/slideLayouts/slideLayout1.xml><?xml version="1.0" encoding="utf-8"?>
 <p:sldLayout xmlns:a="http://schemas.openxmlformats.org/drawingml/2006/main" xmlns:r="http://schemas.openxmlformats.org/officeDocument/2006/relationships" xmlns:p="http://schemas.openxmlformats.org/presentationml/2006/main" type="title" preserve="1">
   <p:cSld name="Title Slide">
@@ -875,7 +959,7 @@
           <a:p>
             <a:fld id="{2F1F79F5-7BEC-496A-AFC7-876E38F64D71}" type="datetime1">
               <a:rPr lang="en-US" smtClean="0"/>
-              <a:t>11/18/2015</a:t>
+              <a:t>11/29/2015</a:t>
             </a:fld>
             <a:endParaRPr lang="en-US"/>
           </a:p>
@@ -1000,7 +1084,7 @@
           <a:p>
             <a:fld id="{2F7B77F5-1464-4F6B-92A8-64FC8A508293}" type="datetime1">
               <a:rPr lang="en-US" smtClean="0"/>
-              <a:t>11/18/2015</a:t>
+              <a:t>11/29/2015</a:t>
             </a:fld>
             <a:endParaRPr lang="en-US"/>
           </a:p>
@@ -1102,7 +1186,7 @@
           <a:p>
             <a:fld id="{0A05703A-7669-4FEA-9056-25299B4D29D4}" type="datetime1">
               <a:rPr lang="en-US" smtClean="0"/>
-              <a:t>11/18/2015</a:t>
+              <a:t>11/29/2015</a:t>
             </a:fld>
             <a:endParaRPr lang="en-US"/>
           </a:p>
@@ -1379,7 +1463,7 @@
           <a:p>
             <a:fld id="{6E5077B5-BB57-49DB-88CA-226A139E5C01}" type="datetime1">
               <a:rPr lang="en-US" smtClean="0"/>
-              <a:t>11/18/2015</a:t>
+              <a:t>11/29/2015</a:t>
             </a:fld>
             <a:endParaRPr lang="en-US"/>
           </a:p>
@@ -1632,7 +1716,7 @@
           <a:p>
             <a:fld id="{C48D9447-CBD6-49A1-89FD-8512A8CF8999}" type="datetime1">
               <a:rPr lang="en-US" smtClean="0"/>
-              <a:t>11/18/2015</a:t>
+              <a:t>11/29/2015</a:t>
             </a:fld>
             <a:endParaRPr lang="en-US"/>
           </a:p>
@@ -1802,7 +1886,7 @@
           <a:p>
             <a:fld id="{A3639A2A-823D-48B7-9ACE-7FAF42870BA9}" type="datetime1">
               <a:rPr lang="en-US" smtClean="0"/>
-              <a:t>11/18/2015</a:t>
+              <a:t>11/29/2015</a:t>
             </a:fld>
             <a:endParaRPr lang="en-US"/>
           </a:p>
@@ -1982,7 +2066,7 @@
           <a:p>
             <a:fld id="{ED1B6996-82E9-463C-972C-7B56056E426C}" type="datetime1">
               <a:rPr lang="en-US" smtClean="0"/>
-              <a:t>11/18/2015</a:t>
+              <a:t>11/29/2015</a:t>
             </a:fld>
             <a:endParaRPr lang="en-US"/>
           </a:p>
@@ -2165,7 +2249,7 @@
           <a:p>
             <a:fld id="{E22ED4DA-448D-4BB1-B935-CC112220207B}" type="datetime1">
               <a:rPr lang="en-US" smtClean="0"/>
-              <a:t>11/18/2015</a:t>
+              <a:t>11/29/2015</a:t>
             </a:fld>
             <a:endParaRPr lang="en-US"/>
           </a:p>
@@ -2347,7 +2431,7 @@
           <a:p>
             <a:fld id="{E22ED4DA-448D-4BB1-B935-CC112220207B}" type="datetime1">
               <a:rPr lang="en-US" smtClean="0"/>
-              <a:t>11/18/2015</a:t>
+              <a:t>11/29/2015</a:t>
             </a:fld>
             <a:endParaRPr lang="en-US"/>
           </a:p>
@@ -2616,7 +2700,7 @@
           <a:p>
             <a:fld id="{FF5D65A6-AB94-4435-B0B7-3743215FA46C}" type="datetime1">
               <a:rPr lang="en-US" smtClean="0"/>
-              <a:t>11/18/2015</a:t>
+              <a:t>11/29/2015</a:t>
             </a:fld>
             <a:endParaRPr lang="en-US"/>
           </a:p>
@@ -2919,7 +3003,7 @@
           <a:p>
             <a:fld id="{5D1846AD-9252-4647-9435-4C2AC365653A}" type="datetime1">
               <a:rPr lang="en-US" smtClean="0"/>
-              <a:t>11/18/2015</a:t>
+              <a:t>11/29/2015</a:t>
             </a:fld>
             <a:endParaRPr lang="en-US"/>
           </a:p>
@@ -3097,7 +3181,7 @@
           <a:p>
             <a:fld id="{FF5D65A6-AB94-4435-B0B7-3743215FA46C}" type="datetime1">
               <a:rPr lang="en-US" smtClean="0"/>
-              <a:t>11/18/2015</a:t>
+              <a:t>11/29/2015</a:t>
             </a:fld>
             <a:endParaRPr lang="en-US"/>
           </a:p>
@@ -3399,7 +3483,7 @@
           <a:p>
             <a:fld id="{7C193DC4-6EF0-48C9-B29C-616106A645E1}" type="datetime1">
               <a:rPr lang="en-US" smtClean="0"/>
-              <a:t>11/18/2015</a:t>
+              <a:t>11/29/2015</a:t>
             </a:fld>
             <a:endParaRPr lang="en-US"/>
           </a:p>
@@ -3687,7 +3771,7 @@
           <a:p>
             <a:fld id="{5D1846AD-9252-4647-9435-4C2AC365653A}" type="datetime1">
               <a:rPr lang="en-US" smtClean="0"/>
-              <a:t>11/18/2015</a:t>
+              <a:t>11/29/2015</a:t>
             </a:fld>
             <a:endParaRPr lang="en-US"/>
           </a:p>
@@ -4109,7 +4193,7 @@
           <a:p>
             <a:fld id="{CE56DC10-3561-4063-A6AF-C1CC7A41040A}" type="datetime1">
               <a:rPr lang="en-US" smtClean="0"/>
-              <a:t>11/18/2015</a:t>
+              <a:t>11/29/2015</a:t>
             </a:fld>
             <a:endParaRPr lang="en-US"/>
           </a:p>
@@ -4334,7 +4418,7 @@
           <a:p>
             <a:fld id="{02B3F677-983B-48DB-ADFD-63FE6CBC7FB2}" type="datetime1">
               <a:rPr lang="en-US" smtClean="0"/>
-              <a:t>11/18/2015</a:t>
+              <a:t>11/29/2015</a:t>
             </a:fld>
             <a:endParaRPr lang="en-US"/>
           </a:p>
@@ -4785,7 +4869,7 @@
             </a:r>
             <a:r>
               <a:rPr lang="en-US" dirty="0" smtClean="0"/>
-              <a:t>12.1 </a:t>
+              <a:t>11.1 </a:t>
             </a:r>
             <a:endParaRPr lang="en-US" dirty="0"/>
           </a:p>
@@ -5195,8 +5279,21 @@
                   <a:schemeClr val="tx1"/>
                 </a:solidFill>
               </a:rPr>
-              <a:t> = (class* object% () </a:t>
-            </a:r>
+              <a:t> = (class* object% </a:t>
+            </a:r>
+            <a:r>
+              <a:rPr lang="en-US" dirty="0" smtClean="0">
+                <a:solidFill>
+                  <a:schemeClr val="tx1"/>
+                </a:solidFill>
+              </a:rPr>
+              <a:t>(...) </a:t>
+            </a:r>
+            <a:endParaRPr lang="en-US" dirty="0" smtClean="0">
+              <a:solidFill>
+                <a:schemeClr val="tx1"/>
+              </a:solidFill>
+            </a:endParaRPr>
           </a:p>
           <a:p>
             <a:r>
@@ -5326,8 +5423,21 @@
                   <a:schemeClr val="tx1"/>
                 </a:solidFill>
               </a:rPr>
-              <a:t> = (class* Ball% ()</a:t>
-            </a:r>
+              <a:t> = (class* Ball% </a:t>
+            </a:r>
+            <a:r>
+              <a:rPr lang="en-US" dirty="0" smtClean="0">
+                <a:solidFill>
+                  <a:schemeClr val="tx1"/>
+                </a:solidFill>
+              </a:rPr>
+              <a:t>(...)</a:t>
+            </a:r>
+            <a:endParaRPr lang="en-US" dirty="0" smtClean="0">
+              <a:solidFill>
+                <a:schemeClr val="tx1"/>
+              </a:solidFill>
+            </a:endParaRPr>
           </a:p>
           <a:p>
             <a:r>
@@ -5935,7 +6045,15 @@
                     <a:schemeClr val="tx1"/>
                   </a:solidFill>
                 </a:rPr>
-                <a:t>selected = ...</a:t>
+                <a:t>selected? </a:t>
+              </a:r>
+              <a:r>
+                <a:rPr lang="en-US" dirty="0" smtClean="0">
+                  <a:solidFill>
+                    <a:schemeClr val="tx1"/>
+                  </a:solidFill>
+                </a:rPr>
+                <a:t>= ...</a:t>
               </a:r>
             </a:p>
             <a:p>
@@ -7438,8 +7556,21 @@
                   <a:schemeClr val="tx1"/>
                 </a:solidFill>
               </a:rPr>
-              <a:t> = (class* object% () </a:t>
-            </a:r>
+              <a:t> = (class* object% </a:t>
+            </a:r>
+            <a:r>
+              <a:rPr lang="en-US" dirty="0" smtClean="0">
+                <a:solidFill>
+                  <a:schemeClr val="tx1"/>
+                </a:solidFill>
+              </a:rPr>
+              <a:t>(...) </a:t>
+            </a:r>
+            <a:endParaRPr lang="en-US" dirty="0" smtClean="0">
+              <a:solidFill>
+                <a:schemeClr val="tx1"/>
+              </a:solidFill>
+            </a:endParaRPr>
           </a:p>
           <a:p>
             <a:r>
@@ -7570,8 +7701,21 @@
                   <a:schemeClr val="tx1"/>
                 </a:solidFill>
               </a:rPr>
-              <a:t> = (class* Ball% ()</a:t>
-            </a:r>
+              <a:t> = (class* Ball% </a:t>
+            </a:r>
+            <a:r>
+              <a:rPr lang="en-US" dirty="0" smtClean="0">
+                <a:solidFill>
+                  <a:schemeClr val="tx1"/>
+                </a:solidFill>
+              </a:rPr>
+              <a:t>(...)</a:t>
+            </a:r>
+            <a:endParaRPr lang="en-US" dirty="0" smtClean="0">
+              <a:solidFill>
+                <a:schemeClr val="tx1"/>
+              </a:solidFill>
+            </a:endParaRPr>
           </a:p>
           <a:p>
             <a:r>
@@ -7876,7 +8020,15 @@
                     <a:schemeClr val="tx1"/>
                   </a:solidFill>
                 </a:rPr>
-                <a:t>selected = ...</a:t>
+                <a:t>selected? </a:t>
+              </a:r>
+              <a:r>
+                <a:rPr lang="en-US" dirty="0" smtClean="0">
+                  <a:solidFill>
+                    <a:schemeClr val="tx1"/>
+                  </a:solidFill>
+                </a:rPr>
+                <a:t>= ...</a:t>
               </a:r>
             </a:p>
             <a:p>
@@ -9315,8 +9467,13 @@
             </a:r>
             <a:r>
               <a:rPr lang="en-US" sz="2400" dirty="0" smtClean="0"/>
-              <a:t> (class* object% ()</a:t>
-            </a:r>
+              <a:t> (class* object% </a:t>
+            </a:r>
+            <a:r>
+              <a:rPr lang="en-US" sz="2400" dirty="0" smtClean="0"/>
+              <a:t>(...)</a:t>
+            </a:r>
+            <a:endParaRPr lang="en-US" sz="2400" dirty="0" smtClean="0"/>
           </a:p>
           <a:p>
             <a:pPr>
@@ -9379,8 +9536,13 @@
             </a:r>
             <a:r>
               <a:rPr lang="en-US" sz="2400" dirty="0" smtClean="0"/>
-              <a:t> (class* the-superclass% ()</a:t>
-            </a:r>
+              <a:t> (class* the-superclass% </a:t>
+            </a:r>
+            <a:r>
+              <a:rPr lang="en-US" sz="2400" dirty="0" smtClean="0"/>
+              <a:t>(...)</a:t>
+            </a:r>
+            <a:endParaRPr lang="en-US" sz="2400" dirty="0" smtClean="0"/>
           </a:p>
           <a:p>
             <a:pPr>
@@ -9409,7 +9571,30 @@
             </a:r>
             <a:r>
               <a:rPr lang="en-US" sz="2400" dirty="0" smtClean="0"/>
-              <a:t>     (super m1 (+ x 1)))))</a:t>
+              <a:t>     (super m1 (+ x 1</a:t>
+            </a:r>
+            <a:r>
+              <a:rPr lang="en-US" sz="2400" dirty="0" smtClean="0"/>
+              <a:t>)))</a:t>
+            </a:r>
+          </a:p>
+          <a:p>
+            <a:pPr>
+              <a:spcBef>
+                <a:spcPts val="0"/>
+              </a:spcBef>
+            </a:pPr>
+            <a:r>
+              <a:rPr lang="en-US" sz="2400" dirty="0"/>
+              <a:t> </a:t>
+            </a:r>
+            <a:r>
+              <a:rPr lang="en-US" sz="2400" dirty="0" smtClean="0"/>
+              <a:t>   (define/public (m1 x) "this is noise"</a:t>
+            </a:r>
+            <a:r>
+              <a:rPr lang="en-US" sz="2400" dirty="0" smtClean="0"/>
+              <a:t>)) ))</a:t>
             </a:r>
             <a:endParaRPr lang="en-US" sz="2400" dirty="0"/>
           </a:p>
@@ -9483,7 +9668,7 @@
         </p:nvSpPr>
         <p:spPr>
           <a:xfrm>
-            <a:off x="6258791" y="4062846"/>
+            <a:off x="6172730" y="3288295"/>
             <a:ext cx="2722418" cy="997527"/>
           </a:xfrm>
           <a:prstGeom prst="rect">
@@ -9541,6 +9726,99 @@
               <a:t> in the superclass.</a:t>
             </a:r>
             <a:endParaRPr lang="en-US" dirty="0"/>
+          </a:p>
+        </p:txBody>
+      </p:sp>
+      <p:sp>
+        <p:nvSpPr>
+          <p:cNvPr id="5" name="Rectangle 4"/>
+          <p:cNvSpPr/>
+          <p:nvPr/>
+        </p:nvSpPr>
+        <p:spPr>
+          <a:xfrm>
+            <a:off x="1861073" y="5593976"/>
+            <a:ext cx="5325035" cy="944936"/>
+          </a:xfrm>
+          <a:prstGeom prst="rect">
+            <a:avLst/>
+          </a:prstGeom>
+          <a:solidFill>
+            <a:schemeClr val="accent3">
+              <a:lumMod val="40000"/>
+              <a:lumOff val="60000"/>
+            </a:schemeClr>
+          </a:solidFill>
+          <a:ln/>
+        </p:spPr>
+        <p:style>
+          <a:lnRef idx="2">
+            <a:schemeClr val="accent1"/>
+          </a:lnRef>
+          <a:fillRef idx="1">
+            <a:schemeClr val="lt1"/>
+          </a:fillRef>
+          <a:effectRef idx="0">
+            <a:schemeClr val="accent1"/>
+          </a:effectRef>
+          <a:fontRef idx="minor">
+            <a:schemeClr val="dk1"/>
+          </a:fontRef>
+        </p:style>
+        <p:txBody>
+          <a:bodyPr rot="0" spcFirstLastPara="0" vertOverflow="overflow" horzOverflow="overflow" vert="horz" wrap="square" lIns="91440" tIns="45720" rIns="91440" bIns="45720" numCol="1" spcCol="0" rtlCol="0" fromWordArt="0" anchor="ctr" anchorCtr="0" forceAA="0" compatLnSpc="1">
+            <a:prstTxWarp prst="textNoShape">
+              <a:avLst/>
+            </a:prstTxWarp>
+            <a:noAutofit/>
+          </a:bodyPr>
+          <a:lstStyle/>
+          <a:p>
+            <a:r>
+              <a:rPr lang="en-US" sz="1400" dirty="0" smtClean="0">
+                <a:solidFill>
+                  <a:schemeClr val="tx1"/>
+                </a:solidFill>
+              </a:rPr>
+              <a:t>In Racket, you can't call </a:t>
+            </a:r>
+            <a:r>
+              <a:rPr lang="en-US" sz="1400" b="1" dirty="0" smtClean="0">
+                <a:solidFill>
+                  <a:schemeClr val="tx1"/>
+                </a:solidFill>
+              </a:rPr>
+              <a:t>(super m1 ...) </a:t>
+            </a:r>
+            <a:r>
+              <a:rPr lang="en-US" sz="1400" dirty="0" smtClean="0">
+                <a:solidFill>
+                  <a:schemeClr val="tx1"/>
+                </a:solidFill>
+              </a:rPr>
+              <a:t>unless </a:t>
+            </a:r>
+            <a:r>
+              <a:rPr lang="en-US" sz="1400" b="1" dirty="0" smtClean="0">
+                <a:solidFill>
+                  <a:schemeClr val="tx1"/>
+                </a:solidFill>
+              </a:rPr>
+              <a:t>m1</a:t>
+            </a:r>
+            <a:r>
+              <a:rPr lang="en-US" sz="1400" dirty="0" smtClean="0">
+                <a:solidFill>
+                  <a:schemeClr val="tx1"/>
+                </a:solidFill>
+              </a:rPr>
+              <a:t> is already defined in the current class.   This is a wart in the Racket object system.  If we were in a different system, this would not be necessary.  Sorry about that.</a:t>
+            </a:r>
+            <a:endParaRPr lang="en-US" sz="1400" dirty="0">
+              <a:solidFill>
+                <a:schemeClr val="tx1"/>
+              </a:solidFill>
+            </a:endParaRPr>
           </a:p>
         </p:txBody>
       </p:sp>
@@ -9628,7 +9906,9 @@
         </p:nvSpPr>
         <p:spPr/>
         <p:txBody>
-          <a:bodyPr/>
+          <a:bodyPr>
+            <a:normAutofit lnSpcReduction="10000"/>
+          </a:bodyPr>
           <a:lstStyle/>
           <a:p>
             <a:r>
@@ -9668,7 +9948,23 @@
             <a:pPr lvl="1"/>
             <a:r>
               <a:rPr lang="en-US" dirty="0" smtClean="0"/>
-              <a:t>Do GP 12.1 and 12.2 to learn more about this.</a:t>
+              <a:t>Do </a:t>
+            </a:r>
+            <a:r>
+              <a:rPr lang="en-US" dirty="0" smtClean="0"/>
+              <a:t>Guided Practices 11.1 </a:t>
+            </a:r>
+            <a:r>
+              <a:rPr lang="en-US" dirty="0" smtClean="0"/>
+              <a:t>and </a:t>
+            </a:r>
+            <a:r>
+              <a:rPr lang="en-US" dirty="0" smtClean="0"/>
+              <a:t>11.2 </a:t>
+            </a:r>
+            <a:r>
+              <a:rPr lang="en-US" dirty="0" smtClean="0"/>
+              <a:t>to learn more about this.</a:t>
             </a:r>
           </a:p>
           <a:p>

</xml_diff>

<commit_message>
starting work on module 11
</commit_message>
<xml_diff>
--- a/Slides/Lesson 11.1 Basics of Inheritance.pptx
+++ b/Slides/Lesson 11.1 Basics of Inheritance.pptx
@@ -258,7 +258,7 @@
           <a:p>
             <a:fld id="{0E7FEEE6-EB00-444A-90BB-AB2BFCBD0EA2}" type="datetimeFigureOut">
               <a:rPr lang="en-US" smtClean="0"/>
-              <a:t>11/29/2015</a:t>
+              <a:t>11/12/2016</a:t>
             </a:fld>
             <a:endParaRPr lang="en-US"/>
           </a:p>
@@ -322,38 +322,37 @@
           <a:p>
             <a:pPr lvl="0"/>
             <a:r>
-              <a:rPr lang="en-US" smtClean="0"/>
+              <a:rPr lang="en-US"/>
               <a:t>Click to edit Master text styles</a:t>
             </a:r>
           </a:p>
           <a:p>
             <a:pPr lvl="1"/>
             <a:r>
-              <a:rPr lang="en-US" smtClean="0"/>
+              <a:rPr lang="en-US"/>
               <a:t>Second level</a:t>
             </a:r>
           </a:p>
           <a:p>
             <a:pPr lvl="2"/>
             <a:r>
-              <a:rPr lang="en-US" smtClean="0"/>
+              <a:rPr lang="en-US"/>
               <a:t>Third level</a:t>
             </a:r>
           </a:p>
           <a:p>
             <a:pPr lvl="3"/>
             <a:r>
-              <a:rPr lang="en-US" smtClean="0"/>
+              <a:rPr lang="en-US"/>
               <a:t>Fourth level</a:t>
             </a:r>
           </a:p>
           <a:p>
             <a:pPr lvl="4"/>
             <a:r>
-              <a:rPr lang="en-US" smtClean="0"/>
+              <a:rPr lang="en-US"/>
               <a:t>Fifth level</a:t>
             </a:r>
-            <a:endParaRPr lang="en-US"/>
           </a:p>
         </p:txBody>
       </p:sp>
@@ -816,10 +815,9 @@
           <a:lstStyle/>
           <a:p>
             <a:r>
-              <a:rPr lang="en-US" smtClean="0"/>
+              <a:rPr lang="en-US"/>
               <a:t>Click to edit Master title style</a:t>
             </a:r>
-            <a:endParaRPr lang="en-US"/>
           </a:p>
         </p:txBody>
       </p:sp>
@@ -935,10 +933,9 @@
           </a:lstStyle>
           <a:p>
             <a:r>
-              <a:rPr lang="en-US" smtClean="0"/>
+              <a:rPr lang="en-US"/>
               <a:t>Click to edit Master subtitle style</a:t>
             </a:r>
-            <a:endParaRPr lang="en-US"/>
           </a:p>
         </p:txBody>
       </p:sp>
@@ -959,7 +956,7 @@
           <a:p>
             <a:fld id="{2F1F79F5-7BEC-496A-AFC7-876E38F64D71}" type="datetime1">
               <a:rPr lang="en-US" smtClean="0"/>
-              <a:t>11/29/2015</a:t>
+              <a:t>11/12/2016</a:t>
             </a:fld>
             <a:endParaRPr lang="en-US"/>
           </a:p>
@@ -1017,13 +1014,6 @@
   <p:clrMapOvr>
     <a:masterClrMapping/>
   </p:clrMapOvr>
-  <p:timing>
-    <p:tnLst>
-      <p:par>
-        <p:cTn id="1" dur="indefinite" restart="never" nodeType="tmRoot"/>
-      </p:par>
-    </p:tnLst>
-  </p:timing>
 </p:sldLayout>
 </file>
 
@@ -1060,10 +1050,9 @@
           <a:lstStyle/>
           <a:p>
             <a:r>
-              <a:rPr lang="en-US" smtClean="0"/>
+              <a:rPr lang="en-US"/>
               <a:t>Click to edit Master title style</a:t>
             </a:r>
-            <a:endParaRPr lang="en-US"/>
           </a:p>
         </p:txBody>
       </p:sp>
@@ -1084,7 +1073,7 @@
           <a:p>
             <a:fld id="{2F7B77F5-1464-4F6B-92A8-64FC8A508293}" type="datetime1">
               <a:rPr lang="en-US" smtClean="0"/>
-              <a:t>11/29/2015</a:t>
+              <a:t>11/12/2016</a:t>
             </a:fld>
             <a:endParaRPr lang="en-US"/>
           </a:p>
@@ -1142,13 +1131,6 @@
   <p:clrMapOvr>
     <a:masterClrMapping/>
   </p:clrMapOvr>
-  <p:timing>
-    <p:tnLst>
-      <p:par>
-        <p:cTn id="1" dur="indefinite" restart="never" nodeType="tmRoot"/>
-      </p:par>
-    </p:tnLst>
-  </p:timing>
 </p:sldLayout>
 </file>
 
@@ -1186,7 +1168,7 @@
           <a:p>
             <a:fld id="{0A05703A-7669-4FEA-9056-25299B4D29D4}" type="datetime1">
               <a:rPr lang="en-US" smtClean="0"/>
-              <a:t>11/29/2015</a:t>
+              <a:t>11/12/2016</a:t>
             </a:fld>
             <a:endParaRPr lang="en-US"/>
           </a:p>
@@ -1289,10 +1271,9 @@
           </a:lstStyle>
           <a:p>
             <a:r>
-              <a:rPr lang="en-US" smtClean="0"/>
+              <a:rPr lang="en-US"/>
               <a:t>Click to edit Master title style</a:t>
             </a:r>
-            <a:endParaRPr lang="en-US"/>
           </a:p>
         </p:txBody>
       </p:sp>
@@ -1346,38 +1327,37 @@
           <a:p>
             <a:pPr lvl="0"/>
             <a:r>
-              <a:rPr lang="en-US" smtClean="0"/>
+              <a:rPr lang="en-US"/>
               <a:t>Click to edit Master text styles</a:t>
             </a:r>
           </a:p>
           <a:p>
             <a:pPr lvl="1"/>
             <a:r>
-              <a:rPr lang="en-US" smtClean="0"/>
+              <a:rPr lang="en-US"/>
               <a:t>Second level</a:t>
             </a:r>
           </a:p>
           <a:p>
             <a:pPr lvl="2"/>
             <a:r>
-              <a:rPr lang="en-US" smtClean="0"/>
+              <a:rPr lang="en-US"/>
               <a:t>Third level</a:t>
             </a:r>
           </a:p>
           <a:p>
             <a:pPr lvl="3"/>
             <a:r>
-              <a:rPr lang="en-US" smtClean="0"/>
+              <a:rPr lang="en-US"/>
               <a:t>Fourth level</a:t>
             </a:r>
           </a:p>
           <a:p>
             <a:pPr lvl="4"/>
             <a:r>
-              <a:rPr lang="en-US" smtClean="0"/>
+              <a:rPr lang="en-US"/>
               <a:t>Fifth level</a:t>
             </a:r>
-            <a:endParaRPr lang="en-US"/>
           </a:p>
         </p:txBody>
       </p:sp>
@@ -1440,7 +1420,7 @@
           <a:p>
             <a:pPr lvl="0"/>
             <a:r>
-              <a:rPr lang="en-US" smtClean="0"/>
+              <a:rPr lang="en-US"/>
               <a:t>Click to edit Master text styles</a:t>
             </a:r>
           </a:p>
@@ -1463,7 +1443,7 @@
           <a:p>
             <a:fld id="{6E5077B5-BB57-49DB-88CA-226A139E5C01}" type="datetime1">
               <a:rPr lang="en-US" smtClean="0"/>
-              <a:t>11/29/2015</a:t>
+              <a:t>11/12/2016</a:t>
             </a:fld>
             <a:endParaRPr lang="en-US"/>
           </a:p>
@@ -1566,10 +1546,9 @@
           </a:lstStyle>
           <a:p>
             <a:r>
-              <a:rPr lang="en-US" smtClean="0"/>
+              <a:rPr lang="en-US"/>
               <a:t>Click to edit Master title style</a:t>
             </a:r>
-            <a:endParaRPr lang="en-US"/>
           </a:p>
         </p:txBody>
       </p:sp>
@@ -1693,7 +1672,7 @@
           <a:p>
             <a:pPr lvl="0"/>
             <a:r>
-              <a:rPr lang="en-US" smtClean="0"/>
+              <a:rPr lang="en-US"/>
               <a:t>Click to edit Master text styles</a:t>
             </a:r>
           </a:p>
@@ -1716,7 +1695,7 @@
           <a:p>
             <a:fld id="{C48D9447-CBD6-49A1-89FD-8512A8CF8999}" type="datetime1">
               <a:rPr lang="en-US" smtClean="0"/>
-              <a:t>11/29/2015</a:t>
+              <a:t>11/12/2016</a:t>
             </a:fld>
             <a:endParaRPr lang="en-US"/>
           </a:p>
@@ -1810,10 +1789,9 @@
           <a:lstStyle/>
           <a:p>
             <a:r>
-              <a:rPr lang="en-US" smtClean="0"/>
+              <a:rPr lang="en-US"/>
               <a:t>Click to edit Master title style</a:t>
             </a:r>
-            <a:endParaRPr lang="en-US"/>
           </a:p>
         </p:txBody>
       </p:sp>
@@ -1834,38 +1812,37 @@
           <a:p>
             <a:pPr lvl="0"/>
             <a:r>
-              <a:rPr lang="en-US" smtClean="0"/>
+              <a:rPr lang="en-US"/>
               <a:t>Click to edit Master text styles</a:t>
             </a:r>
           </a:p>
           <a:p>
             <a:pPr lvl="1"/>
             <a:r>
-              <a:rPr lang="en-US" smtClean="0"/>
+              <a:rPr lang="en-US"/>
               <a:t>Second level</a:t>
             </a:r>
           </a:p>
           <a:p>
             <a:pPr lvl="2"/>
             <a:r>
-              <a:rPr lang="en-US" smtClean="0"/>
+              <a:rPr lang="en-US"/>
               <a:t>Third level</a:t>
             </a:r>
           </a:p>
           <a:p>
             <a:pPr lvl="3"/>
             <a:r>
-              <a:rPr lang="en-US" smtClean="0"/>
+              <a:rPr lang="en-US"/>
               <a:t>Fourth level</a:t>
             </a:r>
           </a:p>
           <a:p>
             <a:pPr lvl="4"/>
             <a:r>
-              <a:rPr lang="en-US" smtClean="0"/>
+              <a:rPr lang="en-US"/>
               <a:t>Fifth level</a:t>
             </a:r>
-            <a:endParaRPr lang="en-US"/>
           </a:p>
         </p:txBody>
       </p:sp>
@@ -1886,7 +1863,7 @@
           <a:p>
             <a:fld id="{A3639A2A-823D-48B7-9ACE-7FAF42870BA9}" type="datetime1">
               <a:rPr lang="en-US" smtClean="0"/>
-              <a:t>11/29/2015</a:t>
+              <a:t>11/12/2016</a:t>
             </a:fld>
             <a:endParaRPr lang="en-US"/>
           </a:p>
@@ -1985,10 +1962,9 @@
           <a:lstStyle/>
           <a:p>
             <a:r>
-              <a:rPr lang="en-US" smtClean="0"/>
+              <a:rPr lang="en-US"/>
               <a:t>Click to edit Master title style</a:t>
             </a:r>
-            <a:endParaRPr lang="en-US"/>
           </a:p>
         </p:txBody>
       </p:sp>
@@ -2014,38 +1990,37 @@
           <a:p>
             <a:pPr lvl="0"/>
             <a:r>
-              <a:rPr lang="en-US" smtClean="0"/>
+              <a:rPr lang="en-US"/>
               <a:t>Click to edit Master text styles</a:t>
             </a:r>
           </a:p>
           <a:p>
             <a:pPr lvl="1"/>
             <a:r>
-              <a:rPr lang="en-US" smtClean="0"/>
+              <a:rPr lang="en-US"/>
               <a:t>Second level</a:t>
             </a:r>
           </a:p>
           <a:p>
             <a:pPr lvl="2"/>
             <a:r>
-              <a:rPr lang="en-US" smtClean="0"/>
+              <a:rPr lang="en-US"/>
               <a:t>Third level</a:t>
             </a:r>
           </a:p>
           <a:p>
             <a:pPr lvl="3"/>
             <a:r>
-              <a:rPr lang="en-US" smtClean="0"/>
+              <a:rPr lang="en-US"/>
               <a:t>Fourth level</a:t>
             </a:r>
           </a:p>
           <a:p>
             <a:pPr lvl="4"/>
             <a:r>
-              <a:rPr lang="en-US" smtClean="0"/>
+              <a:rPr lang="en-US"/>
               <a:t>Fifth level</a:t>
             </a:r>
-            <a:endParaRPr lang="en-US"/>
           </a:p>
         </p:txBody>
       </p:sp>
@@ -2066,7 +2041,7 @@
           <a:p>
             <a:fld id="{ED1B6996-82E9-463C-972C-7B56056E426C}" type="datetime1">
               <a:rPr lang="en-US" smtClean="0"/>
-              <a:t>11/29/2015</a:t>
+              <a:t>11/12/2016</a:t>
             </a:fld>
             <a:endParaRPr lang="en-US"/>
           </a:p>
@@ -2124,13 +2099,6 @@
   <p:clrMapOvr>
     <a:masterClrMapping/>
   </p:clrMapOvr>
-  <p:timing>
-    <p:tnLst>
-      <p:par>
-        <p:cTn id="1" dur="indefinite" restart="never" nodeType="tmRoot"/>
-      </p:par>
-    </p:tnLst>
-  </p:timing>
 </p:sldLayout>
 </file>
 
@@ -2173,10 +2141,9 @@
           <a:lstStyle/>
           <a:p>
             <a:r>
-              <a:rPr lang="en-US" dirty="0" smtClean="0"/>
+              <a:rPr lang="en-US" dirty="0"/>
               <a:t>Click to edit Master title style</a:t>
             </a:r>
-            <a:endParaRPr lang="en-US" dirty="0"/>
           </a:p>
         </p:txBody>
       </p:sp>
@@ -2197,38 +2164,37 @@
           <a:p>
             <a:pPr lvl="0"/>
             <a:r>
-              <a:rPr lang="en-US" smtClean="0"/>
+              <a:rPr lang="en-US"/>
               <a:t>Click to edit Master text styles</a:t>
             </a:r>
           </a:p>
           <a:p>
             <a:pPr lvl="1"/>
             <a:r>
-              <a:rPr lang="en-US" smtClean="0"/>
+              <a:rPr lang="en-US"/>
               <a:t>Second level</a:t>
             </a:r>
           </a:p>
           <a:p>
             <a:pPr lvl="2"/>
             <a:r>
-              <a:rPr lang="en-US" smtClean="0"/>
+              <a:rPr lang="en-US"/>
               <a:t>Third level</a:t>
             </a:r>
           </a:p>
           <a:p>
             <a:pPr lvl="3"/>
             <a:r>
-              <a:rPr lang="en-US" smtClean="0"/>
+              <a:rPr lang="en-US"/>
               <a:t>Fourth level</a:t>
             </a:r>
           </a:p>
           <a:p>
             <a:pPr lvl="4"/>
             <a:r>
-              <a:rPr lang="en-US" smtClean="0"/>
+              <a:rPr lang="en-US"/>
               <a:t>Fifth level</a:t>
             </a:r>
-            <a:endParaRPr lang="en-US"/>
           </a:p>
         </p:txBody>
       </p:sp>
@@ -2249,7 +2215,7 @@
           <a:p>
             <a:fld id="{E22ED4DA-448D-4BB1-B935-CC112220207B}" type="datetime1">
               <a:rPr lang="en-US" smtClean="0"/>
-              <a:t>11/29/2015</a:t>
+              <a:t>11/12/2016</a:t>
             </a:fld>
             <a:endParaRPr lang="en-US"/>
           </a:p>
@@ -2307,13 +2273,6 @@
   <p:clrMapOvr>
     <a:masterClrMapping/>
   </p:clrMapOvr>
-  <p:timing>
-    <p:tnLst>
-      <p:par>
-        <p:cTn id="1" dur="indefinite" restart="never" nodeType="tmRoot"/>
-      </p:par>
-    </p:tnLst>
-  </p:timing>
 </p:sldLayout>
 </file>
 
@@ -2350,10 +2309,9 @@
           <a:lstStyle/>
           <a:p>
             <a:r>
-              <a:rPr lang="en-US" smtClean="0"/>
+              <a:rPr lang="en-US"/>
               <a:t>Click to edit Master title style</a:t>
             </a:r>
-            <a:endParaRPr lang="en-US"/>
           </a:p>
         </p:txBody>
       </p:sp>
@@ -2379,38 +2337,37 @@
           <a:p>
             <a:pPr lvl="0"/>
             <a:r>
-              <a:rPr lang="en-US" dirty="0" smtClean="0"/>
+              <a:rPr lang="en-US" dirty="0"/>
               <a:t>Click to edit Master text styles</a:t>
             </a:r>
           </a:p>
           <a:p>
             <a:pPr lvl="1"/>
             <a:r>
-              <a:rPr lang="en-US" dirty="0" smtClean="0"/>
+              <a:rPr lang="en-US" dirty="0"/>
               <a:t>Second level</a:t>
             </a:r>
           </a:p>
           <a:p>
             <a:pPr lvl="2"/>
             <a:r>
-              <a:rPr lang="en-US" dirty="0" smtClean="0"/>
+              <a:rPr lang="en-US" dirty="0"/>
               <a:t>Third level</a:t>
             </a:r>
           </a:p>
           <a:p>
             <a:pPr lvl="3"/>
             <a:r>
-              <a:rPr lang="en-US" dirty="0" smtClean="0"/>
+              <a:rPr lang="en-US" dirty="0"/>
               <a:t>Fourth level</a:t>
             </a:r>
           </a:p>
           <a:p>
             <a:pPr lvl="4"/>
             <a:r>
-              <a:rPr lang="en-US" dirty="0" smtClean="0"/>
+              <a:rPr lang="en-US" dirty="0"/>
               <a:t>Fifth level</a:t>
             </a:r>
-            <a:endParaRPr lang="en-US" dirty="0"/>
           </a:p>
         </p:txBody>
       </p:sp>
@@ -2431,7 +2388,7 @@
           <a:p>
             <a:fld id="{E22ED4DA-448D-4BB1-B935-CC112220207B}" type="datetime1">
               <a:rPr lang="en-US" smtClean="0"/>
-              <a:t>11/29/2015</a:t>
+              <a:t>11/12/2016</a:t>
             </a:fld>
             <a:endParaRPr lang="en-US"/>
           </a:p>
@@ -2521,7 +2478,7 @@
           <a:lstStyle/>
           <a:p>
             <a:pPr algn="ctr"/>
-            <a:endParaRPr lang="en-US" dirty="0" smtClean="0">
+            <a:endParaRPr lang="en-US" dirty="0">
               <a:solidFill>
                 <a:schemeClr val="tx1"/>
               </a:solidFill>
@@ -2552,11 +2509,11 @@
           <a:lstStyle/>
           <a:p>
             <a:r>
-              <a:rPr lang="en-US" dirty="0" smtClean="0"/>
+              <a:rPr lang="en-US" dirty="0"/>
               <a:t>Resize video to this</a:t>
             </a:r>
             <a:r>
-              <a:rPr lang="en-US" baseline="0" dirty="0" smtClean="0"/>
+              <a:rPr lang="en-US" baseline="0" dirty="0"/>
               <a:t> box.</a:t>
             </a:r>
             <a:endParaRPr lang="en-US" dirty="0"/>
@@ -2573,13 +2530,6 @@
   <p:clrMapOvr>
     <a:masterClrMapping/>
   </p:clrMapOvr>
-  <p:timing>
-    <p:tnLst>
-      <p:par>
-        <p:cTn id="1" dur="indefinite" restart="never" nodeType="tmRoot"/>
-      </p:par>
-    </p:tnLst>
-  </p:timing>
 </p:sldLayout>
 </file>
 
@@ -2616,10 +2566,9 @@
           <a:lstStyle/>
           <a:p>
             <a:r>
-              <a:rPr lang="en-US" smtClean="0"/>
+              <a:rPr lang="en-US"/>
               <a:t>Click to edit Master title style</a:t>
             </a:r>
-            <a:endParaRPr lang="en-US"/>
           </a:p>
         </p:txBody>
       </p:sp>
@@ -2648,38 +2597,37 @@
           <a:p>
             <a:pPr lvl="0"/>
             <a:r>
-              <a:rPr lang="en-US" dirty="0" smtClean="0"/>
+              <a:rPr lang="en-US" dirty="0"/>
               <a:t>Click to edit Master text styles</a:t>
             </a:r>
           </a:p>
           <a:p>
             <a:pPr lvl="1"/>
             <a:r>
-              <a:rPr lang="en-US" dirty="0" smtClean="0"/>
+              <a:rPr lang="en-US" dirty="0"/>
               <a:t>Second level</a:t>
             </a:r>
           </a:p>
           <a:p>
             <a:pPr lvl="2"/>
             <a:r>
-              <a:rPr lang="en-US" dirty="0" smtClean="0"/>
+              <a:rPr lang="en-US" dirty="0"/>
               <a:t>Third level</a:t>
             </a:r>
           </a:p>
           <a:p>
             <a:pPr lvl="3"/>
             <a:r>
-              <a:rPr lang="en-US" dirty="0" smtClean="0"/>
+              <a:rPr lang="en-US" dirty="0"/>
               <a:t>Fourth level</a:t>
             </a:r>
           </a:p>
           <a:p>
             <a:pPr lvl="4"/>
             <a:r>
-              <a:rPr lang="en-US" dirty="0" smtClean="0"/>
+              <a:rPr lang="en-US" dirty="0"/>
               <a:t>Fifth level</a:t>
             </a:r>
-            <a:endParaRPr lang="en-US" dirty="0"/>
           </a:p>
         </p:txBody>
       </p:sp>
@@ -2700,7 +2648,7 @@
           <a:p>
             <a:fld id="{FF5D65A6-AB94-4435-B0B7-3743215FA46C}" type="datetime1">
               <a:rPr lang="en-US" smtClean="0"/>
-              <a:t>11/29/2015</a:t>
+              <a:t>11/12/2016</a:t>
             </a:fld>
             <a:endParaRPr lang="en-US"/>
           </a:p>
@@ -2758,13 +2706,6 @@
   <p:clrMapOvr>
     <a:masterClrMapping/>
   </p:clrMapOvr>
-  <p:timing>
-    <p:tnLst>
-      <p:par>
-        <p:cTn id="1" dur="indefinite" restart="never" nodeType="tmRoot"/>
-      </p:par>
-    </p:tnLst>
-  </p:timing>
 </p:sldLayout>
 </file>
 
@@ -2801,10 +2742,9 @@
           <a:lstStyle/>
           <a:p>
             <a:r>
-              <a:rPr lang="en-US" smtClean="0"/>
+              <a:rPr lang="en-US"/>
               <a:t>Click to edit Master title style</a:t>
             </a:r>
-            <a:endParaRPr lang="en-US"/>
           </a:p>
         </p:txBody>
       </p:sp>
@@ -2862,38 +2802,37 @@
           <a:p>
             <a:pPr lvl="0"/>
             <a:r>
-              <a:rPr lang="en-US" dirty="0" smtClean="0"/>
+              <a:rPr lang="en-US" dirty="0"/>
               <a:t>Click to edit Master text styles</a:t>
             </a:r>
           </a:p>
           <a:p>
             <a:pPr lvl="1"/>
             <a:r>
-              <a:rPr lang="en-US" dirty="0" smtClean="0"/>
+              <a:rPr lang="en-US" dirty="0"/>
               <a:t>Second level</a:t>
             </a:r>
           </a:p>
           <a:p>
             <a:pPr lvl="2"/>
             <a:r>
-              <a:rPr lang="en-US" dirty="0" smtClean="0"/>
+              <a:rPr lang="en-US" dirty="0"/>
               <a:t>Third level</a:t>
             </a:r>
           </a:p>
           <a:p>
             <a:pPr lvl="3"/>
             <a:r>
-              <a:rPr lang="en-US" dirty="0" smtClean="0"/>
+              <a:rPr lang="en-US" dirty="0"/>
               <a:t>Fourth level</a:t>
             </a:r>
           </a:p>
           <a:p>
             <a:pPr lvl="4"/>
             <a:r>
-              <a:rPr lang="en-US" dirty="0" smtClean="0"/>
+              <a:rPr lang="en-US" dirty="0"/>
               <a:t>Fifth level</a:t>
             </a:r>
-            <a:endParaRPr lang="en-US" dirty="0"/>
           </a:p>
         </p:txBody>
       </p:sp>
@@ -2951,38 +2890,37 @@
           <a:p>
             <a:pPr lvl="0"/>
             <a:r>
-              <a:rPr lang="en-US" dirty="0" smtClean="0"/>
+              <a:rPr lang="en-US" dirty="0"/>
               <a:t>Click to edit Master text styles</a:t>
             </a:r>
           </a:p>
           <a:p>
             <a:pPr lvl="1"/>
             <a:r>
-              <a:rPr lang="en-US" dirty="0" smtClean="0"/>
+              <a:rPr lang="en-US" dirty="0"/>
               <a:t>Second level</a:t>
             </a:r>
           </a:p>
           <a:p>
             <a:pPr lvl="2"/>
             <a:r>
-              <a:rPr lang="en-US" dirty="0" smtClean="0"/>
+              <a:rPr lang="en-US" dirty="0"/>
               <a:t>Third level</a:t>
             </a:r>
           </a:p>
           <a:p>
             <a:pPr lvl="3"/>
             <a:r>
-              <a:rPr lang="en-US" dirty="0" smtClean="0"/>
+              <a:rPr lang="en-US" dirty="0"/>
               <a:t>Fourth level</a:t>
             </a:r>
           </a:p>
           <a:p>
             <a:pPr lvl="4"/>
             <a:r>
-              <a:rPr lang="en-US" dirty="0" smtClean="0"/>
+              <a:rPr lang="en-US" dirty="0"/>
               <a:t>Fifth level</a:t>
             </a:r>
-            <a:endParaRPr lang="en-US" dirty="0"/>
           </a:p>
         </p:txBody>
       </p:sp>
@@ -3003,7 +2941,7 @@
           <a:p>
             <a:fld id="{5D1846AD-9252-4647-9435-4C2AC365653A}" type="datetime1">
               <a:rPr lang="en-US" smtClean="0"/>
-              <a:t>11/29/2015</a:t>
+              <a:t>11/12/2016</a:t>
             </a:fld>
             <a:endParaRPr lang="en-US"/>
           </a:p>
@@ -3097,10 +3035,9 @@
           <a:lstStyle/>
           <a:p>
             <a:r>
-              <a:rPr lang="en-US" smtClean="0"/>
+              <a:rPr lang="en-US"/>
               <a:t>Click to edit Master title style</a:t>
             </a:r>
-            <a:endParaRPr lang="en-US"/>
           </a:p>
         </p:txBody>
       </p:sp>
@@ -3129,38 +3066,37 @@
           <a:p>
             <a:pPr lvl="0"/>
             <a:r>
-              <a:rPr lang="en-US" dirty="0" smtClean="0"/>
+              <a:rPr lang="en-US" dirty="0"/>
               <a:t>Click to edit Master text styles</a:t>
             </a:r>
           </a:p>
           <a:p>
             <a:pPr lvl="1"/>
             <a:r>
-              <a:rPr lang="en-US" dirty="0" smtClean="0"/>
+              <a:rPr lang="en-US" dirty="0"/>
               <a:t>Second level</a:t>
             </a:r>
           </a:p>
           <a:p>
             <a:pPr lvl="2"/>
             <a:r>
-              <a:rPr lang="en-US" dirty="0" smtClean="0"/>
+              <a:rPr lang="en-US" dirty="0"/>
               <a:t>Third level</a:t>
             </a:r>
           </a:p>
           <a:p>
             <a:pPr lvl="3"/>
             <a:r>
-              <a:rPr lang="en-US" dirty="0" smtClean="0"/>
+              <a:rPr lang="en-US" dirty="0"/>
               <a:t>Fourth level</a:t>
             </a:r>
           </a:p>
           <a:p>
             <a:pPr lvl="4"/>
             <a:r>
-              <a:rPr lang="en-US" dirty="0" smtClean="0"/>
+              <a:rPr lang="en-US" dirty="0"/>
               <a:t>Fifth level</a:t>
             </a:r>
-            <a:endParaRPr lang="en-US" dirty="0"/>
           </a:p>
         </p:txBody>
       </p:sp>
@@ -3181,7 +3117,7 @@
           <a:p>
             <a:fld id="{FF5D65A6-AB94-4435-B0B7-3743215FA46C}" type="datetime1">
               <a:rPr lang="en-US" smtClean="0"/>
-              <a:t>11/29/2015</a:t>
+              <a:t>11/12/2016</a:t>
             </a:fld>
             <a:endParaRPr lang="en-US"/>
           </a:p>
@@ -3288,13 +3224,6 @@
   <p:clrMapOvr>
     <a:masterClrMapping/>
   </p:clrMapOvr>
-  <p:timing>
-    <p:tnLst>
-      <p:par>
-        <p:cTn id="1" dur="indefinite" restart="never" nodeType="tmRoot"/>
-      </p:par>
-    </p:tnLst>
-  </p:timing>
 </p:sldLayout>
 </file>
 
@@ -3340,10 +3269,9 @@
           </a:lstStyle>
           <a:p>
             <a:r>
-              <a:rPr lang="en-US" smtClean="0"/>
+              <a:rPr lang="en-US"/>
               <a:t>Click to edit Master title style</a:t>
             </a:r>
-            <a:endParaRPr lang="en-US"/>
           </a:p>
         </p:txBody>
       </p:sp>
@@ -3460,7 +3388,7 @@
           <a:p>
             <a:pPr lvl="0"/>
             <a:r>
-              <a:rPr lang="en-US" smtClean="0"/>
+              <a:rPr lang="en-US"/>
               <a:t>Click to edit Master text styles</a:t>
             </a:r>
           </a:p>
@@ -3483,7 +3411,7 @@
           <a:p>
             <a:fld id="{7C193DC4-6EF0-48C9-B29C-616106A645E1}" type="datetime1">
               <a:rPr lang="en-US" smtClean="0"/>
-              <a:t>11/29/2015</a:t>
+              <a:t>11/12/2016</a:t>
             </a:fld>
             <a:endParaRPr lang="en-US"/>
           </a:p>
@@ -3577,10 +3505,9 @@
           <a:lstStyle/>
           <a:p>
             <a:r>
-              <a:rPr lang="en-US" smtClean="0"/>
+              <a:rPr lang="en-US"/>
               <a:t>Click to edit Master title style</a:t>
             </a:r>
-            <a:endParaRPr lang="en-US"/>
           </a:p>
         </p:txBody>
       </p:sp>
@@ -3634,38 +3561,37 @@
           <a:p>
             <a:pPr lvl="0"/>
             <a:r>
-              <a:rPr lang="en-US" smtClean="0"/>
+              <a:rPr lang="en-US"/>
               <a:t>Click to edit Master text styles</a:t>
             </a:r>
           </a:p>
           <a:p>
             <a:pPr lvl="1"/>
             <a:r>
-              <a:rPr lang="en-US" smtClean="0"/>
+              <a:rPr lang="en-US"/>
               <a:t>Second level</a:t>
             </a:r>
           </a:p>
           <a:p>
             <a:pPr lvl="2"/>
             <a:r>
-              <a:rPr lang="en-US" smtClean="0"/>
+              <a:rPr lang="en-US"/>
               <a:t>Third level</a:t>
             </a:r>
           </a:p>
           <a:p>
             <a:pPr lvl="3"/>
             <a:r>
-              <a:rPr lang="en-US" smtClean="0"/>
+              <a:rPr lang="en-US"/>
               <a:t>Fourth level</a:t>
             </a:r>
           </a:p>
           <a:p>
             <a:pPr lvl="4"/>
             <a:r>
-              <a:rPr lang="en-US" smtClean="0"/>
+              <a:rPr lang="en-US"/>
               <a:t>Fifth level</a:t>
             </a:r>
-            <a:endParaRPr lang="en-US"/>
           </a:p>
         </p:txBody>
       </p:sp>
@@ -3719,38 +3645,37 @@
           <a:p>
             <a:pPr lvl="0"/>
             <a:r>
-              <a:rPr lang="en-US" smtClean="0"/>
+              <a:rPr lang="en-US"/>
               <a:t>Click to edit Master text styles</a:t>
             </a:r>
           </a:p>
           <a:p>
             <a:pPr lvl="1"/>
             <a:r>
-              <a:rPr lang="en-US" smtClean="0"/>
+              <a:rPr lang="en-US"/>
               <a:t>Second level</a:t>
             </a:r>
           </a:p>
           <a:p>
             <a:pPr lvl="2"/>
             <a:r>
-              <a:rPr lang="en-US" smtClean="0"/>
+              <a:rPr lang="en-US"/>
               <a:t>Third level</a:t>
             </a:r>
           </a:p>
           <a:p>
             <a:pPr lvl="3"/>
             <a:r>
-              <a:rPr lang="en-US" smtClean="0"/>
+              <a:rPr lang="en-US"/>
               <a:t>Fourth level</a:t>
             </a:r>
           </a:p>
           <a:p>
             <a:pPr lvl="4"/>
             <a:r>
-              <a:rPr lang="en-US" smtClean="0"/>
+              <a:rPr lang="en-US"/>
               <a:t>Fifth level</a:t>
             </a:r>
-            <a:endParaRPr lang="en-US"/>
           </a:p>
         </p:txBody>
       </p:sp>
@@ -3771,7 +3696,7 @@
           <a:p>
             <a:fld id="{5D1846AD-9252-4647-9435-4C2AC365653A}" type="datetime1">
               <a:rPr lang="en-US" smtClean="0"/>
-              <a:t>11/29/2015</a:t>
+              <a:t>11/12/2016</a:t>
             </a:fld>
             <a:endParaRPr lang="en-US"/>
           </a:p>
@@ -3869,10 +3794,9 @@
           </a:lstStyle>
           <a:p>
             <a:r>
-              <a:rPr lang="en-US" smtClean="0"/>
+              <a:rPr lang="en-US"/>
               <a:t>Click to edit Master title style</a:t>
             </a:r>
-            <a:endParaRPr lang="en-US"/>
           </a:p>
         </p:txBody>
       </p:sp>
@@ -3935,7 +3859,7 @@
           <a:p>
             <a:pPr lvl="0"/>
             <a:r>
-              <a:rPr lang="en-US" smtClean="0"/>
+              <a:rPr lang="en-US"/>
               <a:t>Click to edit Master text styles</a:t>
             </a:r>
           </a:p>
@@ -3991,38 +3915,37 @@
           <a:p>
             <a:pPr lvl="0"/>
             <a:r>
-              <a:rPr lang="en-US" smtClean="0"/>
+              <a:rPr lang="en-US"/>
               <a:t>Click to edit Master text styles</a:t>
             </a:r>
           </a:p>
           <a:p>
             <a:pPr lvl="1"/>
             <a:r>
-              <a:rPr lang="en-US" smtClean="0"/>
+              <a:rPr lang="en-US"/>
               <a:t>Second level</a:t>
             </a:r>
           </a:p>
           <a:p>
             <a:pPr lvl="2"/>
             <a:r>
-              <a:rPr lang="en-US" smtClean="0"/>
+              <a:rPr lang="en-US"/>
               <a:t>Third level</a:t>
             </a:r>
           </a:p>
           <a:p>
             <a:pPr lvl="3"/>
             <a:r>
-              <a:rPr lang="en-US" smtClean="0"/>
+              <a:rPr lang="en-US"/>
               <a:t>Fourth level</a:t>
             </a:r>
           </a:p>
           <a:p>
             <a:pPr lvl="4"/>
             <a:r>
-              <a:rPr lang="en-US" smtClean="0"/>
+              <a:rPr lang="en-US"/>
               <a:t>Fifth level</a:t>
             </a:r>
-            <a:endParaRPr lang="en-US"/>
           </a:p>
         </p:txBody>
       </p:sp>
@@ -4085,7 +4008,7 @@
           <a:p>
             <a:pPr lvl="0"/>
             <a:r>
-              <a:rPr lang="en-US" smtClean="0"/>
+              <a:rPr lang="en-US"/>
               <a:t>Click to edit Master text styles</a:t>
             </a:r>
           </a:p>
@@ -4141,38 +4064,37 @@
           <a:p>
             <a:pPr lvl="0"/>
             <a:r>
-              <a:rPr lang="en-US" smtClean="0"/>
+              <a:rPr lang="en-US"/>
               <a:t>Click to edit Master text styles</a:t>
             </a:r>
           </a:p>
           <a:p>
             <a:pPr lvl="1"/>
             <a:r>
-              <a:rPr lang="en-US" smtClean="0"/>
+              <a:rPr lang="en-US"/>
               <a:t>Second level</a:t>
             </a:r>
           </a:p>
           <a:p>
             <a:pPr lvl="2"/>
             <a:r>
-              <a:rPr lang="en-US" smtClean="0"/>
+              <a:rPr lang="en-US"/>
               <a:t>Third level</a:t>
             </a:r>
           </a:p>
           <a:p>
             <a:pPr lvl="3"/>
             <a:r>
-              <a:rPr lang="en-US" smtClean="0"/>
+              <a:rPr lang="en-US"/>
               <a:t>Fourth level</a:t>
             </a:r>
           </a:p>
           <a:p>
             <a:pPr lvl="4"/>
             <a:r>
-              <a:rPr lang="en-US" smtClean="0"/>
+              <a:rPr lang="en-US"/>
               <a:t>Fifth level</a:t>
             </a:r>
-            <a:endParaRPr lang="en-US"/>
           </a:p>
         </p:txBody>
       </p:sp>
@@ -4193,7 +4115,7 @@
           <a:p>
             <a:fld id="{CE56DC10-3561-4063-A6AF-C1CC7A41040A}" type="datetime1">
               <a:rPr lang="en-US" smtClean="0"/>
-              <a:t>11/29/2015</a:t>
+              <a:t>11/12/2016</a:t>
             </a:fld>
             <a:endParaRPr lang="en-US"/>
           </a:p>
@@ -4314,10 +4236,9 @@
           <a:lstStyle/>
           <a:p>
             <a:r>
-              <a:rPr lang="en-US" smtClean="0"/>
+              <a:rPr lang="en-US"/>
               <a:t>Click to edit Master title style</a:t>
             </a:r>
-            <a:endParaRPr lang="en-US"/>
           </a:p>
         </p:txBody>
       </p:sp>
@@ -4348,38 +4269,37 @@
           <a:p>
             <a:pPr lvl="0"/>
             <a:r>
-              <a:rPr lang="en-US" smtClean="0"/>
+              <a:rPr lang="en-US"/>
               <a:t>Click to edit Master text styles</a:t>
             </a:r>
           </a:p>
           <a:p>
             <a:pPr lvl="1"/>
             <a:r>
-              <a:rPr lang="en-US" smtClean="0"/>
+              <a:rPr lang="en-US"/>
               <a:t>Second level</a:t>
             </a:r>
           </a:p>
           <a:p>
             <a:pPr lvl="2"/>
             <a:r>
-              <a:rPr lang="en-US" smtClean="0"/>
+              <a:rPr lang="en-US"/>
               <a:t>Third level</a:t>
             </a:r>
           </a:p>
           <a:p>
             <a:pPr lvl="3"/>
             <a:r>
-              <a:rPr lang="en-US" smtClean="0"/>
+              <a:rPr lang="en-US"/>
               <a:t>Fourth level</a:t>
             </a:r>
           </a:p>
           <a:p>
             <a:pPr lvl="4"/>
             <a:r>
-              <a:rPr lang="en-US" smtClean="0"/>
+              <a:rPr lang="en-US"/>
               <a:t>Fifth level</a:t>
             </a:r>
-            <a:endParaRPr lang="en-US"/>
           </a:p>
         </p:txBody>
       </p:sp>
@@ -4418,7 +4338,7 @@
           <a:p>
             <a:fld id="{02B3F677-983B-48DB-ADFD-63FE6CBC7FB2}" type="datetime1">
               <a:rPr lang="en-US" smtClean="0"/>
-              <a:t>11/29/2015</a:t>
+              <a:t>11/12/2016</a:t>
             </a:fld>
             <a:endParaRPr lang="en-US"/>
           </a:p>
@@ -4527,13 +4447,6 @@
     <p:sldLayoutId id="2147483675" r:id="rId14"/>
     <p:sldLayoutId id="2147483676" r:id="rId15"/>
   </p:sldLayoutIdLst>
-  <p:timing>
-    <p:tnLst>
-      <p:par>
-        <p:cTn id="1" dur="indefinite" restart="never" nodeType="tmRoot"/>
-      </p:par>
-    </p:tnLst>
-  </p:timing>
   <p:hf hdr="0" ftr="0" dt="0"/>
   <p:txStyles>
     <p:titleStyle>
@@ -4821,10 +4734,9 @@
           <a:lstStyle/>
           <a:p>
             <a:r>
-              <a:rPr lang="en-US" dirty="0" smtClean="0"/>
+              <a:rPr lang="en-US" dirty="0"/>
               <a:t>Basics of Inheritance</a:t>
             </a:r>
-            <a:endParaRPr lang="en-US" dirty="0"/>
           </a:p>
         </p:txBody>
       </p:sp>
@@ -4865,13 +4777,8 @@
           <a:p>
             <a:r>
               <a:rPr lang="en-US" dirty="0"/>
-              <a:t>Lesson </a:t>
-            </a:r>
-            <a:r>
-              <a:rPr lang="en-US" dirty="0" smtClean="0"/>
-              <a:t>11.1 </a:t>
-            </a:r>
-            <a:endParaRPr lang="en-US" dirty="0"/>
+              <a:t>Lesson 11.1 </a:t>
+            </a:r>
           </a:p>
           <a:p>
             <a:endParaRPr lang="en-US" dirty="0"/>
@@ -4970,27 +4877,13 @@
             <a:p>
               <a:r>
                 <a:rPr lang="en-US" sz="1000" dirty="0"/>
-                <a:t>© Mitchell Wand, </a:t>
-              </a:r>
-              <a:r>
-                <a:rPr lang="en-US" sz="1000" dirty="0" smtClean="0"/>
-                <a:t>2012-2015</a:t>
+                <a:t>© Mitchell Wand, 2012-2015</a:t>
               </a:r>
             </a:p>
             <a:p>
               <a:r>
-                <a:rPr lang="en-US" sz="1000" dirty="0" smtClean="0"/>
+                <a:rPr lang="en-US" sz="1000" dirty="0"/>
                 <a:t>This work is licensed under a </a:t>
-              </a:r>
-              <a:r>
-                <a:rPr lang="en-US" altLang="en-US" sz="1000" dirty="0" smtClean="0">
-                  <a:solidFill>
-                    <a:srgbClr val="4374B7"/>
-                  </a:solidFill>
-                  <a:latin typeface="Helvetica Neue"/>
-                  <a:hlinkClick r:id="rId4"/>
-                </a:rPr>
-                <a:t>Creative </a:t>
               </a:r>
               <a:r>
                 <a:rPr lang="en-US" altLang="en-US" sz="1000" dirty="0">
@@ -5000,7 +4893,7 @@
                   <a:latin typeface="Helvetica Neue"/>
                   <a:hlinkClick r:id="rId4"/>
                 </a:rPr>
-                <a:t>Commons Attribution-</a:t>
+                <a:t>Creative Commons Attribution-</a:t>
               </a:r>
               <a:r>
                 <a:rPr lang="en-US" altLang="en-US" sz="1000" dirty="0" err="1">
@@ -5023,10 +4916,9 @@
                 <a:t> 4.0 International License</a:t>
               </a:r>
               <a:r>
-                <a:rPr lang="en-US" sz="1000" dirty="0" smtClean="0"/>
+                <a:rPr lang="en-US" sz="1000" dirty="0"/>
                 <a:t>.</a:t>
               </a:r>
-              <a:endParaRPr lang="en-US" sz="1000" dirty="0"/>
             </a:p>
           </p:txBody>
         </p:sp>
@@ -5036,13 +4928,6 @@
   <p:clrMapOvr>
     <a:masterClrMapping/>
   </p:clrMapOvr>
-  <p:timing>
-    <p:tnLst>
-      <p:par>
-        <p:cTn id="1" dur="indefinite" restart="never" nodeType="tmRoot"/>
-      </p:par>
-    </p:tnLst>
-  </p:timing>
 </p:sld>
 </file>
 
@@ -5079,10 +4964,9 @@
           <a:lstStyle/>
           <a:p>
             <a:r>
-              <a:rPr lang="en-US" dirty="0" smtClean="0"/>
+              <a:rPr lang="en-US" dirty="0"/>
               <a:t>How does inheritance work?</a:t>
             </a:r>
-            <a:endParaRPr lang="en-US" dirty="0"/>
           </a:p>
         </p:txBody>
       </p:sp>
@@ -5104,61 +4988,60 @@
           <a:lstStyle/>
           <a:p>
             <a:r>
-              <a:rPr lang="en-US" dirty="0" smtClean="0"/>
+              <a:rPr lang="en-US" dirty="0"/>
               <a:t>An object searches its inheritance chain for a suitable method.</a:t>
             </a:r>
           </a:p>
           <a:p>
             <a:r>
-              <a:rPr lang="en-US" dirty="0" smtClean="0"/>
+              <a:rPr lang="en-US" dirty="0"/>
               <a:t>For </a:t>
             </a:r>
             <a:r>
-              <a:rPr lang="en-US" dirty="0" err="1" smtClean="0"/>
+              <a:rPr lang="en-US" dirty="0" err="1"/>
               <a:t>FlashingBall</a:t>
             </a:r>
             <a:r>
-              <a:rPr lang="en-US" dirty="0" smtClean="0"/>
+              <a:rPr lang="en-US" dirty="0"/>
               <a:t>% we have</a:t>
             </a:r>
           </a:p>
           <a:p>
             <a:pPr lvl="1"/>
             <a:r>
-              <a:rPr lang="en-US" dirty="0" err="1" smtClean="0"/>
+              <a:rPr lang="en-US" dirty="0" err="1"/>
               <a:t>FlashingBall</a:t>
             </a:r>
             <a:r>
-              <a:rPr lang="en-US" dirty="0" smtClean="0"/>
+              <a:rPr lang="en-US" dirty="0"/>
               <a:t>% inherits from</a:t>
             </a:r>
           </a:p>
           <a:p>
             <a:pPr lvl="1"/>
             <a:r>
-              <a:rPr lang="en-US" dirty="0" smtClean="0"/>
+              <a:rPr lang="en-US" dirty="0"/>
               <a:t>Ball%, which inherits from</a:t>
             </a:r>
           </a:p>
           <a:p>
             <a:pPr lvl="1"/>
             <a:r>
-              <a:rPr lang="en-US" dirty="0" smtClean="0"/>
+              <a:rPr lang="en-US" dirty="0"/>
               <a:t>object%</a:t>
             </a:r>
           </a:p>
           <a:p>
             <a:r>
-              <a:rPr lang="en-US" dirty="0" smtClean="0"/>
+              <a:rPr lang="en-US" dirty="0"/>
               <a:t>but the chain could be as long as you want.</a:t>
             </a:r>
           </a:p>
           <a:p>
             <a:r>
-              <a:rPr lang="en-US" dirty="0" smtClean="0"/>
+              <a:rPr lang="en-US" dirty="0"/>
               <a:t>Here’s an example (be sure to watch the animation):</a:t>
             </a:r>
-            <a:endParaRPr lang="en-US" dirty="0"/>
           </a:p>
         </p:txBody>
       </p:sp>
@@ -5195,13 +5078,6 @@
   <p:clrMapOvr>
     <a:masterClrMapping/>
   </p:clrMapOvr>
-  <p:timing>
-    <p:tnLst>
-      <p:par>
-        <p:cTn id="1" dur="indefinite" restart="never" nodeType="tmRoot"/>
-      </p:par>
-    </p:tnLst>
-  </p:timing>
 </p:sld>
 </file>
 
@@ -5266,7 +5142,7 @@
           <a:lstStyle/>
           <a:p>
             <a:r>
-              <a:rPr lang="en-US" b="1" dirty="0" smtClean="0">
+              <a:rPr lang="en-US" b="1" dirty="0">
                 <a:solidFill>
                   <a:schemeClr val="tx1"/>
                 </a:solidFill>
@@ -5274,30 +5150,17 @@
               <a:t>Ball%</a:t>
             </a:r>
             <a:r>
-              <a:rPr lang="en-US" dirty="0" smtClean="0">
+              <a:rPr lang="en-US" dirty="0">
                 <a:solidFill>
                   <a:schemeClr val="tx1"/>
                 </a:solidFill>
               </a:rPr>
-              <a:t> = (class* object% </a:t>
-            </a:r>
-            <a:r>
-              <a:rPr lang="en-US" dirty="0" smtClean="0">
-                <a:solidFill>
-                  <a:schemeClr val="tx1"/>
-                </a:solidFill>
-              </a:rPr>
-              <a:t>(...) </a:t>
-            </a:r>
-            <a:endParaRPr lang="en-US" dirty="0" smtClean="0">
-              <a:solidFill>
-                <a:schemeClr val="tx1"/>
-              </a:solidFill>
-            </a:endParaRPr>
-          </a:p>
-          <a:p>
-            <a:r>
-              <a:rPr lang="en-US" dirty="0" smtClean="0">
+              <a:t> = (class* object% (...) </a:t>
+            </a:r>
+          </a:p>
+          <a:p>
+            <a:r>
+              <a:rPr lang="en-US" dirty="0">
                 <a:solidFill>
                   <a:schemeClr val="tx1"/>
                 </a:solidFill>
@@ -5306,7 +5169,7 @@
             </a:r>
           </a:p>
           <a:p>
-            <a:endParaRPr lang="en-US" dirty="0" smtClean="0">
+            <a:endParaRPr lang="en-US" dirty="0">
               <a:solidFill>
                 <a:srgbClr val="FF0000"/>
               </a:solidFill>
@@ -5314,7 +5177,7 @@
           </a:p>
           <a:p>
             <a:r>
-              <a:rPr lang="en-US" dirty="0" smtClean="0">
+              <a:rPr lang="en-US" dirty="0">
                 <a:solidFill>
                   <a:schemeClr val="tx1"/>
                 </a:solidFill>
@@ -5324,7 +5187,7 @@
           </a:p>
           <a:p>
             <a:r>
-              <a:rPr lang="en-US" dirty="0" smtClean="0">
+              <a:rPr lang="en-US" dirty="0">
                 <a:solidFill>
                   <a:schemeClr val="tx1"/>
                 </a:solidFill>
@@ -5334,7 +5197,7 @@
           </a:p>
           <a:p>
             <a:r>
-              <a:rPr lang="en-US" dirty="0" smtClean="0">
+              <a:rPr lang="en-US" dirty="0">
                 <a:solidFill>
                   <a:schemeClr val="tx1"/>
                 </a:solidFill>
@@ -5343,14 +5206,14 @@
             </a:r>
           </a:p>
           <a:p>
-            <a:endParaRPr lang="en-US" dirty="0" smtClean="0">
+            <a:endParaRPr lang="en-US" dirty="0">
               <a:solidFill>
                 <a:schemeClr val="tx1"/>
               </a:solidFill>
             </a:endParaRPr>
           </a:p>
           <a:p>
-            <a:endParaRPr lang="en-US" dirty="0" smtClean="0">
+            <a:endParaRPr lang="en-US" dirty="0">
               <a:solidFill>
                 <a:schemeClr val="tx1"/>
               </a:solidFill>
@@ -5402,7 +5265,7 @@
           <a:lstStyle/>
           <a:p>
             <a:r>
-              <a:rPr lang="en-US" b="1" dirty="0" err="1" smtClean="0">
+              <a:rPr lang="en-US" b="1" dirty="0" err="1">
                 <a:solidFill>
                   <a:schemeClr val="tx1"/>
                 </a:solidFill>
@@ -5410,7 +5273,7 @@
               <a:t>FlashingBall</a:t>
             </a:r>
             <a:r>
-              <a:rPr lang="en-US" b="1" dirty="0" smtClean="0">
+              <a:rPr lang="en-US" b="1" dirty="0">
                 <a:solidFill>
                   <a:schemeClr val="tx1"/>
                 </a:solidFill>
@@ -5418,30 +5281,17 @@
               <a:t>%</a:t>
             </a:r>
             <a:r>
-              <a:rPr lang="en-US" dirty="0" smtClean="0">
+              <a:rPr lang="en-US" dirty="0">
                 <a:solidFill>
                   <a:schemeClr val="tx1"/>
                 </a:solidFill>
               </a:rPr>
-              <a:t> = (class* Ball% </a:t>
-            </a:r>
-            <a:r>
-              <a:rPr lang="en-US" dirty="0" smtClean="0">
-                <a:solidFill>
-                  <a:schemeClr val="tx1"/>
-                </a:solidFill>
-              </a:rPr>
-              <a:t>(...)</a:t>
-            </a:r>
-            <a:endParaRPr lang="en-US" dirty="0" smtClean="0">
-              <a:solidFill>
-                <a:schemeClr val="tx1"/>
-              </a:solidFill>
-            </a:endParaRPr>
-          </a:p>
-          <a:p>
-            <a:r>
-              <a:rPr lang="en-US" dirty="0" smtClean="0">
+              <a:t> = (class* Ball% (...)</a:t>
+            </a:r>
+          </a:p>
+          <a:p>
+            <a:r>
+              <a:rPr lang="en-US" dirty="0">
                 <a:solidFill>
                   <a:schemeClr val="tx1"/>
                 </a:solidFill>
@@ -5449,7 +5299,7 @@
               <a:t> (</a:t>
             </a:r>
             <a:r>
-              <a:rPr lang="en-US" dirty="0" smtClean="0">
+              <a:rPr lang="en-US" dirty="0">
                 <a:solidFill>
                   <a:srgbClr val="FF0000"/>
                 </a:solidFill>
@@ -5457,7 +5307,7 @@
               <a:t>inherit-field</a:t>
             </a:r>
             <a:r>
-              <a:rPr lang="en-US" dirty="0" smtClean="0">
+              <a:rPr lang="en-US" dirty="0">
                 <a:solidFill>
                   <a:schemeClr val="tx1"/>
                 </a:solidFill>
@@ -5467,7 +5317,7 @@
           </a:p>
           <a:p>
             <a:r>
-              <a:rPr lang="en-US" dirty="0" smtClean="0">
+              <a:rPr lang="en-US" dirty="0">
                 <a:solidFill>
                   <a:schemeClr val="tx1"/>
                 </a:solidFill>
@@ -5476,7 +5326,7 @@
             </a:r>
           </a:p>
           <a:p>
-            <a:endParaRPr lang="en-US" dirty="0" smtClean="0">
+            <a:endParaRPr lang="en-US" dirty="0">
               <a:solidFill>
                 <a:srgbClr val="FF0000"/>
               </a:solidFill>
@@ -5484,7 +5334,7 @@
           </a:p>
           <a:p>
             <a:r>
-              <a:rPr lang="en-US" strike="sngStrike" dirty="0" smtClean="0">
+              <a:rPr lang="en-US" strike="sngStrike" dirty="0">
                 <a:solidFill>
                   <a:schemeClr val="bg1">
                     <a:lumMod val="65000"/>
@@ -5496,7 +5346,7 @@
           </a:p>
           <a:p>
             <a:r>
-              <a:rPr lang="en-US" strike="sngStrike" dirty="0" smtClean="0">
+              <a:rPr lang="en-US" strike="sngStrike" dirty="0">
                 <a:solidFill>
                   <a:schemeClr val="bg1">
                     <a:lumMod val="65000"/>
@@ -5507,7 +5357,7 @@
             </a:r>
           </a:p>
           <a:p>
-            <a:endParaRPr lang="en-US" dirty="0" smtClean="0">
+            <a:endParaRPr lang="en-US" dirty="0">
               <a:solidFill>
                 <a:schemeClr val="tx1"/>
               </a:solidFill>
@@ -5515,7 +5365,7 @@
           </a:p>
           <a:p>
             <a:r>
-              <a:rPr lang="en-US" dirty="0" smtClean="0">
+              <a:rPr lang="en-US" dirty="0">
                 <a:solidFill>
                   <a:schemeClr val="tx1"/>
                 </a:solidFill>
@@ -5525,7 +5375,7 @@
           </a:p>
           <a:p>
             <a:r>
-              <a:rPr lang="en-US" dirty="0" smtClean="0">
+              <a:rPr lang="en-US" dirty="0">
                 <a:solidFill>
                   <a:schemeClr val="tx1"/>
                 </a:solidFill>
@@ -5535,7 +5385,7 @@
           </a:p>
           <a:p>
             <a:r>
-              <a:rPr lang="en-US" dirty="0" smtClean="0">
+              <a:rPr lang="en-US" dirty="0">
                 <a:solidFill>
                   <a:schemeClr val="tx1"/>
                 </a:solidFill>
@@ -5544,28 +5394,28 @@
             </a:r>
           </a:p>
           <a:p>
-            <a:endParaRPr lang="en-US" dirty="0" smtClean="0">
+            <a:endParaRPr lang="en-US" dirty="0">
               <a:solidFill>
                 <a:schemeClr val="tx1"/>
               </a:solidFill>
             </a:endParaRPr>
           </a:p>
           <a:p>
-            <a:endParaRPr lang="en-US" dirty="0" smtClean="0">
+            <a:endParaRPr lang="en-US" dirty="0">
               <a:solidFill>
                 <a:schemeClr val="tx1"/>
               </a:solidFill>
             </a:endParaRPr>
           </a:p>
           <a:p>
-            <a:endParaRPr lang="en-US" dirty="0" smtClean="0">
+            <a:endParaRPr lang="en-US" dirty="0">
               <a:solidFill>
                 <a:schemeClr val="tx1"/>
               </a:solidFill>
             </a:endParaRPr>
           </a:p>
           <a:p>
-            <a:endParaRPr lang="en-US" dirty="0" smtClean="0">
+            <a:endParaRPr lang="en-US" dirty="0">
               <a:solidFill>
                 <a:schemeClr val="tx1"/>
               </a:solidFill>
@@ -5666,15 +5516,15 @@
           <a:lstStyle/>
           <a:p>
             <a:r>
-              <a:rPr lang="en-US" dirty="0" smtClean="0"/>
+              <a:rPr lang="en-US" dirty="0"/>
               <a:t>(define b1 (new </a:t>
             </a:r>
             <a:r>
-              <a:rPr lang="en-US" dirty="0" err="1" smtClean="0"/>
+              <a:rPr lang="en-US" dirty="0" err="1"/>
               <a:t>FlashingBall</a:t>
             </a:r>
             <a:r>
-              <a:rPr lang="en-US" dirty="0" smtClean="0"/>
+              <a:rPr lang="en-US" dirty="0"/>
               <a:t>% ...))</a:t>
             </a:r>
           </a:p>
@@ -5703,7 +5553,7 @@
           <a:lstStyle/>
           <a:p>
             <a:r>
-              <a:rPr lang="en-US" dirty="0" smtClean="0"/>
+              <a:rPr lang="en-US" dirty="0"/>
               <a:t>(send b1 add-to-scene s)</a:t>
             </a:r>
           </a:p>
@@ -5732,7 +5582,7 @@
           <a:lstStyle/>
           <a:p>
             <a:r>
-              <a:rPr lang="en-US" dirty="0" smtClean="0"/>
+              <a:rPr lang="en-US" dirty="0"/>
               <a:t>(send b1 on-tick)</a:t>
             </a:r>
           </a:p>
@@ -5761,10 +5611,9 @@
           <a:lstStyle/>
           <a:p>
             <a:r>
-              <a:rPr lang="en-US" dirty="0" smtClean="0"/>
+              <a:rPr lang="en-US" dirty="0"/>
               <a:t>(send b1 launch-missiles)</a:t>
             </a:r>
-            <a:endParaRPr lang="en-US" dirty="0"/>
           </a:p>
         </p:txBody>
       </p:sp>
@@ -5812,7 +5661,7 @@
           <a:lstStyle/>
           <a:p>
             <a:pPr algn="ctr"/>
-            <a:endParaRPr lang="en-US" dirty="0" smtClean="0">
+            <a:endParaRPr lang="en-US" dirty="0">
               <a:solidFill>
                 <a:schemeClr val="tx1"/>
               </a:solidFill>
@@ -5864,7 +5713,7 @@
           <a:lstStyle/>
           <a:p>
             <a:pPr algn="ctr"/>
-            <a:endParaRPr lang="en-US" dirty="0" smtClean="0">
+            <a:endParaRPr lang="en-US" dirty="0">
               <a:solidFill>
                 <a:schemeClr val="tx1"/>
               </a:solidFill>
@@ -5916,7 +5765,7 @@
           <a:lstStyle/>
           <a:p>
             <a:pPr algn="ctr"/>
-            <a:endParaRPr lang="en-US" dirty="0" smtClean="0">
+            <a:endParaRPr lang="en-US" dirty="0">
               <a:solidFill>
                 <a:schemeClr val="tx1"/>
               </a:solidFill>
@@ -5947,10 +5796,9 @@
           <a:lstStyle/>
           <a:p>
             <a:r>
-              <a:rPr lang="en-US" sz="2800" dirty="0" smtClean="0"/>
+              <a:rPr lang="en-US" sz="2800" dirty="0"/>
               <a:t>An object searches its inheritance chain for a suitable method</a:t>
             </a:r>
-            <a:endParaRPr lang="en-US" sz="2800" dirty="0"/>
           </a:p>
         </p:txBody>
       </p:sp>
@@ -6010,7 +5858,7 @@
             <a:lstStyle/>
             <a:p>
               <a:r>
-                <a:rPr lang="en-US" dirty="0" smtClean="0">
+                <a:rPr lang="en-US" dirty="0">
                   <a:solidFill>
                     <a:schemeClr val="tx1"/>
                   </a:solidFill>
@@ -6020,7 +5868,7 @@
             </a:p>
             <a:p>
               <a:r>
-                <a:rPr lang="en-US" dirty="0" smtClean="0">
+                <a:rPr lang="en-US" dirty="0">
                   <a:solidFill>
                     <a:schemeClr val="tx1"/>
                   </a:solidFill>
@@ -6030,7 +5878,7 @@
             </a:p>
             <a:p>
               <a:r>
-                <a:rPr lang="en-US" dirty="0" smtClean="0">
+                <a:rPr lang="en-US" dirty="0">
                   <a:solidFill>
                     <a:schemeClr val="tx1"/>
                   </a:solidFill>
@@ -6040,25 +5888,17 @@
             </a:p>
             <a:p>
               <a:r>
-                <a:rPr lang="en-US" dirty="0" smtClean="0">
+                <a:rPr lang="en-US" dirty="0">
                   <a:solidFill>
                     <a:schemeClr val="tx1"/>
                   </a:solidFill>
                 </a:rPr>
-                <a:t>selected? </a:t>
-              </a:r>
-              <a:r>
-                <a:rPr lang="en-US" dirty="0" smtClean="0">
-                  <a:solidFill>
-                    <a:schemeClr val="tx1"/>
-                  </a:solidFill>
-                </a:rPr>
-                <a:t>= ...</a:t>
+                <a:t>selected? = ...</a:t>
               </a:r>
             </a:p>
             <a:p>
               <a:r>
-                <a:rPr lang="en-US" dirty="0" smtClean="0">
+                <a:rPr lang="en-US" dirty="0">
                   <a:solidFill>
                     <a:schemeClr val="tx1"/>
                   </a:solidFill>
@@ -6091,10 +5931,9 @@
             <a:lstStyle/>
             <a:p>
               <a:r>
-                <a:rPr lang="en-US" dirty="0" smtClean="0"/>
+                <a:rPr lang="en-US" dirty="0"/>
                 <a:t>b1</a:t>
               </a:r>
-              <a:endParaRPr lang="en-US" dirty="0"/>
             </a:p>
           </p:txBody>
         </p:sp>
@@ -6220,7 +6059,7 @@
           <a:lstStyle/>
           <a:p>
             <a:pPr algn="ctr"/>
-            <a:endParaRPr lang="en-US" dirty="0" smtClean="0">
+            <a:endParaRPr lang="en-US" dirty="0">
               <a:solidFill>
                 <a:schemeClr val="tx1"/>
               </a:solidFill>
@@ -6272,7 +6111,7 @@
           <a:lstStyle/>
           <a:p>
             <a:pPr algn="ctr"/>
-            <a:endParaRPr lang="en-US" dirty="0" smtClean="0">
+            <a:endParaRPr lang="en-US" dirty="0">
               <a:solidFill>
                 <a:schemeClr val="tx1"/>
               </a:solidFill>
@@ -6324,7 +6163,7 @@
           <a:lstStyle/>
           <a:p>
             <a:pPr algn="ctr"/>
-            <a:endParaRPr lang="en-US" dirty="0" smtClean="0">
+            <a:endParaRPr lang="en-US" dirty="0">
               <a:solidFill>
                 <a:schemeClr val="tx1"/>
               </a:solidFill>
@@ -6376,7 +6215,7 @@
           <a:lstStyle/>
           <a:p>
             <a:pPr algn="ctr"/>
-            <a:endParaRPr lang="en-US" dirty="0" smtClean="0">
+            <a:endParaRPr lang="en-US" dirty="0">
               <a:solidFill>
                 <a:schemeClr val="tx1"/>
               </a:solidFill>
@@ -6428,7 +6267,7 @@
           <a:lstStyle/>
           <a:p>
             <a:pPr algn="ctr"/>
-            <a:endParaRPr lang="en-US" dirty="0" smtClean="0">
+            <a:endParaRPr lang="en-US" dirty="0">
               <a:solidFill>
                 <a:schemeClr val="tx1"/>
               </a:solidFill>
@@ -6480,7 +6319,7 @@
           <a:lstStyle/>
           <a:p>
             <a:pPr algn="ctr"/>
-            <a:endParaRPr lang="en-US" dirty="0" smtClean="0">
+            <a:endParaRPr lang="en-US" dirty="0">
               <a:solidFill>
                 <a:schemeClr val="tx1"/>
               </a:solidFill>
@@ -6532,7 +6371,7 @@
           <a:lstStyle/>
           <a:p>
             <a:pPr algn="ctr"/>
-            <a:endParaRPr lang="en-US" dirty="0" smtClean="0">
+            <a:endParaRPr lang="en-US" dirty="0">
               <a:solidFill>
                 <a:schemeClr val="tx1"/>
               </a:solidFill>
@@ -6584,7 +6423,7 @@
           <a:lstStyle/>
           <a:p>
             <a:pPr algn="ctr"/>
-            <a:endParaRPr lang="en-US" dirty="0" smtClean="0">
+            <a:endParaRPr lang="en-US" dirty="0">
               <a:solidFill>
                 <a:schemeClr val="tx1"/>
               </a:solidFill>
@@ -7373,14 +7212,13 @@
           <a:lstStyle/>
           <a:p>
             <a:r>
-              <a:rPr lang="en-US" dirty="0" smtClean="0"/>
+              <a:rPr lang="en-US" dirty="0"/>
               <a:t>Inheritance and </a:t>
             </a:r>
             <a:r>
-              <a:rPr lang="en-US" b="1" dirty="0" smtClean="0"/>
+              <a:rPr lang="en-US" b="1" dirty="0"/>
               <a:t>this</a:t>
             </a:r>
-            <a:endParaRPr lang="en-US" b="1" dirty="0"/>
           </a:p>
         </p:txBody>
       </p:sp>
@@ -7400,27 +7238,27 @@
           <a:lstStyle/>
           <a:p>
             <a:r>
-              <a:rPr lang="en-US" dirty="0" smtClean="0"/>
+              <a:rPr lang="en-US" dirty="0"/>
               <a:t>If a method in the superclass refers to </a:t>
             </a:r>
             <a:r>
-              <a:rPr lang="en-US" b="1" dirty="0" smtClean="0"/>
+              <a:rPr lang="en-US" b="1" dirty="0"/>
               <a:t>this</a:t>
             </a:r>
             <a:r>
-              <a:rPr lang="en-US" dirty="0" smtClean="0"/>
+              <a:rPr lang="en-US" dirty="0"/>
               <a:t>, where do you look for the method?</a:t>
             </a:r>
           </a:p>
           <a:p>
             <a:r>
-              <a:rPr lang="en-US" dirty="0" smtClean="0"/>
+              <a:rPr lang="en-US" dirty="0"/>
               <a:t>Answer: in the original object.</a:t>
             </a:r>
           </a:p>
           <a:p>
             <a:r>
-              <a:rPr lang="en-US" dirty="0" smtClean="0"/>
+              <a:rPr lang="en-US" dirty="0"/>
               <a:t>Consider the following class hierarchy:</a:t>
             </a:r>
           </a:p>
@@ -7428,10 +7266,10 @@
             <a:endParaRPr lang="en-US" dirty="0"/>
           </a:p>
           <a:p>
-            <a:endParaRPr lang="en-US" dirty="0" smtClean="0"/>
-          </a:p>
-          <a:p>
-            <a:endParaRPr lang="en-US" dirty="0" smtClean="0"/>
+            <a:endParaRPr lang="en-US" dirty="0"/>
+          </a:p>
+          <a:p>
+            <a:endParaRPr lang="en-US" dirty="0"/>
           </a:p>
           <a:p>
             <a:endParaRPr lang="en-US" dirty="0"/>
@@ -7472,13 +7310,6 @@
   <p:clrMapOvr>
     <a:masterClrMapping/>
   </p:clrMapOvr>
-  <p:timing>
-    <p:tnLst>
-      <p:par>
-        <p:cTn id="1" dur="indefinite" restart="never" nodeType="tmRoot"/>
-      </p:par>
-    </p:tnLst>
-  </p:timing>
 </p:sld>
 </file>
 
@@ -7543,7 +7374,7 @@
           <a:lstStyle/>
           <a:p>
             <a:r>
-              <a:rPr lang="en-US" b="1" dirty="0" smtClean="0">
+              <a:rPr lang="en-US" b="1" dirty="0">
                 <a:solidFill>
                   <a:schemeClr val="tx1"/>
                 </a:solidFill>
@@ -7551,30 +7382,17 @@
               <a:t>Ball%</a:t>
             </a:r>
             <a:r>
-              <a:rPr lang="en-US" dirty="0" smtClean="0">
+              <a:rPr lang="en-US" dirty="0">
                 <a:solidFill>
                   <a:schemeClr val="tx1"/>
                 </a:solidFill>
               </a:rPr>
-              <a:t> = (class* object% </a:t>
-            </a:r>
-            <a:r>
-              <a:rPr lang="en-US" dirty="0" smtClean="0">
-                <a:solidFill>
-                  <a:schemeClr val="tx1"/>
-                </a:solidFill>
-              </a:rPr>
-              <a:t>(...) </a:t>
-            </a:r>
-            <a:endParaRPr lang="en-US" dirty="0" smtClean="0">
-              <a:solidFill>
-                <a:schemeClr val="tx1"/>
-              </a:solidFill>
-            </a:endParaRPr>
-          </a:p>
-          <a:p>
-            <a:r>
-              <a:rPr lang="en-US" dirty="0" smtClean="0">
+              <a:t> = (class* object% (...) </a:t>
+            </a:r>
+          </a:p>
+          <a:p>
+            <a:r>
+              <a:rPr lang="en-US" dirty="0">
                 <a:solidFill>
                   <a:schemeClr val="tx1"/>
                 </a:solidFill>
@@ -7584,7 +7402,7 @@
           </a:p>
           <a:p>
             <a:r>
-              <a:rPr lang="en-US" dirty="0" smtClean="0">
+              <a:rPr lang="en-US" dirty="0">
                 <a:solidFill>
                   <a:schemeClr val="tx1"/>
                 </a:solidFill>
@@ -7599,19 +7417,11 @@
                   <a:schemeClr val="tx1"/>
                 </a:solidFill>
               </a:rPr>
-              <a:t> </a:t>
-            </a:r>
-            <a:r>
-              <a:rPr lang="en-US" dirty="0" smtClean="0">
-                <a:solidFill>
-                  <a:schemeClr val="tx1"/>
-                </a:solidFill>
-              </a:rPr>
-              <a:t>(define/public (m2 x) “wrong”)</a:t>
-            </a:r>
-          </a:p>
-          <a:p>
-            <a:endParaRPr lang="en-US" dirty="0" smtClean="0">
+              <a:t> (define/public (m2 x) “wrong”)</a:t>
+            </a:r>
+          </a:p>
+          <a:p>
+            <a:endParaRPr lang="en-US" dirty="0">
               <a:solidFill>
                 <a:srgbClr val="FF0000"/>
               </a:solidFill>
@@ -7619,7 +7429,7 @@
           </a:p>
           <a:p>
             <a:r>
-              <a:rPr lang="en-US" dirty="0" smtClean="0">
+              <a:rPr lang="en-US" dirty="0">
                 <a:solidFill>
                   <a:schemeClr val="tx1"/>
                 </a:solidFill>
@@ -7628,7 +7438,7 @@
             </a:r>
           </a:p>
           <a:p>
-            <a:endParaRPr lang="en-US" dirty="0" smtClean="0">
+            <a:endParaRPr lang="en-US" dirty="0">
               <a:solidFill>
                 <a:schemeClr val="tx1"/>
               </a:solidFill>
@@ -7680,7 +7490,7 @@
           <a:lstStyle/>
           <a:p>
             <a:r>
-              <a:rPr lang="en-US" b="1" dirty="0" err="1" smtClean="0">
+              <a:rPr lang="en-US" b="1" dirty="0" err="1">
                 <a:solidFill>
                   <a:schemeClr val="tx1"/>
                 </a:solidFill>
@@ -7688,7 +7498,7 @@
               <a:t>FlashingBall</a:t>
             </a:r>
             <a:r>
-              <a:rPr lang="en-US" b="1" dirty="0" smtClean="0">
+              <a:rPr lang="en-US" b="1" dirty="0">
                 <a:solidFill>
                   <a:schemeClr val="tx1"/>
                 </a:solidFill>
@@ -7696,37 +7506,24 @@
               <a:t>%</a:t>
             </a:r>
             <a:r>
-              <a:rPr lang="en-US" dirty="0" smtClean="0">
+              <a:rPr lang="en-US" dirty="0">
                 <a:solidFill>
                   <a:schemeClr val="tx1"/>
                 </a:solidFill>
               </a:rPr>
-              <a:t> = (class* Ball% </a:t>
-            </a:r>
-            <a:r>
-              <a:rPr lang="en-US" dirty="0" smtClean="0">
-                <a:solidFill>
-                  <a:schemeClr val="tx1"/>
-                </a:solidFill>
-              </a:rPr>
-              <a:t>(...)</a:t>
-            </a:r>
-            <a:endParaRPr lang="en-US" dirty="0" smtClean="0">
-              <a:solidFill>
-                <a:schemeClr val="tx1"/>
-              </a:solidFill>
-            </a:endParaRPr>
-          </a:p>
-          <a:p>
-            <a:r>
-              <a:rPr lang="en-US" dirty="0" smtClean="0">
+              <a:t> = (class* Ball% (...)</a:t>
+            </a:r>
+          </a:p>
+          <a:p>
+            <a:r>
+              <a:rPr lang="en-US" dirty="0">
                 <a:solidFill>
                   <a:schemeClr val="tx1"/>
                 </a:solidFill>
               </a:rPr>
               <a:t> </a:t>
             </a:r>
-            <a:endParaRPr lang="en-US" dirty="0" smtClean="0">
+            <a:endParaRPr lang="en-US" dirty="0">
               <a:solidFill>
                 <a:srgbClr val="FF0000"/>
               </a:solidFill>
@@ -7734,7 +7531,7 @@
           </a:p>
           <a:p>
             <a:r>
-              <a:rPr lang="en-US" dirty="0" smtClean="0">
+              <a:rPr lang="en-US" dirty="0">
                 <a:solidFill>
                   <a:schemeClr val="tx1"/>
                 </a:solidFill>
@@ -7744,7 +7541,7 @@
           </a:p>
           <a:p>
             <a:r>
-              <a:rPr lang="en-US" dirty="0" smtClean="0">
+              <a:rPr lang="en-US" dirty="0">
                 <a:solidFill>
                   <a:schemeClr val="tx1"/>
                 </a:solidFill>
@@ -7753,28 +7550,28 @@
             </a:r>
           </a:p>
           <a:p>
-            <a:endParaRPr lang="en-US" dirty="0" smtClean="0">
+            <a:endParaRPr lang="en-US" dirty="0">
               <a:solidFill>
                 <a:schemeClr val="tx1"/>
               </a:solidFill>
             </a:endParaRPr>
           </a:p>
           <a:p>
-            <a:endParaRPr lang="en-US" dirty="0" smtClean="0">
+            <a:endParaRPr lang="en-US" dirty="0">
               <a:solidFill>
                 <a:schemeClr val="tx1"/>
               </a:solidFill>
             </a:endParaRPr>
           </a:p>
           <a:p>
-            <a:endParaRPr lang="en-US" dirty="0" smtClean="0">
+            <a:endParaRPr lang="en-US" dirty="0">
               <a:solidFill>
                 <a:schemeClr val="tx1"/>
               </a:solidFill>
             </a:endParaRPr>
           </a:p>
           <a:p>
-            <a:endParaRPr lang="en-US" dirty="0" smtClean="0">
+            <a:endParaRPr lang="en-US" dirty="0">
               <a:solidFill>
                 <a:schemeClr val="tx1"/>
               </a:solidFill>
@@ -7875,21 +7672,21 @@
           <a:lstStyle/>
           <a:p>
             <a:r>
-              <a:rPr lang="en-US" dirty="0" smtClean="0"/>
+              <a:rPr lang="en-US" dirty="0"/>
               <a:t>(define b1 (new </a:t>
             </a:r>
             <a:r>
-              <a:rPr lang="en-US" dirty="0" err="1" smtClean="0"/>
+              <a:rPr lang="en-US" dirty="0" err="1"/>
               <a:t>FlashingBall</a:t>
             </a:r>
             <a:r>
-              <a:rPr lang="en-US" dirty="0" smtClean="0"/>
+              <a:rPr lang="en-US" dirty="0"/>
               <a:t>% ...))</a:t>
             </a:r>
           </a:p>
           <a:p>
             <a:r>
-              <a:rPr lang="en-US" dirty="0" smtClean="0"/>
+              <a:rPr lang="en-US" dirty="0"/>
               <a:t>(send b1 m1 33)</a:t>
             </a:r>
           </a:p>
@@ -7918,14 +7715,13 @@
           <a:lstStyle/>
           <a:p>
             <a:r>
-              <a:rPr lang="en-US" sz="2800" dirty="0" smtClean="0"/>
+              <a:rPr lang="en-US" sz="2800" dirty="0"/>
               <a:t>Searching for a method of </a:t>
             </a:r>
             <a:r>
-              <a:rPr lang="en-US" sz="2800" b="1" dirty="0" smtClean="0"/>
+              <a:rPr lang="en-US" sz="2800" b="1" dirty="0"/>
               <a:t>this</a:t>
             </a:r>
-            <a:endParaRPr lang="en-US" sz="2800" b="1" dirty="0"/>
           </a:p>
         </p:txBody>
       </p:sp>
@@ -7985,7 +7781,7 @@
             <a:lstStyle/>
             <a:p>
               <a:r>
-                <a:rPr lang="en-US" dirty="0" smtClean="0">
+                <a:rPr lang="en-US" dirty="0">
                   <a:solidFill>
                     <a:schemeClr val="tx1"/>
                   </a:solidFill>
@@ -7995,7 +7791,7 @@
             </a:p>
             <a:p>
               <a:r>
-                <a:rPr lang="en-US" dirty="0" smtClean="0">
+                <a:rPr lang="en-US" dirty="0">
                   <a:solidFill>
                     <a:schemeClr val="tx1"/>
                   </a:solidFill>
@@ -8005,7 +7801,7 @@
             </a:p>
             <a:p>
               <a:r>
-                <a:rPr lang="en-US" dirty="0" smtClean="0">
+                <a:rPr lang="en-US" dirty="0">
                   <a:solidFill>
                     <a:schemeClr val="tx1"/>
                   </a:solidFill>
@@ -8015,25 +7811,17 @@
             </a:p>
             <a:p>
               <a:r>
-                <a:rPr lang="en-US" dirty="0" smtClean="0">
+                <a:rPr lang="en-US" dirty="0">
                   <a:solidFill>
                     <a:schemeClr val="tx1"/>
                   </a:solidFill>
                 </a:rPr>
-                <a:t>selected? </a:t>
-              </a:r>
-              <a:r>
-                <a:rPr lang="en-US" dirty="0" smtClean="0">
-                  <a:solidFill>
-                    <a:schemeClr val="tx1"/>
-                  </a:solidFill>
-                </a:rPr>
-                <a:t>= ...</a:t>
+                <a:t>selected? = ...</a:t>
               </a:r>
             </a:p>
             <a:p>
               <a:r>
-                <a:rPr lang="en-US" dirty="0" smtClean="0">
+                <a:rPr lang="en-US" dirty="0">
                   <a:solidFill>
                     <a:schemeClr val="tx1"/>
                   </a:solidFill>
@@ -8066,10 +7854,9 @@
             <a:lstStyle/>
             <a:p>
               <a:r>
-                <a:rPr lang="en-US" dirty="0" smtClean="0"/>
+                <a:rPr lang="en-US" dirty="0"/>
                 <a:t>b1</a:t>
               </a:r>
-              <a:endParaRPr lang="en-US" dirty="0"/>
             </a:p>
           </p:txBody>
         </p:sp>
@@ -8203,23 +7990,23 @@
           <a:lstStyle/>
           <a:p>
             <a:r>
-              <a:rPr lang="en-US" sz="1400" dirty="0" smtClean="0"/>
+              <a:rPr lang="en-US" sz="1400" dirty="0"/>
               <a:t>When we send </a:t>
             </a:r>
             <a:r>
-              <a:rPr lang="en-US" sz="1400" b="1" dirty="0" smtClean="0"/>
+              <a:rPr lang="en-US" sz="1400" b="1" dirty="0"/>
               <a:t>b1</a:t>
             </a:r>
             <a:r>
-              <a:rPr lang="en-US" sz="1400" dirty="0" smtClean="0"/>
+              <a:rPr lang="en-US" sz="1400" dirty="0"/>
               <a:t> an </a:t>
             </a:r>
             <a:r>
-              <a:rPr lang="en-US" sz="1400" b="1" dirty="0" smtClean="0"/>
+              <a:rPr lang="en-US" sz="1400" b="1" dirty="0"/>
               <a:t>m1</a:t>
             </a:r>
             <a:r>
-              <a:rPr lang="en-US" sz="1400" dirty="0" smtClean="0"/>
+              <a:rPr lang="en-US" sz="1400" dirty="0"/>
               <a:t> message, what happens?</a:t>
             </a:r>
           </a:p>
@@ -8228,15 +8015,15 @@
               <a:buAutoNum type="arabicParenR"/>
             </a:pPr>
             <a:r>
-              <a:rPr lang="en-US" sz="1400" dirty="0" smtClean="0"/>
+              <a:rPr lang="en-US" sz="1400" dirty="0"/>
               <a:t>It searches its own methods for an </a:t>
             </a:r>
             <a:r>
-              <a:rPr lang="en-US" sz="1400" b="1" dirty="0" smtClean="0"/>
+              <a:rPr lang="en-US" sz="1400" b="1" dirty="0"/>
               <a:t>m1</a:t>
             </a:r>
             <a:r>
-              <a:rPr lang="en-US" sz="1400" dirty="0" smtClean="0"/>
+              <a:rPr lang="en-US" sz="1400" dirty="0"/>
               <a:t> method, and finds none.</a:t>
             </a:r>
           </a:p>
@@ -8245,31 +8032,31 @@
               <a:buAutoNum type="arabicParenR"/>
             </a:pPr>
             <a:r>
-              <a:rPr lang="en-US" sz="1400" dirty="0" smtClean="0"/>
+              <a:rPr lang="en-US" sz="1400" dirty="0"/>
               <a:t>It searches it superclass for an </a:t>
             </a:r>
             <a:r>
-              <a:rPr lang="en-US" sz="1400" b="1" dirty="0" smtClean="0"/>
+              <a:rPr lang="en-US" sz="1400" b="1" dirty="0"/>
               <a:t>m1</a:t>
             </a:r>
             <a:r>
-              <a:rPr lang="en-US" sz="1400" dirty="0" smtClean="0"/>
+              <a:rPr lang="en-US" sz="1400" dirty="0"/>
               <a:t> method.  This time it finds one, which says to send </a:t>
             </a:r>
             <a:r>
-              <a:rPr lang="en-US" sz="1400" b="1" dirty="0" smtClean="0"/>
+              <a:rPr lang="en-US" sz="1400" b="1" dirty="0"/>
               <a:t>this</a:t>
             </a:r>
             <a:r>
-              <a:rPr lang="en-US" sz="1400" dirty="0" smtClean="0"/>
+              <a:rPr lang="en-US" sz="1400" dirty="0"/>
               <a:t> an </a:t>
             </a:r>
             <a:r>
-              <a:rPr lang="en-US" sz="1400" b="1" dirty="0" smtClean="0"/>
+              <a:rPr lang="en-US" sz="1400" b="1" dirty="0"/>
               <a:t>m2</a:t>
             </a:r>
             <a:r>
-              <a:rPr lang="en-US" sz="1400" dirty="0" smtClean="0"/>
+              <a:rPr lang="en-US" sz="1400" dirty="0"/>
               <a:t> message.</a:t>
             </a:r>
           </a:p>
@@ -8278,48 +8065,46 @@
               <a:buAutoNum type="arabicParenR"/>
             </a:pPr>
             <a:r>
-              <a:rPr lang="en-US" sz="1400" b="1" dirty="0" smtClean="0"/>
+              <a:rPr lang="en-US" sz="1400" b="1" dirty="0"/>
               <a:t>this</a:t>
             </a:r>
             <a:r>
-              <a:rPr lang="en-US" sz="1400" dirty="0" smtClean="0"/>
+              <a:rPr lang="en-US" sz="1400" dirty="0"/>
               <a:t> still refers to </a:t>
             </a:r>
             <a:r>
-              <a:rPr lang="en-US" sz="1400" b="1" dirty="0" smtClean="0"/>
+              <a:rPr lang="en-US" sz="1400" b="1" dirty="0"/>
               <a:t>b1</a:t>
             </a:r>
             <a:r>
-              <a:rPr lang="en-US" sz="1400" dirty="0" smtClean="0"/>
+              <a:rPr lang="en-US" sz="1400" dirty="0"/>
               <a:t>. So </a:t>
             </a:r>
             <a:r>
-              <a:rPr lang="en-US" sz="1400" b="1" dirty="0" smtClean="0"/>
+              <a:rPr lang="en-US" sz="1400" b="1" dirty="0"/>
               <a:t>b1</a:t>
             </a:r>
             <a:r>
-              <a:rPr lang="en-US" sz="1400" dirty="0" smtClean="0"/>
+              <a:rPr lang="en-US" sz="1400" dirty="0"/>
               <a:t> starts searching  for an </a:t>
             </a:r>
             <a:r>
-              <a:rPr lang="en-US" sz="1400" b="1" dirty="0" smtClean="0"/>
+              <a:rPr lang="en-US" sz="1400" b="1" dirty="0"/>
               <a:t>m2</a:t>
             </a:r>
             <a:r>
-              <a:rPr lang="en-US" sz="1400" dirty="0" smtClean="0"/>
+              <a:rPr lang="en-US" sz="1400" dirty="0"/>
               <a:t> method.  </a:t>
             </a:r>
-            <a:endParaRPr lang="en-US" sz="1400" dirty="0"/>
           </a:p>
           <a:p>
             <a:pPr marL="342900" indent="-342900">
               <a:buAutoNum type="arabicParenR"/>
             </a:pPr>
             <a:r>
-              <a:rPr lang="en-US" sz="1400" dirty="0" smtClean="0"/>
+              <a:rPr lang="en-US" sz="1400" dirty="0"/>
               <a:t>It finds the m2 method in  its local table, and returns the string “right”.</a:t>
             </a:r>
-            <a:endParaRPr lang="en-US" sz="1400" dirty="0"/>
           </a:p>
         </p:txBody>
       </p:sp>
@@ -8452,10 +8237,9 @@
           <a:lstStyle/>
           <a:p>
             <a:r>
-              <a:rPr lang="en-US" b="1" dirty="0" smtClean="0"/>
+              <a:rPr lang="en-US" b="1" dirty="0"/>
               <a:t>super</a:t>
             </a:r>
-            <a:endParaRPr lang="en-US" b="1" dirty="0"/>
           </a:p>
         </p:txBody>
       </p:sp>
@@ -8475,44 +8259,43 @@
           <a:lstStyle/>
           <a:p>
             <a:r>
-              <a:rPr lang="en-US" dirty="0" smtClean="0"/>
+              <a:rPr lang="en-US" dirty="0"/>
               <a:t>Sometimes the subclass doesn’t need to change the behavior of the superclass’s method; instead it just needs to add behavior to the existing method.</a:t>
             </a:r>
           </a:p>
           <a:p>
             <a:r>
-              <a:rPr lang="en-US" b="1" dirty="0" smtClean="0"/>
+              <a:rPr lang="en-US" b="1" dirty="0"/>
               <a:t>(super </a:t>
             </a:r>
             <a:r>
-              <a:rPr lang="en-US" i="1" dirty="0" smtClean="0"/>
+              <a:rPr lang="en-US" i="1" dirty="0"/>
               <a:t>method</a:t>
             </a:r>
             <a:r>
-              <a:rPr lang="en-US" b="1" dirty="0" smtClean="0"/>
+              <a:rPr lang="en-US" b="1" dirty="0"/>
               <a:t> </a:t>
             </a:r>
             <a:r>
-              <a:rPr lang="en-US" i="1" dirty="0" err="1" smtClean="0"/>
+              <a:rPr lang="en-US" i="1" dirty="0" err="1"/>
               <a:t>args</a:t>
             </a:r>
             <a:r>
-              <a:rPr lang="en-US" b="1" dirty="0" smtClean="0"/>
+              <a:rPr lang="en-US" b="1" dirty="0"/>
               <a:t> </a:t>
             </a:r>
             <a:r>
-              <a:rPr lang="en-US" dirty="0" smtClean="0"/>
+              <a:rPr lang="en-US" dirty="0"/>
               <a:t>…</a:t>
             </a:r>
             <a:r>
-              <a:rPr lang="en-US" b="1" dirty="0" smtClean="0"/>
+              <a:rPr lang="en-US" b="1" dirty="0"/>
               <a:t>) </a:t>
             </a:r>
             <a:r>
-              <a:rPr lang="en-US" dirty="0" smtClean="0"/>
+              <a:rPr lang="en-US" dirty="0"/>
               <a:t>calls the method named method in the superclass of the class in which the method is defined.</a:t>
             </a:r>
-            <a:endParaRPr lang="en-US" dirty="0"/>
           </a:p>
         </p:txBody>
       </p:sp>
@@ -8550,13 +8333,6 @@
   <p:clrMapOvr>
     <a:masterClrMapping/>
   </p:clrMapOvr>
-  <p:timing>
-    <p:tnLst>
-      <p:par>
-        <p:cTn id="1" dur="indefinite" restart="never" nodeType="tmRoot"/>
-      </p:par>
-    </p:tnLst>
-  </p:timing>
 </p:sld>
 </file>
 
@@ -8593,14 +8369,13 @@
           <a:lstStyle/>
           <a:p>
             <a:r>
-              <a:rPr lang="en-US" dirty="0" smtClean="0"/>
+              <a:rPr lang="en-US" dirty="0"/>
               <a:t>Use case for </a:t>
             </a:r>
             <a:r>
-              <a:rPr lang="en-US" b="1" dirty="0" smtClean="0"/>
+              <a:rPr lang="en-US" b="1" dirty="0"/>
               <a:t>super</a:t>
             </a:r>
-            <a:endParaRPr lang="en-US" b="1" dirty="0"/>
           </a:p>
         </p:txBody>
       </p:sp>
@@ -8632,7 +8407,7 @@
               </a:spcBef>
             </a:pPr>
             <a:r>
-              <a:rPr lang="en-US" sz="2400" dirty="0" smtClean="0"/>
+              <a:rPr lang="en-US" sz="2400" dirty="0"/>
               <a:t>(define the-superclass%</a:t>
             </a:r>
           </a:p>
@@ -8644,11 +8419,7 @@
             </a:pPr>
             <a:r>
               <a:rPr lang="en-US" sz="2400" dirty="0"/>
-              <a:t> </a:t>
-            </a:r>
-            <a:r>
-              <a:rPr lang="en-US" sz="2400" dirty="0" smtClean="0"/>
-              <a:t> (class* object% ()</a:t>
+              <a:t>  (class* object% ()</a:t>
             </a:r>
           </a:p>
           <a:p>
@@ -8659,11 +8430,7 @@
             </a:pPr>
             <a:r>
               <a:rPr lang="en-US" sz="2400" dirty="0"/>
-              <a:t> </a:t>
-            </a:r>
-            <a:r>
-              <a:rPr lang="en-US" sz="2400" dirty="0" smtClean="0"/>
-              <a:t>  (define/public (m1 x)</a:t>
+              <a:t>   (define/public (m1 x)</a:t>
             </a:r>
           </a:p>
           <a:p>
@@ -8674,11 +8441,7 @@
             </a:pPr>
             <a:r>
               <a:rPr lang="en-US" sz="2400" dirty="0"/>
-              <a:t> </a:t>
-            </a:r>
-            <a:r>
-              <a:rPr lang="en-US" sz="2400" dirty="0" smtClean="0"/>
-              <a:t>    (... big-hairy function of x ...))))</a:t>
+              <a:t>     (... big-hairy function of x ...))))</a:t>
             </a:r>
           </a:p>
           <a:p>
@@ -8696,7 +8459,7 @@
               </a:spcBef>
             </a:pPr>
             <a:r>
-              <a:rPr lang="en-US" sz="2400" dirty="0" smtClean="0"/>
+              <a:rPr lang="en-US" sz="2400" dirty="0"/>
               <a:t>(define the-subclass%</a:t>
             </a:r>
           </a:p>
@@ -8708,11 +8471,7 @@
             </a:pPr>
             <a:r>
               <a:rPr lang="en-US" sz="2400" dirty="0"/>
-              <a:t> </a:t>
-            </a:r>
-            <a:r>
-              <a:rPr lang="en-US" sz="2400" dirty="0" smtClean="0"/>
-              <a:t> (class* the-superclass% ()</a:t>
+              <a:t>  (class* the-superclass% ()</a:t>
             </a:r>
           </a:p>
           <a:p>
@@ -8723,11 +8482,7 @@
             </a:pPr>
             <a:r>
               <a:rPr lang="en-US" sz="2400" dirty="0"/>
-              <a:t> </a:t>
-            </a:r>
-            <a:r>
-              <a:rPr lang="en-US" sz="2400" dirty="0" smtClean="0"/>
-              <a:t>   (define/public (m1 x)</a:t>
+              <a:t>    (define/public (m1 x)</a:t>
             </a:r>
           </a:p>
           <a:p>
@@ -8738,11 +8493,7 @@
             </a:pPr>
             <a:r>
               <a:rPr lang="en-US" sz="2400" dirty="0"/>
-              <a:t> </a:t>
-            </a:r>
-            <a:r>
-              <a:rPr lang="en-US" sz="2400" dirty="0" smtClean="0"/>
-              <a:t>     (... Same big hairy function,</a:t>
+              <a:t>      (... Same big hairy function,</a:t>
             </a:r>
           </a:p>
           <a:p>
@@ -8753,13 +8504,8 @@
             </a:pPr>
             <a:r>
               <a:rPr lang="en-US" sz="2400" dirty="0"/>
-              <a:t> </a:t>
-            </a:r>
-            <a:r>
-              <a:rPr lang="en-US" sz="2400" dirty="0" smtClean="0"/>
-              <a:t>          but now of x+1 ...))))</a:t>
-            </a:r>
-            <a:endParaRPr lang="en-US" sz="2400" dirty="0"/>
+              <a:t>           but now of x+1 ...))))</a:t>
+            </a:r>
           </a:p>
         </p:txBody>
       </p:sp>
@@ -8945,13 +8691,6 @@
   <p:clrMapOvr>
     <a:masterClrMapping/>
   </p:clrMapOvr>
-  <p:timing>
-    <p:tnLst>
-      <p:par>
-        <p:cTn id="1" dur="indefinite" restart="never" nodeType="tmRoot"/>
-      </p:par>
-    </p:tnLst>
-  </p:timing>
 </p:sld>
 </file>
 
@@ -8988,14 +8727,13 @@
           <a:lstStyle/>
           <a:p>
             <a:r>
-              <a:rPr lang="en-US" dirty="0" smtClean="0"/>
+              <a:rPr lang="en-US" dirty="0"/>
               <a:t>Use case for </a:t>
             </a:r>
             <a:r>
-              <a:rPr lang="en-US" b="1" dirty="0" smtClean="0"/>
+              <a:rPr lang="en-US" b="1" dirty="0"/>
               <a:t>super</a:t>
             </a:r>
-            <a:endParaRPr lang="en-US" b="1" dirty="0"/>
           </a:p>
         </p:txBody>
       </p:sp>
@@ -9027,7 +8765,7 @@
               </a:spcBef>
             </a:pPr>
             <a:r>
-              <a:rPr lang="en-US" sz="2400" dirty="0" smtClean="0"/>
+              <a:rPr lang="en-US" sz="2400" dirty="0"/>
               <a:t>(define the-superclass%</a:t>
             </a:r>
           </a:p>
@@ -9039,11 +8777,7 @@
             </a:pPr>
             <a:r>
               <a:rPr lang="en-US" sz="2400" dirty="0"/>
-              <a:t> </a:t>
-            </a:r>
-            <a:r>
-              <a:rPr lang="en-US" sz="2400" dirty="0" smtClean="0"/>
-              <a:t> (class* object% ()</a:t>
+              <a:t>  (class* object% ()</a:t>
             </a:r>
           </a:p>
           <a:p>
@@ -9054,11 +8788,7 @@
             </a:pPr>
             <a:r>
               <a:rPr lang="en-US" sz="2400" dirty="0"/>
-              <a:t> </a:t>
-            </a:r>
-            <a:r>
-              <a:rPr lang="en-US" sz="2400" dirty="0" smtClean="0"/>
-              <a:t>  (define/public (m1 x)</a:t>
+              <a:t>   (define/public (m1 x)</a:t>
             </a:r>
           </a:p>
           <a:p>
@@ -9069,11 +8799,7 @@
             </a:pPr>
             <a:r>
               <a:rPr lang="en-US" sz="2400" dirty="0"/>
-              <a:t> </a:t>
-            </a:r>
-            <a:r>
-              <a:rPr lang="en-US" sz="2400" dirty="0" smtClean="0"/>
-              <a:t>    (... big-hairy function of x ...))))</a:t>
+              <a:t>     (... big-hairy function of x ...))))</a:t>
             </a:r>
           </a:p>
           <a:p>
@@ -9091,7 +8817,7 @@
               </a:spcBef>
             </a:pPr>
             <a:r>
-              <a:rPr lang="en-US" sz="2400" dirty="0" smtClean="0"/>
+              <a:rPr lang="en-US" sz="2400" dirty="0"/>
               <a:t>(define the-subclass%</a:t>
             </a:r>
           </a:p>
@@ -9103,11 +8829,7 @@
             </a:pPr>
             <a:r>
               <a:rPr lang="en-US" sz="2400" dirty="0"/>
-              <a:t> </a:t>
-            </a:r>
-            <a:r>
-              <a:rPr lang="en-US" sz="2400" dirty="0" smtClean="0"/>
-              <a:t> (class* the-superclass% ()</a:t>
+              <a:t>  (class* the-superclass% ()</a:t>
             </a:r>
           </a:p>
           <a:p>
@@ -9118,11 +8840,7 @@
             </a:pPr>
             <a:r>
               <a:rPr lang="en-US" sz="2400" dirty="0"/>
-              <a:t> </a:t>
-            </a:r>
-            <a:r>
-              <a:rPr lang="en-US" sz="2400" dirty="0" smtClean="0"/>
-              <a:t>   (define/public (m1 x)</a:t>
+              <a:t>    (define/public (m1 x)</a:t>
             </a:r>
           </a:p>
           <a:p>
@@ -9133,13 +8851,8 @@
             </a:pPr>
             <a:r>
               <a:rPr lang="en-US" sz="2400" dirty="0"/>
-              <a:t> </a:t>
-            </a:r>
-            <a:r>
-              <a:rPr lang="en-US" sz="2400" dirty="0" smtClean="0"/>
-              <a:t>     (super m1 (+ x 1)))))</a:t>
-            </a:r>
-            <a:endParaRPr lang="en-US" sz="2400" dirty="0"/>
+              <a:t>      (super m1 (+ x 1)))))</a:t>
+            </a:r>
           </a:p>
         </p:txBody>
       </p:sp>
@@ -9273,10 +8986,9 @@
           </a:lstStyle>
           <a:p>
             <a:r>
-              <a:rPr lang="en-US" dirty="0" smtClean="0"/>
+              <a:rPr lang="en-US" dirty="0"/>
               <a:t>This calls m1 in the superclass.</a:t>
             </a:r>
-            <a:endParaRPr lang="en-US" dirty="0"/>
           </a:p>
         </p:txBody>
       </p:sp>
@@ -9367,13 +9079,6 @@
   <p:clrMapOvr>
     <a:masterClrMapping/>
   </p:clrMapOvr>
-  <p:timing>
-    <p:tnLst>
-      <p:par>
-        <p:cTn id="1" dur="indefinite" restart="never" nodeType="tmRoot"/>
-      </p:par>
-    </p:tnLst>
-  </p:timing>
 </p:sld>
 </file>
 
@@ -9412,14 +9117,13 @@
           <a:lstStyle/>
           <a:p>
             <a:r>
-              <a:rPr lang="en-US" dirty="0" smtClean="0"/>
+              <a:rPr lang="en-US" dirty="0"/>
               <a:t>You can call any method in the </a:t>
             </a:r>
             <a:r>
-              <a:rPr lang="en-US" b="1" dirty="0" smtClean="0"/>
+              <a:rPr lang="en-US" b="1" dirty="0"/>
               <a:t>super</a:t>
             </a:r>
-            <a:endParaRPr lang="en-US" b="1" dirty="0"/>
           </a:p>
         </p:txBody>
       </p:sp>
@@ -9451,7 +9155,7 @@
               </a:spcBef>
             </a:pPr>
             <a:r>
-              <a:rPr lang="en-US" sz="2400" dirty="0" smtClean="0"/>
+              <a:rPr lang="en-US" sz="2400" dirty="0"/>
               <a:t>(define the-superclass%</a:t>
             </a:r>
           </a:p>
@@ -9463,17 +9167,8 @@
             </a:pPr>
             <a:r>
               <a:rPr lang="en-US" sz="2400" dirty="0"/>
-              <a:t> </a:t>
-            </a:r>
-            <a:r>
-              <a:rPr lang="en-US" sz="2400" dirty="0" smtClean="0"/>
-              <a:t> (class* object% </a:t>
-            </a:r>
-            <a:r>
-              <a:rPr lang="en-US" sz="2400" dirty="0" smtClean="0"/>
-              <a:t>(...)</a:t>
-            </a:r>
-            <a:endParaRPr lang="en-US" sz="2400" dirty="0" smtClean="0"/>
+              <a:t>  (class* object% (...)</a:t>
+            </a:r>
           </a:p>
           <a:p>
             <a:pPr>
@@ -9483,11 +9178,7 @@
             </a:pPr>
             <a:r>
               <a:rPr lang="en-US" sz="2400" dirty="0"/>
-              <a:t> </a:t>
-            </a:r>
-            <a:r>
-              <a:rPr lang="en-US" sz="2400" dirty="0" smtClean="0"/>
-              <a:t>  (define/public (m1 x)</a:t>
+              <a:t>   (define/public (m1 x)</a:t>
             </a:r>
           </a:p>
           <a:p>
@@ -9498,11 +9189,7 @@
             </a:pPr>
             <a:r>
               <a:rPr lang="en-US" sz="2400" dirty="0"/>
-              <a:t> </a:t>
-            </a:r>
-            <a:r>
-              <a:rPr lang="en-US" sz="2400" dirty="0" smtClean="0"/>
-              <a:t>    (... big-hairy function of x ...))))</a:t>
+              <a:t>     (... big-hairy function of x ...))))</a:t>
             </a:r>
           </a:p>
           <a:p>
@@ -9520,7 +9207,7 @@
               </a:spcBef>
             </a:pPr>
             <a:r>
-              <a:rPr lang="en-US" sz="2400" dirty="0" smtClean="0"/>
+              <a:rPr lang="en-US" sz="2400" dirty="0"/>
               <a:t>(define the-subclass%</a:t>
             </a:r>
           </a:p>
@@ -9532,17 +9219,8 @@
             </a:pPr>
             <a:r>
               <a:rPr lang="en-US" sz="2400" dirty="0"/>
-              <a:t> </a:t>
-            </a:r>
-            <a:r>
-              <a:rPr lang="en-US" sz="2400" dirty="0" smtClean="0"/>
-              <a:t> (class* the-superclass% </a:t>
-            </a:r>
-            <a:r>
-              <a:rPr lang="en-US" sz="2400" dirty="0" smtClean="0"/>
-              <a:t>(...)</a:t>
-            </a:r>
-            <a:endParaRPr lang="en-US" sz="2400" dirty="0" smtClean="0"/>
+              <a:t>  (class* the-superclass% (...)</a:t>
+            </a:r>
           </a:p>
           <a:p>
             <a:pPr>
@@ -9552,11 +9230,7 @@
             </a:pPr>
             <a:r>
               <a:rPr lang="en-US" sz="2400" dirty="0"/>
-              <a:t> </a:t>
-            </a:r>
-            <a:r>
-              <a:rPr lang="en-US" sz="2400" dirty="0" smtClean="0"/>
-              <a:t>   (define/public (m2 x)</a:t>
+              <a:t>    (define/public (m2 x)</a:t>
             </a:r>
           </a:p>
           <a:p>
@@ -9567,15 +9241,7 @@
             </a:pPr>
             <a:r>
               <a:rPr lang="en-US" sz="2400" dirty="0"/>
-              <a:t> </a:t>
-            </a:r>
-            <a:r>
-              <a:rPr lang="en-US" sz="2400" dirty="0" smtClean="0"/>
-              <a:t>     (super m1 (+ x 1</a:t>
-            </a:r>
-            <a:r>
-              <a:rPr lang="en-US" sz="2400" dirty="0" smtClean="0"/>
-              <a:t>)))</a:t>
+              <a:t>      (super m1 (+ x 1)))</a:t>
             </a:r>
           </a:p>
           <a:p>
@@ -9586,17 +9252,8 @@
             </a:pPr>
             <a:r>
               <a:rPr lang="en-US" sz="2400" dirty="0"/>
-              <a:t> </a:t>
-            </a:r>
-            <a:r>
-              <a:rPr lang="en-US" sz="2400" dirty="0" smtClean="0"/>
-              <a:t>   (define/public (m1 x) "this is noise"</a:t>
-            </a:r>
-            <a:r>
-              <a:rPr lang="en-US" sz="2400" dirty="0" smtClean="0"/>
-              <a:t>)) ))</a:t>
-            </a:r>
-            <a:endParaRPr lang="en-US" sz="2400" dirty="0"/>
+              <a:t>    (define/public (m1 x) "this is noise")) ))</a:t>
+            </a:r>
           </a:p>
         </p:txBody>
       </p:sp>
@@ -9706,26 +9363,25 @@
           <a:lstStyle/>
           <a:p>
             <a:r>
-              <a:rPr lang="en-US" dirty="0" smtClean="0"/>
+              <a:rPr lang="en-US" dirty="0"/>
               <a:t>Here method </a:t>
             </a:r>
             <a:r>
-              <a:rPr lang="en-US" b="1" dirty="0" smtClean="0"/>
+              <a:rPr lang="en-US" b="1" dirty="0"/>
               <a:t>m2</a:t>
             </a:r>
             <a:r>
-              <a:rPr lang="en-US" dirty="0" smtClean="0"/>
+              <a:rPr lang="en-US" dirty="0"/>
               <a:t> in the subclass calls method </a:t>
             </a:r>
             <a:r>
-              <a:rPr lang="en-US" b="1" dirty="0" smtClean="0"/>
+              <a:rPr lang="en-US" b="1" dirty="0"/>
               <a:t>m1</a:t>
             </a:r>
             <a:r>
-              <a:rPr lang="en-US" dirty="0" smtClean="0"/>
+              <a:rPr lang="en-US" dirty="0"/>
               <a:t> in the superclass.</a:t>
             </a:r>
-            <a:endParaRPr lang="en-US" dirty="0"/>
           </a:p>
         </p:txBody>
       </p:sp>
@@ -9775,7 +9431,7 @@
           <a:lstStyle/>
           <a:p>
             <a:r>
-              <a:rPr lang="en-US" sz="1400" dirty="0" smtClean="0">
+              <a:rPr lang="en-US" sz="1400" dirty="0">
                 <a:solidFill>
                   <a:schemeClr val="tx1"/>
                 </a:solidFill>
@@ -9783,7 +9439,7 @@
               <a:t>In Racket, you can't call </a:t>
             </a:r>
             <a:r>
-              <a:rPr lang="en-US" sz="1400" b="1" dirty="0" smtClean="0">
+              <a:rPr lang="en-US" sz="1400" b="1" dirty="0">
                 <a:solidFill>
                   <a:schemeClr val="tx1"/>
                 </a:solidFill>
@@ -9791,7 +9447,7 @@
               <a:t>(super m1 ...) </a:t>
             </a:r>
             <a:r>
-              <a:rPr lang="en-US" sz="1400" dirty="0" smtClean="0">
+              <a:rPr lang="en-US" sz="1400" dirty="0">
                 <a:solidFill>
                   <a:schemeClr val="tx1"/>
                 </a:solidFill>
@@ -9799,7 +9455,7 @@
               <a:t>unless </a:t>
             </a:r>
             <a:r>
-              <a:rPr lang="en-US" sz="1400" b="1" dirty="0" smtClean="0">
+              <a:rPr lang="en-US" sz="1400" b="1" dirty="0">
                 <a:solidFill>
                   <a:schemeClr val="tx1"/>
                 </a:solidFill>
@@ -9807,18 +9463,13 @@
               <a:t>m1</a:t>
             </a:r>
             <a:r>
-              <a:rPr lang="en-US" sz="1400" dirty="0" smtClean="0">
+              <a:rPr lang="en-US" sz="1400" dirty="0">
                 <a:solidFill>
                   <a:schemeClr val="tx1"/>
                 </a:solidFill>
               </a:rPr>
               <a:t> is already defined in the current class.   This is a wart in the Racket object system.  If we were in a different system, this would not be necessary.  Sorry about that.</a:t>
             </a:r>
-            <a:endParaRPr lang="en-US" sz="1400" dirty="0">
-              <a:solidFill>
-                <a:schemeClr val="tx1"/>
-              </a:solidFill>
-            </a:endParaRPr>
           </a:p>
         </p:txBody>
       </p:sp>
@@ -9832,13 +9483,6 @@
   <p:clrMapOvr>
     <a:masterClrMapping/>
   </p:clrMapOvr>
-  <p:timing>
-    <p:tnLst>
-      <p:par>
-        <p:cTn id="1" dur="indefinite" restart="never" nodeType="tmRoot"/>
-      </p:par>
-    </p:tnLst>
-  </p:timing>
 </p:sld>
 </file>
 
@@ -9875,22 +9519,21 @@
           <a:lstStyle/>
           <a:p>
             <a:r>
-              <a:rPr lang="en-US" b="1" dirty="0" smtClean="0"/>
+              <a:rPr lang="en-US" b="1" dirty="0"/>
               <a:t>this</a:t>
             </a:r>
             <a:r>
-              <a:rPr lang="en-US" dirty="0" smtClean="0"/>
+              <a:rPr lang="en-US" dirty="0"/>
               <a:t> and </a:t>
             </a:r>
             <a:r>
-              <a:rPr lang="en-US" b="1" dirty="0" smtClean="0"/>
+              <a:rPr lang="en-US" b="1" dirty="0"/>
               <a:t>super</a:t>
             </a:r>
             <a:r>
-              <a:rPr lang="en-US" dirty="0" smtClean="0"/>
+              <a:rPr lang="en-US" dirty="0"/>
               <a:t>, summarized</a:t>
             </a:r>
-            <a:endParaRPr lang="en-US" dirty="0"/>
           </a:p>
         </p:txBody>
       </p:sp>
@@ -9912,7 +9555,7 @@
           <a:lstStyle/>
           <a:p>
             <a:r>
-              <a:rPr lang="en-US" dirty="0" smtClean="0"/>
+              <a:rPr lang="en-US" dirty="0"/>
               <a:t>The rules for this and super can be summarized as:</a:t>
             </a:r>
           </a:p>
@@ -9921,66 +9564,48 @@
               <a:buNone/>
             </a:pPr>
             <a:r>
-              <a:rPr lang="en-US" b="1" dirty="0" smtClean="0"/>
+              <a:rPr lang="en-US" b="1" dirty="0"/>
               <a:t>this</a:t>
             </a:r>
             <a:r>
-              <a:rPr lang="en-US" dirty="0" smtClean="0"/>
+              <a:rPr lang="en-US" dirty="0"/>
               <a:t> is dynamic, </a:t>
             </a:r>
             <a:r>
-              <a:rPr lang="en-US" b="1" dirty="0" smtClean="0"/>
+              <a:rPr lang="en-US" b="1" dirty="0"/>
               <a:t>super</a:t>
             </a:r>
             <a:r>
-              <a:rPr lang="en-US" dirty="0" smtClean="0"/>
+              <a:rPr lang="en-US" dirty="0"/>
               <a:t> is static </a:t>
             </a:r>
-            <a:endParaRPr lang="en-US" dirty="0"/>
-          </a:p>
-          <a:p>
-            <a:r>
-              <a:rPr lang="en-US" dirty="0" smtClean="0"/>
+          </a:p>
+          <a:p>
+            <a:r>
+              <a:rPr lang="en-US" dirty="0"/>
               <a:t>This simple rule can lead to interesting behavior</a:t>
             </a:r>
           </a:p>
           <a:p>
             <a:pPr lvl="1"/>
             <a:r>
-              <a:rPr lang="en-US" dirty="0" smtClean="0"/>
-              <a:t>Do </a:t>
-            </a:r>
-            <a:r>
-              <a:rPr lang="en-US" dirty="0" smtClean="0"/>
-              <a:t>Guided Practices 11.1 </a:t>
-            </a:r>
-            <a:r>
-              <a:rPr lang="en-US" dirty="0" smtClean="0"/>
-              <a:t>and </a:t>
-            </a:r>
-            <a:r>
-              <a:rPr lang="en-US" dirty="0" smtClean="0"/>
-              <a:t>11.2 </a:t>
-            </a:r>
-            <a:r>
-              <a:rPr lang="en-US" dirty="0" smtClean="0"/>
-              <a:t>to learn more about this.</a:t>
-            </a:r>
-          </a:p>
-          <a:p>
-            <a:r>
-              <a:rPr lang="en-US" dirty="0" smtClean="0"/>
+              <a:rPr lang="en-US" dirty="0"/>
+              <a:t>Do Guided Practices 11.1 and 11.2 to learn more about this.</a:t>
+            </a:r>
+          </a:p>
+          <a:p>
+            <a:r>
+              <a:rPr lang="en-US" dirty="0"/>
               <a:t>We will take great advantage of the dynamic nature of </a:t>
             </a:r>
             <a:r>
-              <a:rPr lang="en-US" b="1" dirty="0" smtClean="0"/>
+              <a:rPr lang="en-US" b="1" dirty="0"/>
               <a:t>this</a:t>
             </a:r>
             <a:r>
-              <a:rPr lang="en-US" dirty="0" smtClean="0"/>
+              <a:rPr lang="en-US" dirty="0"/>
               <a:t> in the next lesson.</a:t>
             </a:r>
-            <a:endParaRPr lang="en-US" dirty="0"/>
           </a:p>
         </p:txBody>
       </p:sp>
@@ -10018,13 +9643,6 @@
   <p:clrMapOvr>
     <a:masterClrMapping/>
   </p:clrMapOvr>
-  <p:timing>
-    <p:tnLst>
-      <p:par>
-        <p:cTn id="1" dur="indefinite" restart="never" nodeType="tmRoot"/>
-      </p:par>
-    </p:tnLst>
-  </p:timing>
 </p:sld>
 </file>
 
@@ -10061,10 +9679,9 @@
           <a:lstStyle/>
           <a:p>
             <a:r>
-              <a:rPr lang="en-US" dirty="0" smtClean="0"/>
+              <a:rPr lang="en-US" dirty="0"/>
               <a:t>Summary of Lesson 11.1</a:t>
             </a:r>
-            <a:endParaRPr lang="en-US" dirty="0"/>
           </a:p>
         </p:txBody>
       </p:sp>
@@ -10114,33 +9731,29 @@
           </a:p>
           <a:p>
             <a:r>
-              <a:rPr lang="en-US" dirty="0" smtClean="0"/>
+              <a:rPr lang="en-US" dirty="0"/>
               <a:t>We’ve seen the overriding-defaults pattern, in which a subclass overrides some methods of a complete superclass</a:t>
             </a:r>
           </a:p>
           <a:p>
             <a:r>
-              <a:rPr lang="en-US" dirty="0" smtClean="0"/>
+              <a:rPr lang="en-US" dirty="0"/>
               <a:t>We  learned how </a:t>
             </a:r>
             <a:r>
-              <a:rPr lang="en-US" b="1" dirty="0" smtClean="0"/>
+              <a:rPr lang="en-US" b="1" dirty="0"/>
               <a:t>this </a:t>
             </a:r>
             <a:r>
               <a:rPr lang="en-US" dirty="0"/>
-              <a:t>works with inheritance</a:t>
-            </a:r>
-            <a:r>
-              <a:rPr lang="en-US" dirty="0" smtClean="0"/>
-              <a:t>,  and what </a:t>
-            </a:r>
-            <a:r>
-              <a:rPr lang="en-US" b="1" dirty="0" smtClean="0"/>
+              <a:t>works with inheritance,  and what </a:t>
+            </a:r>
+            <a:r>
+              <a:rPr lang="en-US" b="1" dirty="0"/>
               <a:t>super</a:t>
             </a:r>
             <a:r>
-              <a:rPr lang="en-US" dirty="0" smtClean="0"/>
+              <a:rPr lang="en-US" dirty="0"/>
               <a:t> does.</a:t>
             </a:r>
           </a:p>
@@ -10180,13 +9793,6 @@
   <p:clrMapOvr>
     <a:masterClrMapping/>
   </p:clrMapOvr>
-  <p:timing>
-    <p:tnLst>
-      <p:par>
-        <p:cTn id="1" dur="indefinite" restart="never" nodeType="tmRoot"/>
-      </p:par>
-    </p:tnLst>
-  </p:timing>
 </p:sld>
 </file>
 
@@ -10225,10 +9831,9 @@
           <a:lstStyle/>
           <a:p>
             <a:r>
-              <a:rPr lang="en-US" dirty="0" smtClean="0"/>
+              <a:rPr lang="en-US" dirty="0"/>
               <a:t>Key Points for this Module</a:t>
             </a:r>
-            <a:endParaRPr lang="en-US" dirty="0"/>
           </a:p>
         </p:txBody>
       </p:sp>
@@ -10248,27 +9853,27 @@
           <a:lstStyle/>
           <a:p>
             <a:r>
-              <a:rPr lang="en-US" dirty="0" smtClean="0"/>
+              <a:rPr lang="en-US" dirty="0"/>
               <a:t>Inheritance is a technique for generalizing over common parts of class implementations.</a:t>
             </a:r>
           </a:p>
           <a:p>
             <a:r>
-              <a:rPr lang="en-US" dirty="0" smtClean="0"/>
+              <a:rPr lang="en-US" dirty="0"/>
               <a:t>When we create such a generalization, we specialize by </a:t>
             </a:r>
             <a:r>
-              <a:rPr lang="en-US" dirty="0" err="1" smtClean="0"/>
+              <a:rPr lang="en-US" dirty="0" err="1"/>
               <a:t>subclassing</a:t>
             </a:r>
             <a:r>
-              <a:rPr lang="en-US" dirty="0" smtClean="0"/>
+              <a:rPr lang="en-US" dirty="0"/>
               <a:t>.</a:t>
             </a:r>
           </a:p>
           <a:p>
             <a:r>
-              <a:rPr lang="en-US" dirty="0" smtClean="0"/>
+              <a:rPr lang="en-US" dirty="0"/>
               <a:t>Languages with inheritance have many new design choices.</a:t>
             </a:r>
           </a:p>
@@ -10303,13 +9908,6 @@
   <p:clrMapOvr>
     <a:masterClrMapping/>
   </p:clrMapOvr>
-  <p:timing>
-    <p:tnLst>
-      <p:par>
-        <p:cTn id="1" dur="indefinite" restart="never" nodeType="tmRoot"/>
-      </p:par>
-    </p:tnLst>
-  </p:timing>
 </p:sld>
 </file>
 
@@ -10346,10 +9944,9 @@
           <a:lstStyle/>
           <a:p>
             <a:r>
-              <a:rPr lang="en-US" dirty="0" smtClean="0"/>
+              <a:rPr lang="en-US" dirty="0"/>
               <a:t>Next Steps</a:t>
             </a:r>
-            <a:endParaRPr lang="en-US" dirty="0"/>
           </a:p>
         </p:txBody>
       </p:sp>
@@ -10369,28 +9966,27 @@
           <a:lstStyle/>
           <a:p>
             <a:r>
-              <a:rPr lang="en-US" dirty="0" smtClean="0"/>
+              <a:rPr lang="en-US" dirty="0"/>
               <a:t>Study 11-1-flashing-balls.rkt in the Examples folder.</a:t>
             </a:r>
           </a:p>
           <a:p>
             <a:r>
-              <a:rPr lang="en-US" dirty="0" smtClean="0"/>
+              <a:rPr lang="en-US" dirty="0"/>
               <a:t>If you have questions about this lesson, ask them on the Discussion Board.</a:t>
             </a:r>
           </a:p>
           <a:p>
             <a:r>
-              <a:rPr lang="en-US" dirty="0" smtClean="0"/>
+              <a:rPr lang="en-US" dirty="0"/>
               <a:t>Do the Guided Practices 11.1 and 11.2</a:t>
             </a:r>
           </a:p>
           <a:p>
             <a:r>
-              <a:rPr lang="en-US" dirty="0" smtClean="0"/>
+              <a:rPr lang="en-US" dirty="0"/>
               <a:t>Go on to the next lesson</a:t>
             </a:r>
-            <a:endParaRPr lang="en-US" dirty="0"/>
           </a:p>
         </p:txBody>
       </p:sp>
@@ -10428,13 +10024,6 @@
   <p:clrMapOvr>
     <a:masterClrMapping/>
   </p:clrMapOvr>
-  <p:timing>
-    <p:tnLst>
-      <p:par>
-        <p:cTn id="1" dur="indefinite" restart="never" nodeType="tmRoot"/>
-      </p:par>
-    </p:tnLst>
-  </p:timing>
 </p:sld>
 </file>
 
@@ -10490,10 +10079,9 @@
           <a:p>
             <a:pPr algn="ctr"/>
             <a:r>
-              <a:rPr lang="en-US" dirty="0" smtClean="0"/>
+              <a:rPr lang="en-US" dirty="0"/>
               <a:t>Generalization</a:t>
             </a:r>
-            <a:endParaRPr lang="en-US" dirty="0"/>
           </a:p>
         </p:txBody>
       </p:sp>
@@ -10538,10 +10126,9 @@
           <a:p>
             <a:pPr algn="ctr"/>
             <a:r>
-              <a:rPr lang="en-US" dirty="0" smtClean="0"/>
+              <a:rPr lang="en-US" dirty="0"/>
               <a:t>Over Constants</a:t>
             </a:r>
-            <a:endParaRPr lang="en-US" dirty="0"/>
           </a:p>
         </p:txBody>
       </p:sp>
@@ -10586,7 +10173,7 @@
           <a:p>
             <a:pPr algn="ctr"/>
             <a:r>
-              <a:rPr lang="en-US" dirty="0" smtClean="0"/>
+              <a:rPr lang="en-US" dirty="0"/>
               <a:t>Over Expressions</a:t>
             </a:r>
           </a:p>
@@ -10633,10 +10220,9 @@
           <a:p>
             <a:pPr algn="ctr"/>
             <a:r>
-              <a:rPr lang="en-US" dirty="0" smtClean="0"/>
+              <a:rPr lang="en-US" dirty="0"/>
               <a:t>Over Contexts</a:t>
             </a:r>
-            <a:endParaRPr lang="en-US" dirty="0"/>
           </a:p>
         </p:txBody>
       </p:sp>
@@ -10681,10 +10267,9 @@
           <a:p>
             <a:pPr algn="ctr"/>
             <a:r>
-              <a:rPr lang="en-US" dirty="0" smtClean="0"/>
+              <a:rPr lang="en-US" dirty="0"/>
               <a:t>Over Data Representations</a:t>
             </a:r>
-            <a:endParaRPr lang="en-US" dirty="0"/>
           </a:p>
         </p:txBody>
       </p:sp>
@@ -10725,10 +10310,9 @@
           <a:p>
             <a:pPr algn="ctr"/>
             <a:r>
-              <a:rPr lang="en-US" dirty="0" smtClean="0"/>
+              <a:rPr lang="en-US" dirty="0"/>
               <a:t>Over Method Implementations</a:t>
             </a:r>
-            <a:endParaRPr lang="en-US" dirty="0"/>
           </a:p>
         </p:txBody>
       </p:sp>
@@ -10787,10 +10371,9 @@
             <a:p>
               <a:pPr algn="ctr"/>
               <a:r>
-                <a:rPr lang="en-US" dirty="0" smtClean="0"/>
+                <a:rPr lang="en-US" dirty="0"/>
                 <a:t>Mixed Data</a:t>
               </a:r>
-              <a:endParaRPr lang="en-US" dirty="0"/>
             </a:p>
           </p:txBody>
         </p:sp>
@@ -10829,10 +10412,9 @@
             <a:p>
               <a:pPr algn="ctr"/>
               <a:r>
-                <a:rPr lang="en-US" dirty="0" smtClean="0"/>
+                <a:rPr lang="en-US" dirty="0"/>
                 <a:t>Data Representations</a:t>
               </a:r>
-              <a:endParaRPr lang="en-US" dirty="0"/>
             </a:p>
           </p:txBody>
         </p:sp>
@@ -10877,10 +10459,9 @@
             <a:p>
               <a:pPr algn="ctr"/>
               <a:r>
-                <a:rPr lang="en-US" dirty="0" smtClean="0"/>
+                <a:rPr lang="en-US" dirty="0"/>
                 <a:t>Basics</a:t>
               </a:r>
-              <a:endParaRPr lang="en-US" dirty="0"/>
             </a:p>
           </p:txBody>
         </p:sp>
@@ -10925,10 +10506,9 @@
             <a:p>
               <a:pPr algn="ctr"/>
               <a:r>
-                <a:rPr lang="en-US" dirty="0" smtClean="0"/>
+                <a:rPr lang="en-US" dirty="0"/>
                 <a:t>Recursive Data</a:t>
               </a:r>
-              <a:endParaRPr lang="en-US" dirty="0"/>
             </a:p>
           </p:txBody>
         </p:sp>
@@ -10973,10 +10553,9 @@
             <a:p>
               <a:pPr algn="ctr"/>
               <a:r>
-                <a:rPr lang="en-US" dirty="0" smtClean="0"/>
+                <a:rPr lang="en-US" dirty="0"/>
                 <a:t>Functional Data</a:t>
               </a:r>
-              <a:endParaRPr lang="en-US" dirty="0"/>
             </a:p>
           </p:txBody>
         </p:sp>
@@ -11021,10 +10600,9 @@
             <a:p>
               <a:pPr algn="ctr"/>
               <a:r>
-                <a:rPr lang="en-US" dirty="0" smtClean="0"/>
+                <a:rPr lang="en-US" dirty="0"/>
                 <a:t>Objects &amp; Classes</a:t>
               </a:r>
-              <a:endParaRPr lang="en-US" dirty="0"/>
             </a:p>
           </p:txBody>
         </p:sp>
@@ -11065,14 +10643,13 @@
             <a:p>
               <a:pPr algn="ctr"/>
               <a:r>
-                <a:rPr lang="en-US" dirty="0" err="1" smtClean="0"/>
+                <a:rPr lang="en-US" dirty="0" err="1"/>
                 <a:t>Stateful</a:t>
               </a:r>
               <a:r>
-                <a:rPr lang="en-US" dirty="0" smtClean="0"/>
+                <a:rPr lang="en-US" dirty="0"/>
                 <a:t> Objects</a:t>
               </a:r>
-              <a:endParaRPr lang="en-US" dirty="0"/>
             </a:p>
           </p:txBody>
         </p:sp>
@@ -11375,7 +10952,7 @@
           <a:p>
             <a:pPr algn="ctr"/>
             <a:r>
-              <a:rPr lang="en-US" sz="4400" smtClean="0"/>
+              <a:rPr lang="en-US" sz="4400"/>
               <a:t>Module 11</a:t>
             </a:r>
             <a:endParaRPr lang="en-US" sz="4400" dirty="0">
@@ -11604,10 +11181,9 @@
             <a:p>
               <a:pPr algn="ctr"/>
               <a:r>
-                <a:rPr lang="en-US" dirty="0" smtClean="0"/>
+                <a:rPr lang="en-US" dirty="0"/>
                 <a:t>Design Strategies</a:t>
               </a:r>
-              <a:endParaRPr lang="en-US" dirty="0"/>
             </a:p>
           </p:txBody>
         </p:sp>
@@ -11652,10 +11228,9 @@
             <a:p>
               <a:pPr algn="ctr"/>
               <a:r>
-                <a:rPr lang="en-US" dirty="0" smtClean="0"/>
+                <a:rPr lang="en-US" dirty="0"/>
                 <a:t>Combine simpler functions</a:t>
               </a:r>
-              <a:endParaRPr lang="en-US" dirty="0"/>
             </a:p>
           </p:txBody>
         </p:sp>
@@ -11700,10 +11275,9 @@
             <a:p>
               <a:pPr algn="ctr"/>
               <a:r>
-                <a:rPr lang="en-US" dirty="0" smtClean="0"/>
+                <a:rPr lang="en-US" dirty="0"/>
                 <a:t>Use a template</a:t>
               </a:r>
-              <a:endParaRPr lang="en-US" dirty="0"/>
             </a:p>
           </p:txBody>
         </p:sp>
@@ -11748,10 +11322,9 @@
             <a:p>
               <a:pPr algn="ctr"/>
               <a:r>
-                <a:rPr lang="en-US" dirty="0" smtClean="0"/>
+                <a:rPr lang="en-US" dirty="0"/>
                 <a:t>Divide into Cases</a:t>
               </a:r>
-              <a:endParaRPr lang="en-US" dirty="0"/>
             </a:p>
           </p:txBody>
         </p:sp>
@@ -11796,10 +11369,9 @@
             <a:p>
               <a:pPr algn="ctr"/>
               <a:r>
-                <a:rPr lang="en-US" dirty="0" smtClean="0"/>
+                <a:rPr lang="en-US" dirty="0"/>
                 <a:t>Call a more general function</a:t>
               </a:r>
-              <a:endParaRPr lang="en-US" dirty="0"/>
             </a:p>
           </p:txBody>
         </p:sp>
@@ -11840,10 +11412,9 @@
             <a:p>
               <a:pPr algn="ctr"/>
               <a:r>
-                <a:rPr lang="en-US" dirty="0" smtClean="0"/>
+                <a:rPr lang="en-US" dirty="0"/>
                 <a:t>Communicate via State</a:t>
               </a:r>
-              <a:endParaRPr lang="en-US" dirty="0"/>
             </a:p>
           </p:txBody>
         </p:sp>
@@ -12032,11 +11603,11 @@
             <a:p>
               <a:pPr algn="ctr"/>
               <a:r>
-                <a:rPr lang="en-US" dirty="0" smtClean="0"/>
+                <a:rPr lang="en-US" dirty="0"/>
                 <a:t>Recur on </a:t>
               </a:r>
               <a:r>
-                <a:rPr lang="en-US" dirty="0" err="1" smtClean="0"/>
+                <a:rPr lang="en-US" dirty="0" err="1"/>
                 <a:t>subproblem</a:t>
               </a:r>
               <a:endParaRPr lang="en-US" dirty="0"/>
@@ -12090,13 +11661,6 @@
   <p:clrMapOvr>
     <a:masterClrMapping/>
   </p:clrMapOvr>
-  <p:timing>
-    <p:tnLst>
-      <p:par>
-        <p:cTn id="1" dur="indefinite" restart="never" nodeType="tmRoot"/>
-      </p:par>
-    </p:tnLst>
-  </p:timing>
 </p:sld>
 </file>
 
@@ -12137,10 +11701,9 @@
           <a:lstStyle/>
           <a:p>
             <a:r>
-              <a:rPr lang="en-US" dirty="0" smtClean="0"/>
+              <a:rPr lang="en-US" dirty="0"/>
               <a:t>Key Points for Lesson 11.1</a:t>
             </a:r>
-            <a:endParaRPr lang="en-US" dirty="0"/>
           </a:p>
         </p:txBody>
       </p:sp>
@@ -12160,16 +11723,23 @@
           <a:lstStyle/>
           <a:p>
             <a:r>
-              <a:rPr lang="en-US" dirty="0" smtClean="0"/>
-              <a:t>By the end of this lesson you should be able to explain how objects find methods by searching up the inheritance chain.</a:t>
-            </a:r>
-          </a:p>
-          <a:p>
-            <a:r>
-              <a:rPr lang="en-US" dirty="0" smtClean="0"/>
+              <a:rPr lang="en-US" dirty="0"/>
+              <a:t>By the end of this lesson you should be able to</a:t>
+            </a:r>
+          </a:p>
+          <a:p>
+            <a:pPr lvl="1"/>
+            <a:r>
+              <a:rPr lang="en-US" dirty="0"/>
+              <a:t>Explain how objects find methods by searching up the inheritance chain.</a:t>
+            </a:r>
+          </a:p>
+          <a:p>
+            <a:pPr lvl="1"/>
+            <a:r>
+              <a:rPr lang="en-US" dirty="0"/>
               <a:t>Use the overriding-defaults pattern to introduce small variations of a class.</a:t>
             </a:r>
-            <a:endParaRPr lang="en-US" dirty="0"/>
           </a:p>
         </p:txBody>
       </p:sp>
@@ -12207,13 +11777,6 @@
   <p:clrMapOvr>
     <a:masterClrMapping/>
   </p:clrMapOvr>
-  <p:timing>
-    <p:tnLst>
-      <p:par>
-        <p:cTn id="1" dur="indefinite" restart="never" nodeType="tmRoot"/>
-      </p:par>
-    </p:tnLst>
-  </p:timing>
 </p:sld>
 </file>
 
@@ -12250,10 +11813,9 @@
           <a:lstStyle/>
           <a:p>
             <a:r>
-              <a:rPr lang="en-US" dirty="0" smtClean="0"/>
+              <a:rPr lang="en-US" dirty="0"/>
               <a:t>Example: 11-1-flashing-balls</a:t>
             </a:r>
-            <a:endParaRPr lang="en-US" dirty="0"/>
           </a:p>
         </p:txBody>
       </p:sp>
@@ -12276,42 +11838,30 @@
               <a:rPr lang="en-US" dirty="0"/>
               <a:t>Sometimes we want to define a new class that is just a small variation of an old class.   </a:t>
             </a:r>
-            <a:endParaRPr lang="en-US" dirty="0" smtClean="0"/>
-          </a:p>
-          <a:p>
-            <a:r>
-              <a:rPr lang="en-US" dirty="0" smtClean="0"/>
-              <a:t>For </a:t>
-            </a:r>
-            <a:r>
-              <a:rPr lang="en-US" dirty="0"/>
-              <a:t>example, we might want to make a ball that flashes different colors.  </a:t>
-            </a:r>
-            <a:endParaRPr lang="en-US" dirty="0" smtClean="0"/>
-          </a:p>
-          <a:p>
-            <a:r>
-              <a:rPr lang="en-US" dirty="0" smtClean="0"/>
+          </a:p>
+          <a:p>
+            <a:r>
+              <a:rPr lang="en-US" dirty="0"/>
+              <a:t>For example, we might want to make a ball that flashes different colors.  </a:t>
+            </a:r>
+          </a:p>
+          <a:p>
+            <a:r>
+              <a:rPr lang="en-US" dirty="0"/>
               <a:t>To do this, create a subclass that inherits from the old class (the "superclass").</a:t>
             </a:r>
-            <a:endParaRPr lang="en-US" dirty="0"/>
-          </a:p>
-          <a:p>
-            <a:r>
-              <a:rPr lang="en-US" dirty="0"/>
-              <a:t>We call this the "overriding defaults" pattern</a:t>
-            </a:r>
-            <a:r>
-              <a:rPr lang="en-US" dirty="0" smtClean="0"/>
-              <a:t>.</a:t>
-            </a:r>
-          </a:p>
-          <a:p>
-            <a:r>
-              <a:rPr lang="en-US" dirty="0" smtClean="0"/>
+          </a:p>
+          <a:p>
+            <a:r>
+              <a:rPr lang="en-US" dirty="0"/>
+              <a:t>We call this the "overriding defaults" pattern.</a:t>
+            </a:r>
+          </a:p>
+          <a:p>
+            <a:r>
+              <a:rPr lang="en-US" dirty="0"/>
               <a:t>Let's look at some code.</a:t>
             </a:r>
-            <a:endParaRPr lang="en-US" dirty="0"/>
           </a:p>
           <a:p>
             <a:endParaRPr lang="en-US" dirty="0"/>
@@ -12352,13 +11902,6 @@
   <p:clrMapOvr>
     <a:masterClrMapping/>
   </p:clrMapOvr>
-  <p:timing>
-    <p:tnLst>
-      <p:par>
-        <p:cTn id="1" dur="indefinite" restart="never" nodeType="tmRoot"/>
-      </p:par>
-    </p:tnLst>
-  </p:timing>
 </p:sld>
 </file>
 
@@ -12395,14 +11938,13 @@
           <a:lstStyle/>
           <a:p>
             <a:r>
-              <a:rPr lang="en-US" b="1" dirty="0" err="1" smtClean="0"/>
+              <a:rPr lang="en-US" b="1" dirty="0" err="1"/>
               <a:t>FlashingBall</a:t>
             </a:r>
             <a:r>
-              <a:rPr lang="en-US" b="1" dirty="0" smtClean="0"/>
+              <a:rPr lang="en-US" b="1" dirty="0"/>
               <a:t>%</a:t>
             </a:r>
-            <a:endParaRPr lang="en-US" b="1" dirty="0"/>
           </a:p>
         </p:txBody>
       </p:sp>
@@ -12433,29 +11975,13 @@
             </a:r>
             <a:r>
               <a:rPr lang="en-US" dirty="0"/>
-              <a:t>% is like a Ball%, but it </a:t>
-            </a:r>
-            <a:r>
-              <a:rPr lang="en-US" dirty="0" smtClean="0"/>
-              <a:t>displays</a:t>
-            </a:r>
-          </a:p>
-          <a:p>
-            <a:r>
-              <a:rPr lang="en-US" dirty="0" smtClean="0"/>
-              <a:t>;; </a:t>
-            </a:r>
-            <a:r>
-              <a:rPr lang="en-US" dirty="0"/>
-              <a:t>differently: </a:t>
-            </a:r>
-            <a:r>
-              <a:rPr lang="en-US" dirty="0" smtClean="0"/>
-              <a:t>it </a:t>
-            </a:r>
-            <a:r>
-              <a:rPr lang="en-US" dirty="0"/>
-              <a:t>changes color on every fourth tick</a:t>
+              <a:t>% is like a Ball%, but it displays</a:t>
+            </a:r>
+          </a:p>
+          <a:p>
+            <a:r>
+              <a:rPr lang="en-US" dirty="0"/>
+              <a:t>;; differently: it changes color on every fourth tick</a:t>
             </a:r>
           </a:p>
           <a:p>
@@ -12463,12 +11989,8 @@
           </a:p>
           <a:p>
             <a:r>
-              <a:rPr lang="en-US" dirty="0" smtClean="0"/>
-              <a:t>(</a:t>
-            </a:r>
-            <a:r>
-              <a:rPr lang="en-US" dirty="0"/>
-              <a:t>define </a:t>
+              <a:rPr lang="en-US" dirty="0"/>
+              <a:t>(define </a:t>
             </a:r>
             <a:r>
               <a:rPr lang="en-US" dirty="0" err="1"/>
@@ -12483,14 +12005,6 @@
             <a:r>
               <a:rPr lang="en-US" dirty="0"/>
               <a:t>  (class* </a:t>
-            </a:r>
-            <a:r>
-              <a:rPr lang="en-US" dirty="0" smtClean="0">
-                <a:solidFill>
-                  <a:srgbClr val="FF0000"/>
-                </a:solidFill>
-              </a:rPr>
-              <a:t>Ball</a:t>
             </a:r>
             <a:r>
               <a:rPr lang="en-US" dirty="0">
@@ -12498,15 +12012,11 @@
                   <a:srgbClr val="FF0000"/>
                 </a:solidFill>
               </a:rPr>
-              <a:t>%  </a:t>
-            </a:r>
-            <a:r>
-              <a:rPr lang="en-US" dirty="0" smtClean="0"/>
-              <a:t>; </a:t>
-            </a:r>
-            <a:r>
-              <a:rPr lang="en-US" dirty="0"/>
-              <a:t>inherits from Ball%</a:t>
+              <a:t>Ball%  </a:t>
+            </a:r>
+            <a:r>
+              <a:rPr lang="en-US" dirty="0"/>
+              <a:t>; inherits from Ball%</a:t>
             </a:r>
           </a:p>
           <a:p>
@@ -12520,122 +12030,78 @@
             </a:r>
             <a:r>
               <a:rPr lang="en-US" dirty="0"/>
-              <a:t>&lt;%&gt;)   </a:t>
-            </a:r>
-            <a:r>
-              <a:rPr lang="en-US" dirty="0" smtClean="0"/>
-              <a:t>; implements same interface</a:t>
-            </a:r>
+              <a:t>&lt;%&gt;)   ; implements same interface</a:t>
+            </a:r>
+          </a:p>
+          <a:p>
             <a:endParaRPr lang="en-US" dirty="0"/>
           </a:p>
           <a:p>
+            <a:r>
+              <a:rPr lang="en-US" dirty="0"/>
+              <a:t>    </a:t>
+            </a:r>
+          </a:p>
+          <a:p>
             <a:endParaRPr lang="en-US" dirty="0"/>
           </a:p>
           <a:p>
+            <a:endParaRPr lang="en-US" dirty="0"/>
+          </a:p>
+          <a:p>
+            <a:endParaRPr lang="en-US" dirty="0"/>
+          </a:p>
+          <a:p>
+            <a:endParaRPr lang="en-US" dirty="0"/>
+          </a:p>
+          <a:p>
+            <a:endParaRPr lang="en-US" dirty="0"/>
+          </a:p>
+          <a:p>
+            <a:r>
+              <a:rPr lang="en-US" dirty="0"/>
+              <a:t>    ;; number of ticks between color changes</a:t>
+            </a:r>
+          </a:p>
+          <a:p>
+            <a:r>
+              <a:rPr lang="en-US" dirty="0"/>
+              <a:t>    (field [color-change-interval 4])</a:t>
+            </a:r>
+          </a:p>
+          <a:p>
             <a:r>
               <a:rPr lang="en-US" dirty="0"/>
               <a:t>    </a:t>
             </a:r>
-            <a:endParaRPr lang="en-US" dirty="0" smtClean="0"/>
+          </a:p>
+          <a:p>
+            <a:r>
+              <a:rPr lang="en-US" dirty="0"/>
+              <a:t>    ;; time left </a:t>
+            </a:r>
+            <a:r>
+              <a:rPr lang="en-US" dirty="0" err="1"/>
+              <a:t>til</a:t>
+            </a:r>
+            <a:r>
+              <a:rPr lang="en-US" dirty="0"/>
+              <a:t> next color change</a:t>
+            </a:r>
+          </a:p>
+          <a:p>
+            <a:r>
+              <a:rPr lang="en-US" dirty="0"/>
+              <a:t>    (field [time-left color-change-interval])</a:t>
+            </a:r>
           </a:p>
           <a:p>
             <a:endParaRPr lang="en-US" dirty="0"/>
           </a:p>
           <a:p>
-            <a:endParaRPr lang="en-US" dirty="0" smtClean="0"/>
-          </a:p>
-          <a:p>
-            <a:endParaRPr lang="en-US" dirty="0"/>
-          </a:p>
-          <a:p>
-            <a:endParaRPr lang="en-US" dirty="0" smtClean="0"/>
-          </a:p>
-          <a:p>
-            <a:endParaRPr lang="en-US" dirty="0"/>
-          </a:p>
-          <a:p>
-            <a:r>
-              <a:rPr lang="en-US" dirty="0" smtClean="0"/>
-              <a:t>    ;; number of ticks between color changes</a:t>
-            </a:r>
-          </a:p>
-          <a:p>
-            <a:r>
-              <a:rPr lang="en-US" dirty="0"/>
-              <a:t> </a:t>
-            </a:r>
-            <a:r>
-              <a:rPr lang="en-US" dirty="0" smtClean="0"/>
-              <a:t>   (</a:t>
-            </a:r>
-            <a:r>
-              <a:rPr lang="en-US" dirty="0"/>
-              <a:t>field [color-change-interval 4</a:t>
-            </a:r>
-            <a:r>
-              <a:rPr lang="en-US" dirty="0" smtClean="0"/>
-              <a:t>])</a:t>
-            </a:r>
-            <a:endParaRPr lang="en-US" dirty="0"/>
-          </a:p>
-          <a:p>
-            <a:r>
-              <a:rPr lang="en-US" dirty="0"/>
-              <a:t>    </a:t>
-            </a:r>
-            <a:endParaRPr lang="en-US" dirty="0" smtClean="0"/>
-          </a:p>
-          <a:p>
-            <a:r>
-              <a:rPr lang="en-US" dirty="0"/>
-              <a:t> </a:t>
-            </a:r>
-            <a:r>
-              <a:rPr lang="en-US" dirty="0" smtClean="0"/>
-              <a:t>   ;; time left </a:t>
-            </a:r>
-            <a:r>
-              <a:rPr lang="en-US" dirty="0" err="1" smtClean="0"/>
-              <a:t>til</a:t>
-            </a:r>
-            <a:r>
-              <a:rPr lang="en-US" dirty="0" smtClean="0"/>
-              <a:t> next color change</a:t>
-            </a:r>
-          </a:p>
-          <a:p>
-            <a:r>
-              <a:rPr lang="en-US" dirty="0" smtClean="0"/>
-              <a:t>    (</a:t>
-            </a:r>
-            <a:r>
-              <a:rPr lang="en-US" dirty="0"/>
-              <a:t>field [time-left color-change-interval</a:t>
-            </a:r>
-            <a:r>
-              <a:rPr lang="en-US" dirty="0" smtClean="0"/>
-              <a:t>])</a:t>
-            </a:r>
-          </a:p>
-          <a:p>
-            <a:endParaRPr lang="en-US" dirty="0"/>
-          </a:p>
-          <a:p>
-            <a:r>
-              <a:rPr lang="en-US" dirty="0" smtClean="0"/>
-              <a:t>    ;; </a:t>
-            </a:r>
-            <a:r>
-              <a:rPr lang="en-US" dirty="0"/>
-              <a:t>the list of </a:t>
-            </a:r>
-            <a:r>
-              <a:rPr lang="en-US" dirty="0" smtClean="0"/>
-              <a:t>possible </a:t>
-            </a:r>
-            <a:r>
-              <a:rPr lang="en-US" dirty="0"/>
-              <a:t>colors, first </a:t>
+            <a:r>
+              <a:rPr lang="en-US" dirty="0"/>
+              <a:t>    ;; the list of possible colors, first </a:t>
             </a:r>
             <a:r>
               <a:rPr lang="en-US" dirty="0" err="1"/>
@@ -12643,51 +12109,26 @@
             </a:r>
             <a:r>
               <a:rPr lang="en-US" dirty="0"/>
+              <a:t> is</a:t>
+            </a:r>
+          </a:p>
+          <a:p>
+            <a:r>
+              <a:rPr lang="en-US" dirty="0"/>
+              <a:t>    ;; current color</a:t>
+            </a:r>
+          </a:p>
+          <a:p>
+            <a:r>
+              <a:rPr lang="en-US" dirty="0"/>
+              <a:t>    (field [colors (list "red" "green")])</a:t>
+            </a:r>
+          </a:p>
+          <a:p>
+            <a:r>
+              <a:rPr lang="en-US" dirty="0"/>
               <a:t> </a:t>
             </a:r>
-            <a:r>
-              <a:rPr lang="en-US" dirty="0" smtClean="0"/>
-              <a:t>is</a:t>
-            </a:r>
-          </a:p>
-          <a:p>
-            <a:r>
-              <a:rPr lang="en-US" dirty="0"/>
-              <a:t> </a:t>
-            </a:r>
-            <a:r>
-              <a:rPr lang="en-US" dirty="0" smtClean="0"/>
-              <a:t>   ;; </a:t>
-            </a:r>
-            <a:r>
-              <a:rPr lang="en-US" dirty="0"/>
-              <a:t>current </a:t>
-            </a:r>
-            <a:r>
-              <a:rPr lang="en-US" dirty="0" smtClean="0"/>
-              <a:t>color</a:t>
-            </a:r>
-          </a:p>
-          <a:p>
-            <a:r>
-              <a:rPr lang="en-US" dirty="0" smtClean="0"/>
-              <a:t>    </a:t>
-            </a:r>
-            <a:r>
-              <a:rPr lang="en-US" dirty="0"/>
-              <a:t>(field [colors (list "red" "green</a:t>
-            </a:r>
-            <a:r>
-              <a:rPr lang="en-US" dirty="0" smtClean="0"/>
-              <a:t>")])</a:t>
-            </a:r>
-          </a:p>
-          <a:p>
-            <a:r>
-              <a:rPr lang="en-US" dirty="0" smtClean="0"/>
-              <a:t> </a:t>
-            </a:r>
-            <a:endParaRPr lang="en-US" dirty="0"/>
           </a:p>
           <a:p>
             <a:r>
@@ -12697,12 +12138,8 @@
           </a:p>
           <a:p>
             <a:r>
-              <a:rPr lang="en-US" dirty="0" smtClean="0"/>
-              <a:t>    </a:t>
-            </a:r>
-            <a:r>
-              <a:rPr lang="en-US" dirty="0"/>
-              <a:t>(</a:t>
+              <a:rPr lang="en-US" dirty="0"/>
+              <a:t>    (</a:t>
             </a:r>
             <a:r>
               <a:rPr lang="en-US" dirty="0">
@@ -12722,34 +12159,22 @@
           </a:p>
           <a:p>
             <a:r>
-              <a:rPr lang="en-US" dirty="0" smtClean="0"/>
-              <a:t>    </a:t>
-            </a:r>
-            <a:r>
-              <a:rPr lang="en-US" dirty="0"/>
-              <a:t>;; the </a:t>
-            </a:r>
-            <a:r>
-              <a:rPr lang="en-US" dirty="0" err="1" smtClean="0"/>
+              <a:rPr lang="en-US" dirty="0"/>
+              <a:t>    ;; the </a:t>
+            </a:r>
+            <a:r>
+              <a:rPr lang="en-US" dirty="0" err="1"/>
               <a:t>init</a:t>
             </a:r>
             <a:r>
-              <a:rPr lang="en-US" dirty="0" smtClean="0"/>
+              <a:rPr lang="en-US" dirty="0"/>
               <a:t>-field w isn’t declared here, </a:t>
             </a:r>
           </a:p>
           <a:p>
             <a:r>
               <a:rPr lang="en-US" dirty="0"/>
-              <a:t> </a:t>
-            </a:r>
-            <a:r>
-              <a:rPr lang="en-US" dirty="0" smtClean="0"/>
-              <a:t>   ;; so it is </a:t>
-            </a:r>
-            <a:r>
-              <a:rPr lang="en-US" dirty="0"/>
-              <a:t>sent to the superclass.</a:t>
+              <a:t>    ;; so it is sent to the superclass.</a:t>
             </a:r>
           </a:p>
           <a:p>
@@ -12787,61 +12212,32 @@
           <a:p>
             <a:r>
               <a:rPr lang="en-US" dirty="0"/>
-              <a:t> </a:t>
-            </a:r>
-            <a:r>
-              <a:rPr lang="en-US" dirty="0" smtClean="0"/>
-              <a:t>   ;; </a:t>
-            </a:r>
-            <a:r>
-              <a:rPr lang="en-US" dirty="0"/>
-              <a:t>Scene -&gt; Scene</a:t>
-            </a:r>
-          </a:p>
-          <a:p>
-            <a:r>
-              <a:rPr lang="en-US" dirty="0"/>
-              <a:t>    ;; RETURNS: a scene like the given one, but with </a:t>
-            </a:r>
-            <a:r>
-              <a:rPr lang="en-US" dirty="0" smtClean="0"/>
-              <a:t>the</a:t>
-            </a:r>
-          </a:p>
-          <a:p>
-            <a:r>
-              <a:rPr lang="en-US" dirty="0"/>
-              <a:t> </a:t>
-            </a:r>
-            <a:r>
-              <a:rPr lang="en-US" dirty="0" smtClean="0"/>
-              <a:t>   ;;  flashing ball </a:t>
-            </a:r>
-            <a:r>
-              <a:rPr lang="en-US" dirty="0"/>
-              <a:t>painted on it.</a:t>
-            </a:r>
-          </a:p>
-          <a:p>
-            <a:r>
-              <a:rPr lang="en-US" dirty="0"/>
-              <a:t>    ;; EFFECT: decrements time-left and changes colors </a:t>
-            </a:r>
-            <a:r>
-              <a:rPr lang="en-US" dirty="0" smtClean="0"/>
-              <a:t>if</a:t>
-            </a:r>
-          </a:p>
-          <a:p>
-            <a:r>
-              <a:rPr lang="en-US" dirty="0"/>
-              <a:t> </a:t>
-            </a:r>
-            <a:r>
-              <a:rPr lang="en-US" dirty="0" smtClean="0"/>
-              <a:t>   ;;  necessary</a:t>
-            </a:r>
-            <a:endParaRPr lang="en-US" dirty="0"/>
+              <a:t>    ;; Scene -&gt; Scene</a:t>
+            </a:r>
+          </a:p>
+          <a:p>
+            <a:r>
+              <a:rPr lang="en-US" dirty="0"/>
+              <a:t>    ;; RETURNS: a scene like the given one, but with the</a:t>
+            </a:r>
+          </a:p>
+          <a:p>
+            <a:r>
+              <a:rPr lang="en-US" dirty="0"/>
+              <a:t>    ;;  flashing ball painted on it.</a:t>
+            </a:r>
+          </a:p>
+          <a:p>
+            <a:r>
+              <a:rPr lang="en-US" dirty="0"/>
+              <a:t>    ;; EFFECT: decrements time-left and changes colors if</a:t>
+            </a:r>
+          </a:p>
+          <a:p>
+            <a:r>
+              <a:rPr lang="en-US" dirty="0"/>
+              <a:t>    ;;  necessary</a:t>
+            </a:r>
           </a:p>
           <a:p>
             <a:r>
@@ -12894,15 +12290,7 @@
           <a:p>
             <a:r>
               <a:rPr lang="en-US" dirty="0"/>
-              <a:t>        ;; now paint </a:t>
-            </a:r>
-            <a:r>
-              <a:rPr lang="en-US" dirty="0" smtClean="0"/>
-              <a:t>this ball </a:t>
-            </a:r>
-            <a:r>
-              <a:rPr lang="en-US" dirty="0"/>
-              <a:t>on the scene</a:t>
+              <a:t>        ;; now paint this ball on the scene</a:t>
             </a:r>
           </a:p>
           <a:p>
@@ -12940,10 +12328,9 @@
           </a:p>
           <a:p>
             <a:r>
-              <a:rPr lang="en-US" dirty="0" smtClean="0"/>
+              <a:rPr lang="en-US" dirty="0"/>
               <a:t>    </a:t>
             </a:r>
-            <a:endParaRPr lang="en-US" dirty="0"/>
           </a:p>
           <a:p>
             <a:r>
@@ -12956,20 +12343,11 @@
               <a:rPr lang="en-US" dirty="0"/>
               <a:t>    ;; EFFECT: rotate the list of colors, </a:t>
             </a:r>
-            <a:endParaRPr lang="en-US" dirty="0" smtClean="0"/>
-          </a:p>
-          <a:p>
-            <a:r>
-              <a:rPr lang="en-US" dirty="0"/>
-              <a:t> </a:t>
-            </a:r>
-            <a:r>
-              <a:rPr lang="en-US" dirty="0" smtClean="0"/>
-              <a:t>   ;;  and </a:t>
-            </a:r>
-            <a:r>
-              <a:rPr lang="en-US" dirty="0"/>
-              <a:t>reset time-left</a:t>
+          </a:p>
+          <a:p>
+            <a:r>
+              <a:rPr lang="en-US" dirty="0"/>
+              <a:t>    ;;  and reset time-left</a:t>
             </a:r>
           </a:p>
           <a:p>
@@ -12983,20 +12361,11 @@
               <a:rPr lang="en-US" dirty="0"/>
               <a:t>      (set! colors </a:t>
             </a:r>
-            <a:endParaRPr lang="en-US" dirty="0" smtClean="0"/>
-          </a:p>
-          <a:p>
-            <a:r>
-              <a:rPr lang="en-US" dirty="0"/>
-              <a:t> </a:t>
-            </a:r>
-            <a:r>
-              <a:rPr lang="en-US" dirty="0" smtClean="0"/>
-              <a:t>       (</a:t>
-            </a:r>
-            <a:r>
-              <a:rPr lang="en-US" dirty="0"/>
-              <a:t>append (rest colors) (list (first colors))))</a:t>
+          </a:p>
+          <a:p>
+            <a:r>
+              <a:rPr lang="en-US" dirty="0"/>
+              <a:t>        (append (rest colors) (list (first colors))))</a:t>
             </a:r>
           </a:p>
           <a:p>
@@ -13094,29 +12463,16 @@
                   <a:schemeClr val="tx1"/>
                 </a:solidFill>
               </a:rPr>
-              <a:t>i</a:t>
-            </a:r>
-            <a:r>
-              <a:rPr lang="en-US" sz="1400" b="1" dirty="0" smtClean="0">
-                <a:solidFill>
-                  <a:schemeClr val="tx1"/>
-                </a:solidFill>
-              </a:rPr>
-              <a:t>nherit-fields</a:t>
-            </a:r>
-            <a:r>
-              <a:rPr lang="en-US" sz="1400" dirty="0" smtClean="0">
+              <a:t>inherit-fields</a:t>
+            </a:r>
+            <a:r>
+              <a:rPr lang="en-US" sz="1400" dirty="0">
                 <a:solidFill>
                   <a:schemeClr val="tx1"/>
                 </a:solidFill>
               </a:rPr>
               <a:t> is used to declare fields of the superclass that we want to make visible in the subclass</a:t>
             </a:r>
-            <a:endParaRPr lang="en-US" sz="1400" dirty="0">
-              <a:solidFill>
-                <a:schemeClr val="tx1"/>
-              </a:solidFill>
-            </a:endParaRPr>
           </a:p>
         </p:txBody>
       </p:sp>
@@ -13167,7 +12523,7 @@
           <a:p>
             <a:pPr algn="ctr"/>
             <a:r>
-              <a:rPr lang="en-US" sz="1400" dirty="0" err="1" smtClean="0">
+              <a:rPr lang="en-US" sz="1400" dirty="0" err="1">
                 <a:solidFill>
                   <a:schemeClr val="tx1"/>
                 </a:solidFill>
@@ -13175,7 +12531,7 @@
               <a:t>FlashingBall</a:t>
             </a:r>
             <a:r>
-              <a:rPr lang="en-US" sz="1400" dirty="0" smtClean="0">
+              <a:rPr lang="en-US" sz="1400" dirty="0">
                 <a:solidFill>
                   <a:schemeClr val="tx1"/>
                 </a:solidFill>
@@ -13183,7 +12539,7 @@
               <a:t>% inherits from Ball%.  </a:t>
             </a:r>
             <a:r>
-              <a:rPr lang="en-US" sz="1400" dirty="0" err="1" smtClean="0">
+              <a:rPr lang="en-US" sz="1400" dirty="0" err="1">
                 <a:solidFill>
                   <a:schemeClr val="tx1"/>
                 </a:solidFill>
@@ -13191,18 +12547,13 @@
               <a:t>FlashingBall</a:t>
             </a:r>
             <a:r>
-              <a:rPr lang="en-US" sz="1400" dirty="0" smtClean="0">
+              <a:rPr lang="en-US" sz="1400" dirty="0">
                 <a:solidFill>
                   <a:schemeClr val="tx1"/>
                 </a:solidFill>
               </a:rPr>
               <a:t>% is the subclass; Ball% is the superclass</a:t>
             </a:r>
-            <a:endParaRPr lang="en-US" sz="1400" dirty="0">
-              <a:solidFill>
-                <a:schemeClr val="tx1"/>
-              </a:solidFill>
-            </a:endParaRPr>
           </a:p>
         </p:txBody>
       </p:sp>
@@ -13323,7 +12674,7 @@
           <a:p>
             <a:pPr algn="ctr"/>
             <a:r>
-              <a:rPr lang="en-US" sz="1400" b="1" dirty="0" smtClean="0">
+              <a:rPr lang="en-US" sz="1400" b="1" dirty="0">
                 <a:solidFill>
                   <a:schemeClr val="tx1"/>
                 </a:solidFill>
@@ -13331,18 +12682,13 @@
               <a:t>define/override</a:t>
             </a:r>
             <a:r>
-              <a:rPr lang="en-US" sz="1400" dirty="0" smtClean="0">
+              <a:rPr lang="en-US" sz="1400" dirty="0">
                 <a:solidFill>
                   <a:schemeClr val="tx1"/>
                 </a:solidFill>
               </a:rPr>
               <a:t> is used to define methods that override methods in the superclass</a:t>
             </a:r>
-            <a:endParaRPr lang="en-US" sz="1400" dirty="0">
-              <a:solidFill>
-                <a:schemeClr val="tx1"/>
-              </a:solidFill>
-            </a:endParaRPr>
           </a:p>
         </p:txBody>
       </p:sp>
@@ -13391,13 +12737,6 @@
   <p:clrMapOvr>
     <a:masterClrMapping/>
   </p:clrMapOvr>
-  <p:timing>
-    <p:tnLst>
-      <p:par>
-        <p:cTn id="1" dur="indefinite" restart="never" nodeType="tmRoot"/>
-      </p:par>
-    </p:tnLst>
-  </p:timing>
 </p:sld>
 </file>
 
@@ -13436,10 +12775,9 @@
           <a:lstStyle/>
           <a:p>
             <a:r>
-              <a:rPr lang="en-US" dirty="0" smtClean="0"/>
+              <a:rPr lang="en-US" dirty="0"/>
               <a:t>Features for Inheritance in Racket</a:t>
             </a:r>
-            <a:endParaRPr lang="en-US" dirty="0"/>
           </a:p>
         </p:txBody>
       </p:sp>
@@ -13484,14 +12822,14 @@
           <a:p>
             <a:pPr lvl="1"/>
             <a:r>
-              <a:rPr lang="en-US" b="1" dirty="0" smtClean="0">
+              <a:rPr lang="en-US" b="1" dirty="0">
                 <a:latin typeface="Consolas" pitchFamily="49" charset="0"/>
                 <a:cs typeface="Consolas" pitchFamily="49" charset="0"/>
               </a:rPr>
               <a:t>define/override</a:t>
             </a:r>
             <a:r>
-              <a:rPr lang="en-US" dirty="0" smtClean="0"/>
+              <a:rPr lang="en-US" dirty="0"/>
               <a:t> is used to define methods that override methods in the superclass.</a:t>
             </a:r>
           </a:p>
@@ -13508,52 +12846,51 @@
               <a:rPr lang="en-US" dirty="0"/>
               <a:t>is used to declare fields of the superclass that we want to make visible in the subclass.  </a:t>
             </a:r>
-            <a:endParaRPr lang="en-US" dirty="0" smtClean="0"/>
           </a:p>
           <a:p>
             <a:pPr lvl="2"/>
             <a:r>
-              <a:rPr lang="en-US" dirty="0" err="1" smtClean="0"/>
+              <a:rPr lang="en-US" dirty="0" err="1"/>
               <a:t>eg</a:t>
             </a:r>
             <a:r>
-              <a:rPr lang="en-US" dirty="0" smtClean="0"/>
+              <a:rPr lang="en-US" dirty="0"/>
               <a:t>: </a:t>
             </a:r>
             <a:r>
-              <a:rPr lang="en-US" b="1" dirty="0" smtClean="0"/>
+              <a:rPr lang="en-US" b="1" dirty="0"/>
               <a:t>x</a:t>
             </a:r>
             <a:r>
-              <a:rPr lang="en-US" dirty="0" smtClean="0"/>
+              <a:rPr lang="en-US" dirty="0"/>
               <a:t>, </a:t>
             </a:r>
             <a:r>
-              <a:rPr lang="en-US" b="1" dirty="0" smtClean="0"/>
+              <a:rPr lang="en-US" b="1" dirty="0"/>
               <a:t>y</a:t>
             </a:r>
             <a:r>
-              <a:rPr lang="en-US" dirty="0" smtClean="0"/>
+              <a:rPr lang="en-US" dirty="0"/>
               <a:t>, </a:t>
             </a:r>
             <a:r>
-              <a:rPr lang="en-US" b="1" dirty="0" smtClean="0"/>
+              <a:rPr lang="en-US" b="1" dirty="0"/>
               <a:t>selected?</a:t>
             </a:r>
             <a:r>
-              <a:rPr lang="en-US" dirty="0" smtClean="0"/>
+              <a:rPr lang="en-US" dirty="0"/>
               <a:t>, </a:t>
             </a:r>
             <a:r>
-              <a:rPr lang="en-US" b="1" dirty="0" smtClean="0"/>
+              <a:rPr lang="en-US" b="1" dirty="0"/>
               <a:t>radius</a:t>
             </a:r>
             <a:r>
-              <a:rPr lang="en-US" dirty="0" smtClean="0"/>
+              <a:rPr lang="en-US" dirty="0"/>
               <a:t>  in </a:t>
             </a:r>
             <a:r>
-              <a:rPr lang="en-US" b="1" dirty="0" err="1" smtClean="0">
+              <a:rPr lang="en-US" b="1" dirty="0" err="1">
                 <a:latin typeface="Consolas" pitchFamily="49" charset="0"/>
                 <a:cs typeface="Consolas" pitchFamily="49" charset="0"/>
               </a:rPr>
@@ -13574,7 +12911,7 @@
           <a:p>
             <a:pPr lvl="2"/>
             <a:r>
-              <a:rPr lang="en-US" dirty="0" smtClean="0"/>
+              <a:rPr lang="en-US" dirty="0"/>
               <a:t>values are automatically supplied to the superclass on initialization.</a:t>
             </a:r>
           </a:p>
@@ -13651,13 +12988,8 @@
           <a:p>
             <a:r>
               <a:rPr lang="en-US" dirty="0"/>
-              <a:t>Other languages do this </a:t>
-            </a:r>
-            <a:r>
-              <a:rPr lang="en-US" dirty="0" smtClean="0"/>
-              <a:t>differently, so watch out!</a:t>
-            </a:r>
-            <a:endParaRPr lang="en-US" dirty="0"/>
+              <a:t>Other languages do this differently, so watch out!</a:t>
+            </a:r>
           </a:p>
         </p:txBody>
       </p:sp>
@@ -13666,13 +12998,6 @@
   <p:clrMapOvr>
     <a:masterClrMapping/>
   </p:clrMapOvr>
-  <p:timing>
-    <p:tnLst>
-      <p:par>
-        <p:cTn id="1" dur="indefinite" restart="never" nodeType="tmRoot"/>
-      </p:par>
-    </p:tnLst>
-  </p:timing>
 </p:sld>
 </file>
 
@@ -13709,10 +13034,9 @@
           <a:lstStyle/>
           <a:p>
             <a:r>
-              <a:rPr lang="en-US" dirty="0" smtClean="0"/>
+              <a:rPr lang="en-US" dirty="0"/>
               <a:t>What fields are in the subclass?</a:t>
             </a:r>
-            <a:endParaRPr lang="en-US" dirty="0"/>
           </a:p>
         </p:txBody>
       </p:sp>
@@ -13761,11 +13085,10 @@
               <a:rPr lang="en-US" sz="2000" dirty="0"/>
               <a:t>-fields declared in the subclass.   </a:t>
             </a:r>
-            <a:endParaRPr lang="en-US" sz="2000" dirty="0" smtClean="0"/>
-          </a:p>
-          <a:p>
-            <a:r>
-              <a:rPr lang="en-US" sz="2000" dirty="0" err="1" smtClean="0"/>
+          </a:p>
+          <a:p>
+            <a:r>
+              <a:rPr lang="en-US" sz="2000" dirty="0" err="1"/>
               <a:t>FlashingBall</a:t>
             </a:r>
             <a:r>
@@ -13788,20 +13111,15 @@
               <a:rPr lang="en-US" sz="2000" dirty="0"/>
               <a:t>-fields are the same as those of Ball%.  </a:t>
             </a:r>
-            <a:endParaRPr lang="en-US" sz="2000" dirty="0" smtClean="0"/>
-          </a:p>
-          <a:p>
-            <a:r>
-              <a:rPr lang="en-US" sz="2000" dirty="0" err="1" smtClean="0"/>
+          </a:p>
+          <a:p>
+            <a:r>
+              <a:rPr lang="en-US" sz="2000" dirty="0" err="1"/>
               <a:t>init</a:t>
             </a:r>
             <a:r>
-              <a:rPr lang="en-US" sz="2000" dirty="0" smtClean="0"/>
-              <a:t>-fields </a:t>
-            </a:r>
-            <a:r>
               <a:rPr lang="en-US" sz="2000" dirty="0"/>
-              <a:t>of the subclass are automatically sent to the superclass, so when we create a </a:t>
+              <a:t>-fields of the subclass are automatically sent to the superclass, so when we create a </a:t>
             </a:r>
             <a:r>
               <a:rPr lang="en-US" sz="2000" dirty="0" err="1"/>
@@ -13842,21 +13160,7 @@
                 <a:latin typeface="Consolas" panose="020B0609020204030204" pitchFamily="49" charset="0"/>
                 <a:cs typeface="Consolas" panose="020B0609020204030204" pitchFamily="49" charset="0"/>
               </a:rPr>
-              <a:t>% [x ...][y </a:t>
-            </a:r>
-            <a:r>
-              <a:rPr lang="en-US" sz="2000" b="1" dirty="0" smtClean="0">
-                <a:latin typeface="Consolas" panose="020B0609020204030204" pitchFamily="49" charset="0"/>
-                <a:cs typeface="Consolas" panose="020B0609020204030204" pitchFamily="49" charset="0"/>
-              </a:rPr>
-              <a:t>...][speed </a:t>
-            </a:r>
-            <a:r>
-              <a:rPr lang="en-US" sz="2000" b="1" dirty="0">
-                <a:latin typeface="Consolas" panose="020B0609020204030204" pitchFamily="49" charset="0"/>
-                <a:cs typeface="Consolas" panose="020B0609020204030204" pitchFamily="49" charset="0"/>
-              </a:rPr>
-              <a:t>...])</a:t>
+              <a:t>% [x ...][y ...][speed ...])</a:t>
             </a:r>
           </a:p>
           <a:p>
@@ -13867,16 +13171,11 @@
               <a:rPr lang="en-US" sz="2000" dirty="0"/>
               <a:t>Those values become the values for the fields in Ball%, so they can be used by the methods in Ball%. </a:t>
             </a:r>
-            <a:endParaRPr lang="en-US" sz="2000" dirty="0" smtClean="0"/>
-          </a:p>
-          <a:p>
-            <a:r>
-              <a:rPr lang="en-US" sz="2000" dirty="0" smtClean="0"/>
-              <a:t>x </a:t>
-            </a:r>
+          </a:p>
+          <a:p>
             <a:r>
               <a:rPr lang="en-US" sz="2000" dirty="0"/>
-              <a:t>and y are also inherited fields, so they are visible to the methods in </a:t>
+              <a:t>x and y are also inherited fields, so they are visible to the methods in </a:t>
             </a:r>
             <a:r>
               <a:rPr lang="en-US" sz="2000" dirty="0" err="1"/>
@@ -13926,13 +13225,6 @@
   <p:clrMapOvr>
     <a:masterClrMapping/>
   </p:clrMapOvr>
-  <p:timing>
-    <p:tnLst>
-      <p:par>
-        <p:cTn id="1" dur="indefinite" restart="never" nodeType="tmRoot"/>
-      </p:par>
-    </p:tnLst>
-  </p:timing>
 </p:sld>
 </file>
 
@@ -13971,10 +13263,9 @@
           <a:lstStyle/>
           <a:p>
             <a:r>
-              <a:rPr lang="en-US" dirty="0" smtClean="0"/>
+              <a:rPr lang="en-US" dirty="0"/>
               <a:t>The overriding-defaults pattern</a:t>
             </a:r>
-            <a:endParaRPr lang="en-US" dirty="0"/>
           </a:p>
         </p:txBody>
       </p:sp>
@@ -13999,11 +13290,11 @@
               <a:buNone/>
             </a:pPr>
             <a:r>
-              <a:rPr lang="en-US" sz="2800" dirty="0" smtClean="0"/>
+              <a:rPr lang="en-US" sz="2800" dirty="0"/>
               <a:t>The flashing ball was an example of the </a:t>
             </a:r>
             <a:r>
-              <a:rPr lang="en-US" sz="2800" i="1" dirty="0" smtClean="0">
+              <a:rPr lang="en-US" sz="2800" i="1" dirty="0">
                 <a:solidFill>
                   <a:srgbClr val="FF0000"/>
                 </a:solidFill>
@@ -14011,23 +13302,21 @@
               <a:t>overriding-defaults</a:t>
             </a:r>
             <a:r>
-              <a:rPr lang="en-US" sz="2800" dirty="0" smtClean="0"/>
+              <a:rPr lang="en-US" sz="2800" dirty="0"/>
               <a:t> pattern.  In the overriding-defaults pattern:</a:t>
             </a:r>
-            <a:endParaRPr lang="en-US" sz="2800" dirty="0"/>
-          </a:p>
-          <a:p>
-            <a:r>
-              <a:rPr lang="en-US" sz="2800" dirty="0" smtClean="0"/>
+          </a:p>
+          <a:p>
+            <a:r>
+              <a:rPr lang="en-US" sz="2800" dirty="0"/>
               <a:t>The superclass has a complete set of behaviors</a:t>
             </a:r>
           </a:p>
           <a:p>
             <a:r>
-              <a:rPr lang="en-US" sz="2800" dirty="0" smtClean="0"/>
+              <a:rPr lang="en-US" sz="2800" dirty="0"/>
               <a:t>The subclass makes an incremental change in these behaviors by overriding some of them.</a:t>
             </a:r>
-            <a:endParaRPr lang="en-US" sz="2800" dirty="0"/>
           </a:p>
         </p:txBody>
       </p:sp>
@@ -14065,13 +13354,6 @@
   <p:clrMapOvr>
     <a:masterClrMapping/>
   </p:clrMapOvr>
-  <p:timing>
-    <p:tnLst>
-      <p:par>
-        <p:cTn id="1" dur="indefinite" restart="never" nodeType="tmRoot"/>
-      </p:par>
-    </p:tnLst>
-  </p:timing>
 </p:sld>
 </file>
 

</xml_diff>